<commit_message>
Update code and summary.ppt 2024.7.18
</commit_message>
<xml_diff>
--- a/Summary.pptx
+++ b/Summary.pptx
@@ -12,14 +12,17 @@
     <p:sldId id="1446" r:id="rId4"/>
     <p:sldId id="1448" r:id="rId6"/>
     <p:sldId id="1449" r:id="rId7"/>
-    <p:sldId id="1451" r:id="rId8"/>
-    <p:sldId id="1452" r:id="rId9"/>
-    <p:sldId id="1447" r:id="rId10"/>
+    <p:sldId id="1454" r:id="rId8"/>
+    <p:sldId id="1451" r:id="rId9"/>
+    <p:sldId id="1452" r:id="rId10"/>
+    <p:sldId id="1458" r:id="rId11"/>
+    <p:sldId id="1459" r:id="rId12"/>
+    <p:sldId id="1447" r:id="rId13"/>
   </p:sldIdLst>
   <p:sldSz cx="12192000" cy="6858000"/>
   <p:notesSz cx="6858000" cy="9144000"/>
   <p:custDataLst>
-    <p:tags r:id="rId14"/>
+    <p:tags r:id="rId17"/>
   </p:custDataLst>
   <p:defaultTextStyle>
     <a:defPPr>
@@ -812,6 +815,213 @@
 </file>
 
 <file path=ppt/notesSlides/notesSlide6.xml><?xml version="1.0" encoding="utf-8"?>
+<p:notes xmlns:a="http://schemas.openxmlformats.org/drawingml/2006/main" xmlns:r="http://schemas.openxmlformats.org/officeDocument/2006/relationships" xmlns:p="http://schemas.openxmlformats.org/presentationml/2006/main">
+  <p:cSld>
+    <p:spTree>
+      <p:nvGrpSpPr>
+        <p:cNvPr id="1" name=""/>
+        <p:cNvGrpSpPr/>
+        <p:nvPr/>
+      </p:nvGrpSpPr>
+      <p:grpSpPr>
+        <a:xfrm>
+          <a:off x="0" y="0"/>
+          <a:ext cx="0" cy="0"/>
+          <a:chOff x="0" y="0"/>
+          <a:chExt cx="0" cy="0"/>
+        </a:xfrm>
+      </p:grpSpPr>
+      <p:sp>
+        <p:nvSpPr>
+          <p:cNvPr id="2" name="幻灯片图像占位符 1"/>
+          <p:cNvSpPr>
+            <a:spLocks noGrp="1" noRot="1" noChangeAspect="1"/>
+          </p:cNvSpPr>
+          <p:nvPr>
+            <p:ph type="sldImg"/>
+          </p:nvPr>
+        </p:nvSpPr>
+        <p:spPr/>
+      </p:sp>
+      <p:sp>
+        <p:nvSpPr>
+          <p:cNvPr id="3" name="备注占位符 2"/>
+          <p:cNvSpPr>
+            <a:spLocks noGrp="1"/>
+          </p:cNvSpPr>
+          <p:nvPr>
+            <p:ph type="body" idx="1"/>
+          </p:nvPr>
+        </p:nvSpPr>
+        <p:spPr/>
+        <p:txBody>
+          <a:bodyPr/>
+          <a:lstStyle/>
+          <a:p>
+            <a:pPr marL="0" indent="-457200">
+              <a:lnSpc>
+                <a:spcPct val="135000"/>
+              </a:lnSpc>
+              <a:buNone/>
+            </a:pPr>
+            <a:endParaRPr lang="zh-CN" altLang="en-US" sz="1000" dirty="0">
+              <a:solidFill>
+                <a:srgbClr val="00246C"/>
+              </a:solidFill>
+              <a:ea typeface="+mn-ea"/>
+              <a:cs typeface="+mn-ea"/>
+              <a:sym typeface="+mn-lt"/>
+            </a:endParaRPr>
+          </a:p>
+        </p:txBody>
+      </p:sp>
+    </p:spTree>
+  </p:cSld>
+  <p:clrMapOvr>
+    <a:masterClrMapping/>
+  </p:clrMapOvr>
+</p:notes>
+</file>
+
+<file path=ppt/notesSlides/notesSlide7.xml><?xml version="1.0" encoding="utf-8"?>
+<p:notes xmlns:a="http://schemas.openxmlformats.org/drawingml/2006/main" xmlns:r="http://schemas.openxmlformats.org/officeDocument/2006/relationships" xmlns:p="http://schemas.openxmlformats.org/presentationml/2006/main">
+  <p:cSld>
+    <p:spTree>
+      <p:nvGrpSpPr>
+        <p:cNvPr id="1" name=""/>
+        <p:cNvGrpSpPr/>
+        <p:nvPr/>
+      </p:nvGrpSpPr>
+      <p:grpSpPr>
+        <a:xfrm>
+          <a:off x="0" y="0"/>
+          <a:ext cx="0" cy="0"/>
+          <a:chOff x="0" y="0"/>
+          <a:chExt cx="0" cy="0"/>
+        </a:xfrm>
+      </p:grpSpPr>
+      <p:sp>
+        <p:nvSpPr>
+          <p:cNvPr id="2" name="幻灯片图像占位符 1"/>
+          <p:cNvSpPr>
+            <a:spLocks noGrp="1" noRot="1" noChangeAspect="1"/>
+          </p:cNvSpPr>
+          <p:nvPr>
+            <p:ph type="sldImg"/>
+          </p:nvPr>
+        </p:nvSpPr>
+        <p:spPr/>
+      </p:sp>
+      <p:sp>
+        <p:nvSpPr>
+          <p:cNvPr id="3" name="备注占位符 2"/>
+          <p:cNvSpPr>
+            <a:spLocks noGrp="1"/>
+          </p:cNvSpPr>
+          <p:nvPr>
+            <p:ph type="body" idx="1"/>
+          </p:nvPr>
+        </p:nvSpPr>
+        <p:spPr/>
+        <p:txBody>
+          <a:bodyPr/>
+          <a:lstStyle/>
+          <a:p>
+            <a:pPr marL="0" indent="-457200">
+              <a:lnSpc>
+                <a:spcPct val="135000"/>
+              </a:lnSpc>
+              <a:buNone/>
+            </a:pPr>
+            <a:endParaRPr lang="zh-CN" altLang="en-US" sz="1000" dirty="0">
+              <a:solidFill>
+                <a:srgbClr val="00246C"/>
+              </a:solidFill>
+              <a:ea typeface="+mn-ea"/>
+              <a:cs typeface="+mn-ea"/>
+              <a:sym typeface="+mn-lt"/>
+            </a:endParaRPr>
+          </a:p>
+        </p:txBody>
+      </p:sp>
+    </p:spTree>
+  </p:cSld>
+  <p:clrMapOvr>
+    <a:masterClrMapping/>
+  </p:clrMapOvr>
+</p:notes>
+</file>
+
+<file path=ppt/notesSlides/notesSlide8.xml><?xml version="1.0" encoding="utf-8"?>
+<p:notes xmlns:a="http://schemas.openxmlformats.org/drawingml/2006/main" xmlns:r="http://schemas.openxmlformats.org/officeDocument/2006/relationships" xmlns:p="http://schemas.openxmlformats.org/presentationml/2006/main">
+  <p:cSld>
+    <p:spTree>
+      <p:nvGrpSpPr>
+        <p:cNvPr id="1" name=""/>
+        <p:cNvGrpSpPr/>
+        <p:nvPr/>
+      </p:nvGrpSpPr>
+      <p:grpSpPr>
+        <a:xfrm>
+          <a:off x="0" y="0"/>
+          <a:ext cx="0" cy="0"/>
+          <a:chOff x="0" y="0"/>
+          <a:chExt cx="0" cy="0"/>
+        </a:xfrm>
+      </p:grpSpPr>
+      <p:sp>
+        <p:nvSpPr>
+          <p:cNvPr id="2" name="幻灯片图像占位符 1"/>
+          <p:cNvSpPr>
+            <a:spLocks noGrp="1" noRot="1" noChangeAspect="1"/>
+          </p:cNvSpPr>
+          <p:nvPr>
+            <p:ph type="sldImg"/>
+          </p:nvPr>
+        </p:nvSpPr>
+        <p:spPr/>
+      </p:sp>
+      <p:sp>
+        <p:nvSpPr>
+          <p:cNvPr id="3" name="备注占位符 2"/>
+          <p:cNvSpPr>
+            <a:spLocks noGrp="1"/>
+          </p:cNvSpPr>
+          <p:nvPr>
+            <p:ph type="body" idx="1"/>
+          </p:nvPr>
+        </p:nvSpPr>
+        <p:spPr/>
+        <p:txBody>
+          <a:bodyPr/>
+          <a:lstStyle/>
+          <a:p>
+            <a:pPr marL="0" indent="-457200">
+              <a:lnSpc>
+                <a:spcPct val="135000"/>
+              </a:lnSpc>
+              <a:buNone/>
+            </a:pPr>
+            <a:endParaRPr lang="zh-CN" altLang="en-US" sz="1000" dirty="0">
+              <a:solidFill>
+                <a:srgbClr val="00246C"/>
+              </a:solidFill>
+              <a:ea typeface="+mn-ea"/>
+              <a:cs typeface="+mn-ea"/>
+              <a:sym typeface="+mn-lt"/>
+            </a:endParaRPr>
+          </a:p>
+        </p:txBody>
+      </p:sp>
+    </p:spTree>
+  </p:cSld>
+  <p:clrMapOvr>
+    <a:masterClrMapping/>
+  </p:clrMapOvr>
+</p:notes>
+</file>
+
+<file path=ppt/notesSlides/notesSlide9.xml><?xml version="1.0" encoding="utf-8"?>
 <p:notes xmlns:a="http://schemas.openxmlformats.org/drawingml/2006/main" xmlns:r="http://schemas.openxmlformats.org/officeDocument/2006/relationships" xmlns:p="http://schemas.openxmlformats.org/presentationml/2006/main">
   <p:cSld>
     <p:spTree>
@@ -11289,22 +11499,36 @@
       </p:cxnSp>
       <p:pic>
         <p:nvPicPr>
-          <p:cNvPr id="2" name="图片 1"/>
+          <p:cNvPr id="12" name="图片 11"/>
           <p:cNvPicPr>
             <a:picLocks noChangeAspect="1"/>
           </p:cNvPicPr>
           <p:nvPr/>
         </p:nvPicPr>
         <p:blipFill>
-          <a:blip r:embed="rId1"/>
+          <a:blip r:embed="rId1">
+            <a:clrChange>
+              <a:clrFrom>
+                <a:srgbClr val="FFFFFF">
+                  <a:alpha val="100000"/>
+                </a:srgbClr>
+              </a:clrFrom>
+              <a:clrTo>
+                <a:srgbClr val="FFFFFF">
+                  <a:alpha val="100000"/>
+                  <a:alpha val="0"/>
+                </a:srgbClr>
+              </a:clrTo>
+            </a:clrChange>
+          </a:blip>
           <a:stretch>
             <a:fillRect/>
           </a:stretch>
         </p:blipFill>
         <p:spPr>
           <a:xfrm>
-            <a:off x="814070" y="2295525"/>
-            <a:ext cx="9331960" cy="3181350"/>
+            <a:off x="6026785" y="1364615"/>
+            <a:ext cx="5409565" cy="4574540"/>
           </a:xfrm>
           <a:prstGeom prst="rect">
             <a:avLst/>
@@ -11313,14 +11537,14 @@
       </p:pic>
       <p:sp>
         <p:nvSpPr>
-          <p:cNvPr id="5" name="标题 2"/>
+          <p:cNvPr id="14" name="标题 2"/>
           <p:cNvSpPr txBox="1"/>
           <p:nvPr/>
         </p:nvSpPr>
         <p:spPr>
           <a:xfrm>
-            <a:off x="1657350" y="945515"/>
-            <a:ext cx="3406775" cy="650875"/>
+            <a:off x="173990" y="1177925"/>
+            <a:ext cx="5922010" cy="650875"/>
           </a:xfrm>
           <a:prstGeom prst="rect">
             <a:avLst/>
@@ -11355,16 +11579,518 @@
                 <a:latin typeface="Arial" panose="020B0604020202020204" pitchFamily="34" charset="0"/>
                 <a:sym typeface="Arial" panose="020B0604020202020204" pitchFamily="34" charset="0"/>
               </a:rPr>
-              <a:t>权重</a:t>
+              <a:t>A Neural Probabilistic Language </a:t>
+            </a:r>
+            <a:r>
+              <a:rPr altLang="zh-CN" sz="2000" dirty="0">
+                <a:latin typeface="Arial" panose="020B0604020202020204" pitchFamily="34" charset="0"/>
+                <a:sym typeface="Arial" panose="020B0604020202020204" pitchFamily="34" charset="0"/>
+              </a:rPr>
+              <a:t>Model</a:t>
             </a:r>
             <a:r>
               <a:rPr lang="zh-CN" altLang="en-US" sz="2000" dirty="0">
                 <a:latin typeface="Arial" panose="020B0604020202020204" pitchFamily="34" charset="0"/>
                 <a:sym typeface="Arial" panose="020B0604020202020204" pitchFamily="34" charset="0"/>
               </a:rPr>
-              <a:t>初始化</a:t>
+              <a:t>（</a:t>
+            </a:r>
+            <a:r>
+              <a:rPr altLang="zh-CN" sz="2000" dirty="0">
+                <a:latin typeface="Arial" panose="020B0604020202020204" pitchFamily="34" charset="0"/>
+                <a:sym typeface="Arial" panose="020B0604020202020204" pitchFamily="34" charset="0"/>
+              </a:rPr>
+              <a:t>2003</a:t>
+            </a:r>
+            <a:r>
+              <a:rPr lang="zh-CN" altLang="en-US" sz="2000" dirty="0">
+                <a:latin typeface="Arial" panose="020B0604020202020204" pitchFamily="34" charset="0"/>
+                <a:sym typeface="Arial" panose="020B0604020202020204" pitchFamily="34" charset="0"/>
+              </a:rPr>
+              <a:t>）</a:t>
             </a:r>
             <a:endParaRPr lang="zh-CN" altLang="en-US" sz="2000" dirty="0">
+              <a:latin typeface="Arial" panose="020B0604020202020204" pitchFamily="34" charset="0"/>
+              <a:sym typeface="Arial" panose="020B0604020202020204" pitchFamily="34" charset="0"/>
+            </a:endParaRPr>
+          </a:p>
+        </p:txBody>
+      </p:sp>
+      <p:sp>
+        <p:nvSpPr>
+          <p:cNvPr id="15" name="矩形 14"/>
+          <p:cNvSpPr/>
+          <p:nvPr/>
+        </p:nvSpPr>
+        <p:spPr>
+          <a:xfrm>
+            <a:off x="6026785" y="4411980"/>
+            <a:ext cx="4895215" cy="1595755"/>
+          </a:xfrm>
+          <a:prstGeom prst="rect">
+            <a:avLst/>
+          </a:prstGeom>
+          <a:noFill/>
+          <a:ln w="28575" cmpd="sng">
+            <a:solidFill>
+              <a:srgbClr val="FF0000"/>
+            </a:solidFill>
+            <a:prstDash val="sysDot"/>
+          </a:ln>
+        </p:spPr>
+        <p:style>
+          <a:lnRef idx="2">
+            <a:schemeClr val="accent1">
+              <a:lumMod val="75000"/>
+            </a:schemeClr>
+          </a:lnRef>
+          <a:fillRef idx="1">
+            <a:schemeClr val="accent1"/>
+          </a:fillRef>
+          <a:effectRef idx="0">
+            <a:srgbClr val="FFFFFF"/>
+          </a:effectRef>
+          <a:fontRef idx="minor">
+            <a:schemeClr val="lt1"/>
+          </a:fontRef>
+        </p:style>
+        <p:txBody>
+          <a:bodyPr rtlCol="0" anchor="ctr"/>
+          <a:p>
+            <a:pPr algn="ctr"/>
+            <a:endParaRPr lang="zh-CN" altLang="en-US"/>
+          </a:p>
+        </p:txBody>
+      </p:sp>
+      <p:cxnSp>
+        <p:nvCxnSpPr>
+          <p:cNvPr id="16" name="直接箭头连接符 15"/>
+          <p:cNvCxnSpPr>
+            <a:stCxn id="15" idx="1"/>
+            <a:endCxn id="17" idx="0"/>
+          </p:cNvCxnSpPr>
+          <p:nvPr/>
+        </p:nvCxnSpPr>
+        <p:spPr>
+          <a:xfrm flipH="1">
+            <a:off x="5043170" y="5210175"/>
+            <a:ext cx="983615" cy="0"/>
+          </a:xfrm>
+          <a:prstGeom prst="straightConnector1">
+            <a:avLst/>
+          </a:prstGeom>
+          <a:ln w="12700" cmpd="sng">
+            <a:solidFill>
+              <a:srgbClr val="FF0000"/>
+            </a:solidFill>
+            <a:prstDash val="dash"/>
+            <a:tailEnd type="arrow"/>
+          </a:ln>
+        </p:spPr>
+        <p:style>
+          <a:lnRef idx="2">
+            <a:schemeClr val="accent1"/>
+          </a:lnRef>
+          <a:fillRef idx="0">
+            <a:srgbClr val="FFFFFF"/>
+          </a:fillRef>
+          <a:effectRef idx="0">
+            <a:srgbClr val="FFFFFF"/>
+          </a:effectRef>
+          <a:fontRef idx="minor">
+            <a:schemeClr val="tx1"/>
+          </a:fontRef>
+        </p:style>
+      </p:cxnSp>
+      <p:sp>
+        <p:nvSpPr>
+          <p:cNvPr id="17" name="标题 2"/>
+          <p:cNvSpPr txBox="1"/>
+          <p:nvPr/>
+        </p:nvSpPr>
+        <p:spPr>
+          <a:xfrm>
+            <a:off x="4678680" y="5210175"/>
+            <a:ext cx="728345" cy="391160"/>
+          </a:xfrm>
+          <a:prstGeom prst="rect">
+            <a:avLst/>
+          </a:prstGeom>
+        </p:spPr>
+        <p:txBody>
+          <a:bodyPr vert="horz" lIns="91440" tIns="45720" rIns="91440" bIns="45720" rtlCol="0" anchor="ctr">
+            <a:noAutofit/>
+          </a:bodyPr>
+          <a:lstStyle>
+            <a:lvl1pPr marL="0" algn="l" defTabSz="685800" rtl="0" eaLnBrk="1" latinLnBrk="0" hangingPunct="1">
+              <a:lnSpc>
+                <a:spcPct val="100000"/>
+              </a:lnSpc>
+              <a:spcBef>
+                <a:spcPct val="0"/>
+              </a:spcBef>
+              <a:buNone/>
+              <a:defRPr lang="en-US" sz="3200" b="1" kern="1200" dirty="0">
+                <a:solidFill>
+                  <a:srgbClr val="002060"/>
+                </a:solidFill>
+                <a:latin typeface="微软雅黑" panose="020B0503020204020204" pitchFamily="34" charset="-122"/>
+                <a:ea typeface="微软雅黑" panose="020B0503020204020204" pitchFamily="34" charset="-122"/>
+                <a:cs typeface="+mn-cs"/>
+              </a:defRPr>
+            </a:lvl1pPr>
+          </a:lstStyle>
+          <a:p>
+            <a:r>
+              <a:rPr lang="zh-CN" altLang="en-US" sz="1400" dirty="0">
+                <a:solidFill>
+                  <a:srgbClr val="FF0000"/>
+                </a:solidFill>
+                <a:latin typeface="Arial" panose="020B0604020202020204" pitchFamily="34" charset="0"/>
+                <a:sym typeface="Arial" panose="020B0604020202020204" pitchFamily="34" charset="0"/>
+              </a:rPr>
+              <a:t>输入层</a:t>
+            </a:r>
+            <a:endParaRPr lang="zh-CN" altLang="en-US" sz="1400" dirty="0">
+              <a:solidFill>
+                <a:srgbClr val="FF0000"/>
+              </a:solidFill>
+              <a:latin typeface="Arial" panose="020B0604020202020204" pitchFamily="34" charset="0"/>
+              <a:sym typeface="Arial" panose="020B0604020202020204" pitchFamily="34" charset="0"/>
+            </a:endParaRPr>
+          </a:p>
+        </p:txBody>
+      </p:sp>
+      <p:cxnSp>
+        <p:nvCxnSpPr>
+          <p:cNvPr id="18" name="直接箭头连接符 17"/>
+          <p:cNvCxnSpPr>
+            <a:endCxn id="19" idx="3"/>
+          </p:cNvCxnSpPr>
+          <p:nvPr/>
+        </p:nvCxnSpPr>
+        <p:spPr>
+          <a:xfrm flipH="1" flipV="1">
+            <a:off x="6026785" y="3168015"/>
+            <a:ext cx="1590040" cy="400685"/>
+          </a:xfrm>
+          <a:prstGeom prst="straightConnector1">
+            <a:avLst/>
+          </a:prstGeom>
+          <a:ln w="12700" cmpd="sng">
+            <a:solidFill>
+              <a:srgbClr val="FF0000"/>
+            </a:solidFill>
+            <a:prstDash val="dash"/>
+            <a:tailEnd type="arrow"/>
+          </a:ln>
+        </p:spPr>
+        <p:style>
+          <a:lnRef idx="2">
+            <a:schemeClr val="accent1"/>
+          </a:lnRef>
+          <a:fillRef idx="0">
+            <a:srgbClr val="FFFFFF"/>
+          </a:fillRef>
+          <a:effectRef idx="0">
+            <a:srgbClr val="FFFFFF"/>
+          </a:effectRef>
+          <a:fontRef idx="minor">
+            <a:schemeClr val="tx1"/>
+          </a:fontRef>
+        </p:style>
+      </p:cxnSp>
+      <p:sp>
+        <p:nvSpPr>
+          <p:cNvPr id="19" name="标题 2"/>
+          <p:cNvSpPr txBox="1"/>
+          <p:nvPr/>
+        </p:nvSpPr>
+        <p:spPr>
+          <a:xfrm>
+            <a:off x="5298440" y="2972435"/>
+            <a:ext cx="728345" cy="391160"/>
+          </a:xfrm>
+          <a:prstGeom prst="rect">
+            <a:avLst/>
+          </a:prstGeom>
+        </p:spPr>
+        <p:txBody>
+          <a:bodyPr vert="horz" lIns="91440" tIns="45720" rIns="91440" bIns="45720" rtlCol="0" anchor="ctr">
+            <a:noAutofit/>
+          </a:bodyPr>
+          <a:lstStyle>
+            <a:lvl1pPr marL="0" algn="l" defTabSz="685800" rtl="0" eaLnBrk="1" latinLnBrk="0" hangingPunct="1">
+              <a:lnSpc>
+                <a:spcPct val="100000"/>
+              </a:lnSpc>
+              <a:spcBef>
+                <a:spcPct val="0"/>
+              </a:spcBef>
+              <a:buNone/>
+              <a:defRPr lang="en-US" sz="3200" b="1" kern="1200" dirty="0">
+                <a:solidFill>
+                  <a:srgbClr val="002060"/>
+                </a:solidFill>
+                <a:latin typeface="微软雅黑" panose="020B0503020204020204" pitchFamily="34" charset="-122"/>
+                <a:ea typeface="微软雅黑" panose="020B0503020204020204" pitchFamily="34" charset="-122"/>
+                <a:cs typeface="+mn-cs"/>
+              </a:defRPr>
+            </a:lvl1pPr>
+          </a:lstStyle>
+          <a:p>
+            <a:r>
+              <a:rPr lang="zh-CN" altLang="en-US" sz="1400" dirty="0">
+                <a:solidFill>
+                  <a:srgbClr val="FF0000"/>
+                </a:solidFill>
+                <a:latin typeface="Arial" panose="020B0604020202020204" pitchFamily="34" charset="0"/>
+                <a:sym typeface="Arial" panose="020B0604020202020204" pitchFamily="34" charset="0"/>
+              </a:rPr>
+              <a:t>隐藏层</a:t>
+            </a:r>
+            <a:endParaRPr lang="zh-CN" altLang="en-US" sz="1400" dirty="0">
+              <a:solidFill>
+                <a:srgbClr val="FF0000"/>
+              </a:solidFill>
+              <a:latin typeface="Arial" panose="020B0604020202020204" pitchFamily="34" charset="0"/>
+              <a:sym typeface="Arial" panose="020B0604020202020204" pitchFamily="34" charset="0"/>
+            </a:endParaRPr>
+          </a:p>
+        </p:txBody>
+      </p:sp>
+      <p:sp>
+        <p:nvSpPr>
+          <p:cNvPr id="20" name="标题 2"/>
+          <p:cNvSpPr txBox="1"/>
+          <p:nvPr/>
+        </p:nvSpPr>
+        <p:spPr>
+          <a:xfrm>
+            <a:off x="384810" y="1910715"/>
+            <a:ext cx="3644265" cy="2501265"/>
+          </a:xfrm>
+          <a:prstGeom prst="rect">
+            <a:avLst/>
+          </a:prstGeom>
+        </p:spPr>
+        <p:txBody>
+          <a:bodyPr vert="horz" lIns="91440" tIns="45720" rIns="91440" bIns="45720" rtlCol="0" anchor="ctr">
+            <a:noAutofit/>
+          </a:bodyPr>
+          <a:lstStyle>
+            <a:lvl1pPr marL="0" algn="l" defTabSz="685800" rtl="0" eaLnBrk="1" latinLnBrk="0" hangingPunct="1">
+              <a:lnSpc>
+                <a:spcPct val="100000"/>
+              </a:lnSpc>
+              <a:spcBef>
+                <a:spcPct val="0"/>
+              </a:spcBef>
+              <a:buNone/>
+              <a:defRPr lang="en-US" sz="3200" b="1" kern="1200" dirty="0">
+                <a:solidFill>
+                  <a:srgbClr val="002060"/>
+                </a:solidFill>
+                <a:latin typeface="微软雅黑" panose="020B0503020204020204" pitchFamily="34" charset="-122"/>
+                <a:ea typeface="微软雅黑" panose="020B0503020204020204" pitchFamily="34" charset="-122"/>
+                <a:cs typeface="+mn-cs"/>
+              </a:defRPr>
+            </a:lvl1pPr>
+          </a:lstStyle>
+          <a:p>
+            <a:r>
+              <a:rPr altLang="zh-CN" sz="2000" dirty="0">
+                <a:solidFill>
+                  <a:srgbClr val="FF0000"/>
+                </a:solidFill>
+                <a:latin typeface="Arial" panose="020B0604020202020204" pitchFamily="34" charset="0"/>
+                <a:sym typeface="Arial" panose="020B0604020202020204" pitchFamily="34" charset="0"/>
+              </a:rPr>
+              <a:t>C(Vocab_size, n_embd):</a:t>
+            </a:r>
+            <a:endParaRPr altLang="zh-CN" sz="2000" dirty="0">
+              <a:latin typeface="Arial" panose="020B0604020202020204" pitchFamily="34" charset="0"/>
+              <a:sym typeface="Arial" panose="020B0604020202020204" pitchFamily="34" charset="0"/>
+            </a:endParaRPr>
+          </a:p>
+          <a:p>
+            <a:pPr indent="457200"/>
+            <a:r>
+              <a:rPr lang="zh-CN" altLang="en-US" sz="2000" dirty="0">
+                <a:latin typeface="Arial" panose="020B0604020202020204" pitchFamily="34" charset="0"/>
+                <a:sym typeface="Arial" panose="020B0604020202020204" pitchFamily="34" charset="0"/>
+              </a:rPr>
+              <a:t>将一个字母</a:t>
+            </a:r>
+            <a:r>
+              <a:rPr altLang="zh-CN" sz="2000" dirty="0">
+                <a:latin typeface="Arial" panose="020B0604020202020204" pitchFamily="34" charset="0"/>
+                <a:sym typeface="Arial" panose="020B0604020202020204" pitchFamily="34" charset="0"/>
+              </a:rPr>
+              <a:t>(</a:t>
+            </a:r>
+            <a:r>
+              <a:rPr lang="zh-CN" altLang="en-US" sz="2000" dirty="0">
+                <a:latin typeface="Arial" panose="020B0604020202020204" pitchFamily="34" charset="0"/>
+                <a:sym typeface="Arial" panose="020B0604020202020204" pitchFamily="34" charset="0"/>
+              </a:rPr>
+              <a:t>或单词</a:t>
+            </a:r>
+            <a:r>
+              <a:rPr altLang="zh-CN" sz="2000" dirty="0">
+                <a:latin typeface="Arial" panose="020B0604020202020204" pitchFamily="34" charset="0"/>
+                <a:sym typeface="Arial" panose="020B0604020202020204" pitchFamily="34" charset="0"/>
+              </a:rPr>
+              <a:t>)</a:t>
+            </a:r>
+            <a:r>
+              <a:rPr lang="zh-CN" altLang="en-US" sz="2000" dirty="0">
+                <a:latin typeface="Arial" panose="020B0604020202020204" pitchFamily="34" charset="0"/>
+                <a:sym typeface="Arial" panose="020B0604020202020204" pitchFamily="34" charset="0"/>
+              </a:rPr>
+              <a:t>转成</a:t>
+            </a:r>
+            <a:r>
+              <a:rPr altLang="zh-CN" sz="2000" dirty="0">
+                <a:latin typeface="Arial" panose="020B0604020202020204" pitchFamily="34" charset="0"/>
+                <a:sym typeface="Arial" panose="020B0604020202020204" pitchFamily="34" charset="0"/>
+              </a:rPr>
+              <a:t>n</a:t>
+            </a:r>
+            <a:r>
+              <a:rPr lang="zh-CN" altLang="en-US" sz="2000" dirty="0">
+                <a:latin typeface="Arial" panose="020B0604020202020204" pitchFamily="34" charset="0"/>
+                <a:sym typeface="Arial" panose="020B0604020202020204" pitchFamily="34" charset="0"/>
+              </a:rPr>
+              <a:t>维特征向量上的一个点，是网络结构参数的一部分。</a:t>
+            </a:r>
+            <a:endParaRPr lang="zh-CN" altLang="en-US" sz="2000" dirty="0">
+              <a:latin typeface="Arial" panose="020B0604020202020204" pitchFamily="34" charset="0"/>
+              <a:sym typeface="Arial" panose="020B0604020202020204" pitchFamily="34" charset="0"/>
+            </a:endParaRPr>
+          </a:p>
+          <a:p>
+            <a:pPr indent="457200"/>
+            <a:r>
+              <a:rPr lang="zh-CN" altLang="en-US" sz="2000" dirty="0">
+                <a:latin typeface="Arial" panose="020B0604020202020204" pitchFamily="34" charset="0"/>
+                <a:sym typeface="Arial" panose="020B0604020202020204" pitchFamily="34" charset="0"/>
+              </a:rPr>
+              <a:t>考虑</a:t>
+            </a:r>
+            <a:r>
+              <a:rPr lang="zh-CN" altLang="en-US" sz="2000" dirty="0">
+                <a:solidFill>
+                  <a:srgbClr val="FF0000"/>
+                </a:solidFill>
+                <a:latin typeface="Arial" panose="020B0604020202020204" pitchFamily="34" charset="0"/>
+                <a:sym typeface="Arial" panose="020B0604020202020204" pitchFamily="34" charset="0"/>
+              </a:rPr>
+              <a:t>上下文</a:t>
+            </a:r>
+            <a:r>
+              <a:rPr lang="zh-CN" altLang="en-US" sz="2000" dirty="0">
+                <a:latin typeface="Arial" panose="020B0604020202020204" pitchFamily="34" charset="0"/>
+                <a:sym typeface="Arial" panose="020B0604020202020204" pitchFamily="34" charset="0"/>
+              </a:rPr>
+              <a:t>关系，通过前面的</a:t>
+            </a:r>
+            <a:r>
+              <a:rPr altLang="zh-CN" sz="2000" dirty="0">
+                <a:latin typeface="Arial" panose="020B0604020202020204" pitchFamily="34" charset="0"/>
+                <a:sym typeface="Arial" panose="020B0604020202020204" pitchFamily="34" charset="0"/>
+              </a:rPr>
+              <a:t>m</a:t>
+            </a:r>
+            <a:r>
+              <a:rPr lang="zh-CN" altLang="en-US" sz="2000" dirty="0">
+                <a:latin typeface="Arial" panose="020B0604020202020204" pitchFamily="34" charset="0"/>
+                <a:sym typeface="Arial" panose="020B0604020202020204" pitchFamily="34" charset="0"/>
+              </a:rPr>
+              <a:t>个字母</a:t>
+            </a:r>
+            <a:r>
+              <a:rPr altLang="zh-CN" sz="2000" dirty="0">
+                <a:latin typeface="Arial" panose="020B0604020202020204" pitchFamily="34" charset="0"/>
+                <a:sym typeface="Arial" panose="020B0604020202020204" pitchFamily="34" charset="0"/>
+              </a:rPr>
+              <a:t>/</a:t>
+            </a:r>
+            <a:r>
+              <a:rPr lang="zh-CN" altLang="en-US" sz="2000" dirty="0">
+                <a:latin typeface="Arial" panose="020B0604020202020204" pitchFamily="34" charset="0"/>
+                <a:sym typeface="Arial" panose="020B0604020202020204" pitchFamily="34" charset="0"/>
+              </a:rPr>
+              <a:t>单词输出下一个</a:t>
+            </a:r>
+            <a:r>
+              <a:rPr lang="zh-CN" altLang="en-US" sz="2000" dirty="0">
+                <a:latin typeface="Arial" panose="020B0604020202020204" pitchFamily="34" charset="0"/>
+                <a:sym typeface="Arial" panose="020B0604020202020204" pitchFamily="34" charset="0"/>
+              </a:rPr>
+              <a:t>结果</a:t>
+            </a:r>
+            <a:endParaRPr lang="zh-CN" altLang="en-US" sz="2000" dirty="0">
+              <a:latin typeface="Arial" panose="020B0604020202020204" pitchFamily="34" charset="0"/>
+              <a:sym typeface="Arial" panose="020B0604020202020204" pitchFamily="34" charset="0"/>
+            </a:endParaRPr>
+          </a:p>
+        </p:txBody>
+      </p:sp>
+      <p:sp>
+        <p:nvSpPr>
+          <p:cNvPr id="21" name="标题 2"/>
+          <p:cNvSpPr txBox="1"/>
+          <p:nvPr/>
+        </p:nvSpPr>
+        <p:spPr>
+          <a:xfrm>
+            <a:off x="173990" y="5089525"/>
+            <a:ext cx="3527425" cy="918210"/>
+          </a:xfrm>
+          <a:prstGeom prst="rect">
+            <a:avLst/>
+          </a:prstGeom>
+        </p:spPr>
+        <p:txBody>
+          <a:bodyPr vert="horz" lIns="91440" tIns="45720" rIns="91440" bIns="45720" rtlCol="0" anchor="ctr">
+            <a:noAutofit/>
+          </a:bodyPr>
+          <a:lstStyle>
+            <a:lvl1pPr marL="0" algn="l" defTabSz="685800" rtl="0" eaLnBrk="1" latinLnBrk="0" hangingPunct="1">
+              <a:lnSpc>
+                <a:spcPct val="100000"/>
+              </a:lnSpc>
+              <a:spcBef>
+                <a:spcPct val="0"/>
+              </a:spcBef>
+              <a:buNone/>
+              <a:defRPr lang="en-US" sz="3200" b="1" kern="1200" dirty="0">
+                <a:solidFill>
+                  <a:srgbClr val="002060"/>
+                </a:solidFill>
+                <a:latin typeface="微软雅黑" panose="020B0503020204020204" pitchFamily="34" charset="-122"/>
+                <a:ea typeface="微软雅黑" panose="020B0503020204020204" pitchFamily="34" charset="-122"/>
+                <a:cs typeface="+mn-cs"/>
+              </a:defRPr>
+            </a:lvl1pPr>
+          </a:lstStyle>
+          <a:p>
+            <a:pPr indent="457200"/>
+            <a:r>
+              <a:rPr lang="zh-CN" altLang="en-US" sz="2000" dirty="0">
+                <a:solidFill>
+                  <a:srgbClr val="FF0000"/>
+                </a:solidFill>
+                <a:latin typeface="Arial" panose="020B0604020202020204" pitchFamily="34" charset="0"/>
+                <a:sym typeface="Arial" panose="020B0604020202020204" pitchFamily="34" charset="0"/>
+              </a:rPr>
+              <a:t>输出下一个结果的概率</a:t>
+            </a:r>
+            <a:endParaRPr lang="zh-CN" altLang="en-US" sz="2000" dirty="0">
+              <a:solidFill>
+                <a:srgbClr val="FF0000"/>
+              </a:solidFill>
               <a:latin typeface="Arial" panose="020B0604020202020204" pitchFamily="34" charset="0"/>
               <a:sym typeface="Arial" panose="020B0604020202020204" pitchFamily="34" charset="0"/>
             </a:endParaRPr>
@@ -11607,16 +12333,40 @@
           </a:fontRef>
         </p:style>
       </p:cxnSp>
-      <p:sp>
-        <p:nvSpPr>
-          <p:cNvPr id="6" name="标题 2"/>
+      <p:pic>
+        <p:nvPicPr>
+          <p:cNvPr id="2" name="图片 1"/>
+          <p:cNvPicPr>
+            <a:picLocks noChangeAspect="1"/>
+          </p:cNvPicPr>
+          <p:nvPr/>
+        </p:nvPicPr>
+        <p:blipFill>
+          <a:blip r:embed="rId1"/>
+          <a:stretch>
+            <a:fillRect/>
+          </a:stretch>
+        </p:blipFill>
+        <p:spPr>
+          <a:xfrm>
+            <a:off x="1746885" y="2749550"/>
+            <a:ext cx="7753350" cy="2642870"/>
+          </a:xfrm>
+          <a:prstGeom prst="rect">
+            <a:avLst/>
+          </a:prstGeom>
+        </p:spPr>
+      </p:pic>
+      <p:sp>
+        <p:nvSpPr>
+          <p:cNvPr id="5" name="标题 2"/>
           <p:cNvSpPr txBox="1"/>
           <p:nvPr/>
         </p:nvSpPr>
         <p:spPr>
           <a:xfrm>
-            <a:off x="807085" y="1290955"/>
-            <a:ext cx="9041765" cy="650875"/>
+            <a:off x="784860" y="945515"/>
+            <a:ext cx="4113530" cy="650875"/>
           </a:xfrm>
           <a:prstGeom prst="rect">
             <a:avLst/>
@@ -11647,43 +12397,68 @@
           </a:lstStyle>
           <a:p>
             <a:r>
-              <a:rPr lang="en-US" altLang="zh-CN" sz="2000" dirty="0">
-                <a:latin typeface="Arial" panose="020B0604020202020204" pitchFamily="34" charset="0"/>
-                <a:sym typeface="Arial" panose="020B0604020202020204" pitchFamily="34" charset="0"/>
-              </a:rPr>
-              <a:t>Batch Normalization: </a:t>
-            </a:r>
-            <a:r>
-              <a:rPr lang="zh-CN" altLang="en-US" sz="2000" dirty="0">
-                <a:latin typeface="Arial" panose="020B0604020202020204" pitchFamily="34" charset="0"/>
-                <a:sym typeface="Arial" panose="020B0604020202020204" pitchFamily="34" charset="0"/>
-              </a:rPr>
-              <a:t>用于激活函数之前，有属于自己的偏差，并且前面的神经元就没有必要出现自己的</a:t>
-            </a:r>
-            <a:r>
-              <a:rPr lang="zh-CN" altLang="en-US" sz="2000" dirty="0">
-                <a:latin typeface="Arial" panose="020B0604020202020204" pitchFamily="34" charset="0"/>
-                <a:sym typeface="Arial" panose="020B0604020202020204" pitchFamily="34" charset="0"/>
-              </a:rPr>
-              <a:t>偏差</a:t>
-            </a:r>
-            <a:endParaRPr lang="zh-CN" altLang="en-US" sz="2000" dirty="0">
+              <a:rPr altLang="zh-CN" sz="2000" dirty="0">
+                <a:latin typeface="Arial" panose="020B0604020202020204" pitchFamily="34" charset="0"/>
+                <a:sym typeface="Arial" panose="020B0604020202020204" pitchFamily="34" charset="0"/>
+              </a:rPr>
+              <a:t>Kaiming(He) Normalization</a:t>
+            </a:r>
+            <a:endParaRPr altLang="zh-CN" sz="2000" dirty="0">
               <a:latin typeface="Arial" panose="020B0604020202020204" pitchFamily="34" charset="0"/>
               <a:sym typeface="Arial" panose="020B0604020202020204" pitchFamily="34" charset="0"/>
             </a:endParaRPr>
           </a:p>
         </p:txBody>
       </p:sp>
-      <p:sp>
-        <p:nvSpPr>
-          <p:cNvPr id="2" name="标题 2"/>
+      <p:cxnSp>
+        <p:nvCxnSpPr>
+          <p:cNvPr id="6" name="直接箭头连接符 5"/>
+          <p:cNvCxnSpPr/>
+          <p:nvPr/>
+        </p:nvCxnSpPr>
+        <p:spPr>
+          <a:xfrm>
+            <a:off x="4483735" y="5107940"/>
+            <a:ext cx="1384300" cy="798195"/>
+          </a:xfrm>
+          <a:prstGeom prst="straightConnector1">
+            <a:avLst/>
+          </a:prstGeom>
+          <a:ln w="12700" cmpd="sng">
+            <a:solidFill>
+              <a:schemeClr val="accent1">
+                <a:shade val="50000"/>
+              </a:schemeClr>
+            </a:solidFill>
+            <a:prstDash val="dash"/>
+            <a:tailEnd type="arrow"/>
+          </a:ln>
+        </p:spPr>
+        <p:style>
+          <a:lnRef idx="2">
+            <a:schemeClr val="accent1"/>
+          </a:lnRef>
+          <a:fillRef idx="0">
+            <a:srgbClr val="FFFFFF"/>
+          </a:fillRef>
+          <a:effectRef idx="0">
+            <a:srgbClr val="FFFFFF"/>
+          </a:effectRef>
+          <a:fontRef idx="minor">
+            <a:schemeClr val="tx1"/>
+          </a:fontRef>
+        </p:style>
+      </p:cxnSp>
+      <p:sp>
+        <p:nvSpPr>
+          <p:cNvPr id="9" name="标题 2"/>
           <p:cNvSpPr txBox="1"/>
           <p:nvPr/>
         </p:nvSpPr>
         <p:spPr>
           <a:xfrm>
-            <a:off x="1146810" y="4771390"/>
-            <a:ext cx="9041765" cy="650875"/>
+            <a:off x="4958715" y="5974715"/>
+            <a:ext cx="6019165" cy="515620"/>
           </a:xfrm>
           <a:prstGeom prst="rect">
             <a:avLst/>
@@ -11714,27 +12489,75 @@
           </a:lstStyle>
           <a:p>
             <a:r>
-              <a:rPr lang="en-US" altLang="zh-CN" sz="2000" dirty="0">
-                <a:latin typeface="Arial" panose="020B0604020202020204" pitchFamily="34" charset="0"/>
-                <a:sym typeface="Arial" panose="020B0604020202020204" pitchFamily="34" charset="0"/>
-              </a:rPr>
-              <a:t>bnmean_running &amp; bnstd_running: </a:t>
-            </a:r>
-            <a:r>
               <a:rPr lang="zh-CN" altLang="en-US" sz="2000" dirty="0">
                 <a:latin typeface="Arial" panose="020B0604020202020204" pitchFamily="34" charset="0"/>
                 <a:sym typeface="Arial" panose="020B0604020202020204" pitchFamily="34" charset="0"/>
               </a:rPr>
-              <a:t>并不是通过反向传播实现，而是在训练过程中不断迭代生成</a:t>
+              <a:t>利用这个</a:t>
             </a:r>
             <a:r>
               <a:rPr altLang="zh-CN" sz="2000" dirty="0">
                 <a:latin typeface="Arial" panose="020B0604020202020204" pitchFamily="34" charset="0"/>
                 <a:sym typeface="Arial" panose="020B0604020202020204" pitchFamily="34" charset="0"/>
               </a:rPr>
-              <a:t> ---&gt; with torch.no_grad():</a:t>
-            </a:r>
-            <a:endParaRPr altLang="zh-CN" sz="2000" dirty="0">
+              <a:t>gain(</a:t>
+            </a:r>
+            <a:r>
+              <a:rPr lang="zh-CN" altLang="en-US" sz="2000" dirty="0">
+                <a:solidFill>
+                  <a:srgbClr val="FF0000"/>
+                </a:solidFill>
+                <a:latin typeface="Arial" panose="020B0604020202020204" pitchFamily="34" charset="0"/>
+                <a:sym typeface="Arial" panose="020B0604020202020204" pitchFamily="34" charset="0"/>
+              </a:rPr>
+              <a:t>经验得到</a:t>
+            </a:r>
+            <a:r>
+              <a:rPr altLang="zh-CN" sz="2000" dirty="0">
+                <a:solidFill>
+                  <a:srgbClr val="FF0000"/>
+                </a:solidFill>
+                <a:latin typeface="Arial" panose="020B0604020202020204" pitchFamily="34" charset="0"/>
+                <a:sym typeface="Arial" panose="020B0604020202020204" pitchFamily="34" charset="0"/>
+              </a:rPr>
+              <a:t>5/3</a:t>
+            </a:r>
+            <a:r>
+              <a:rPr altLang="zh-CN" sz="2000" dirty="0">
+                <a:latin typeface="Arial" panose="020B0604020202020204" pitchFamily="34" charset="0"/>
+                <a:sym typeface="Arial" panose="020B0604020202020204" pitchFamily="34" charset="0"/>
+              </a:rPr>
+              <a:t>)</a:t>
+            </a:r>
+            <a:r>
+              <a:rPr lang="zh-CN" altLang="en-US" sz="2000" dirty="0">
+                <a:latin typeface="Arial" panose="020B0604020202020204" pitchFamily="34" charset="0"/>
+                <a:sym typeface="Arial" panose="020B0604020202020204" pitchFamily="34" charset="0"/>
+              </a:rPr>
+              <a:t>来对抗</a:t>
+            </a:r>
+            <a:r>
+              <a:rPr altLang="zh-CN" sz="2000" dirty="0">
+                <a:latin typeface="Arial" panose="020B0604020202020204" pitchFamily="34" charset="0"/>
+                <a:sym typeface="Arial" panose="020B0604020202020204" pitchFamily="34" charset="0"/>
+              </a:rPr>
+              <a:t>tanh</a:t>
+            </a:r>
+            <a:r>
+              <a:rPr lang="zh-CN" altLang="en-US" sz="2000" dirty="0">
+                <a:latin typeface="Arial" panose="020B0604020202020204" pitchFamily="34" charset="0"/>
+                <a:sym typeface="Arial" panose="020B0604020202020204" pitchFamily="34" charset="0"/>
+              </a:rPr>
+              <a:t>造成的</a:t>
+            </a:r>
+            <a:r>
+              <a:rPr lang="zh-CN" altLang="en-US" sz="2000" dirty="0">
+                <a:latin typeface="Arial" panose="020B0604020202020204" pitchFamily="34" charset="0"/>
+                <a:sym typeface="Arial" panose="020B0604020202020204" pitchFamily="34" charset="0"/>
+              </a:rPr>
+              <a:t>挤压</a:t>
+            </a:r>
+            <a:endParaRPr lang="zh-CN" altLang="en-US" sz="2000" dirty="0">
               <a:latin typeface="Arial" panose="020B0604020202020204" pitchFamily="34" charset="0"/>
               <a:sym typeface="Arial" panose="020B0604020202020204" pitchFamily="34" charset="0"/>
             </a:endParaRPr>
@@ -11743,14 +12566,14 @@
       </p:sp>
       <p:sp>
         <p:nvSpPr>
-          <p:cNvPr id="5" name="标题 2"/>
+          <p:cNvPr id="20" name="标题 2"/>
           <p:cNvSpPr txBox="1"/>
           <p:nvPr/>
         </p:nvSpPr>
         <p:spPr>
           <a:xfrm>
-            <a:off x="934085" y="2173605"/>
-            <a:ext cx="9041765" cy="650875"/>
+            <a:off x="384810" y="1910715"/>
+            <a:ext cx="3819525" cy="630555"/>
           </a:xfrm>
           <a:prstGeom prst="rect">
             <a:avLst/>
@@ -11780,79 +12603,83 @@
             </a:lvl1pPr>
           </a:lstStyle>
           <a:p>
+            <a:pPr indent="457200"/>
             <a:r>
               <a:rPr lang="zh-CN" altLang="en-US" sz="2000" dirty="0">
-                <a:latin typeface="Arial" panose="020B0604020202020204" pitchFamily="34" charset="0"/>
-                <a:sym typeface="Arial" panose="020B0604020202020204" pitchFamily="34" charset="0"/>
-              </a:rPr>
-              <a:t>为什么使用</a:t>
-            </a:r>
-            <a:r>
-              <a:rPr altLang="zh-CN" sz="2000" dirty="0">
-                <a:latin typeface="Arial" panose="020B0604020202020204" pitchFamily="34" charset="0"/>
-                <a:sym typeface="Arial" panose="020B0604020202020204" pitchFamily="34" charset="0"/>
-              </a:rPr>
-              <a:t>BN</a:t>
+                <a:solidFill>
+                  <a:srgbClr val="FF0000"/>
+                </a:solidFill>
+                <a:latin typeface="Arial" panose="020B0604020202020204" pitchFamily="34" charset="0"/>
+                <a:sym typeface="Arial" panose="020B0604020202020204" pitchFamily="34" charset="0"/>
+              </a:rPr>
+              <a:t>初始化网络参数</a:t>
             </a:r>
             <a:r>
               <a:rPr lang="zh-CN" altLang="en-US" sz="2000" dirty="0">
                 <a:latin typeface="Arial" panose="020B0604020202020204" pitchFamily="34" charset="0"/>
                 <a:sym typeface="Arial" panose="020B0604020202020204" pitchFamily="34" charset="0"/>
               </a:rPr>
-              <a:t>层？</a:t>
-            </a:r>
-            <a:r>
-              <a:rPr altLang="zh-CN" sz="2000" dirty="0">
-                <a:latin typeface="Arial" panose="020B0604020202020204" pitchFamily="34" charset="0"/>
-                <a:sym typeface="Arial" panose="020B0604020202020204" pitchFamily="34" charset="0"/>
-              </a:rPr>
-              <a:t> -&gt; tanh</a:t>
+              <a:t>的一种</a:t>
             </a:r>
             <a:r>
               <a:rPr lang="zh-CN" altLang="en-US" sz="2000" dirty="0">
                 <a:latin typeface="Arial" panose="020B0604020202020204" pitchFamily="34" charset="0"/>
                 <a:sym typeface="Arial" panose="020B0604020202020204" pitchFamily="34" charset="0"/>
               </a:rPr>
-              <a:t>有太多的</a:t>
-            </a:r>
-            <a:r>
-              <a:rPr altLang="zh-CN" sz="2000" dirty="0">
-                <a:latin typeface="Arial" panose="020B0604020202020204" pitchFamily="34" charset="0"/>
-                <a:sym typeface="Arial" panose="020B0604020202020204" pitchFamily="34" charset="0"/>
-              </a:rPr>
-              <a:t> 1 </a:t>
-            </a:r>
-            <a:r>
-              <a:rPr lang="zh-CN" altLang="en-US" sz="2000" dirty="0">
-                <a:latin typeface="Arial" panose="020B0604020202020204" pitchFamily="34" charset="0"/>
-                <a:sym typeface="Arial" panose="020B0604020202020204" pitchFamily="34" charset="0"/>
-              </a:rPr>
-              <a:t>和</a:t>
-            </a:r>
-            <a:r>
-              <a:rPr altLang="zh-CN" sz="2000" dirty="0">
-                <a:latin typeface="Arial" panose="020B0604020202020204" pitchFamily="34" charset="0"/>
-                <a:sym typeface="Arial" panose="020B0604020202020204" pitchFamily="34" charset="0"/>
-              </a:rPr>
-              <a:t> -1</a:t>
-            </a:r>
-            <a:endParaRPr altLang="zh-CN" sz="2000" dirty="0">
+              <a:t>方法</a:t>
+            </a:r>
+            <a:endParaRPr lang="zh-CN" altLang="en-US" sz="2000" dirty="0">
               <a:latin typeface="Arial" panose="020B0604020202020204" pitchFamily="34" charset="0"/>
               <a:sym typeface="Arial" panose="020B0604020202020204" pitchFamily="34" charset="0"/>
             </a:endParaRPr>
           </a:p>
         </p:txBody>
       </p:sp>
-      <p:sp>
-        <p:nvSpPr>
-          <p:cNvPr id="9" name="标题 2"/>
+      <p:cxnSp>
+        <p:nvCxnSpPr>
+          <p:cNvPr id="11" name="直接箭头连接符 10"/>
+          <p:cNvCxnSpPr>
+            <a:stCxn id="20" idx="3"/>
+          </p:cNvCxnSpPr>
+          <p:nvPr/>
+        </p:nvCxnSpPr>
+        <p:spPr>
+          <a:xfrm flipV="1">
+            <a:off x="4204335" y="2221865"/>
+            <a:ext cx="2533650" cy="4445"/>
+          </a:xfrm>
+          <a:prstGeom prst="straightConnector1">
+            <a:avLst/>
+          </a:prstGeom>
+          <a:ln>
+            <a:tailEnd type="arrow"/>
+          </a:ln>
+        </p:spPr>
+        <p:style>
+          <a:lnRef idx="2">
+            <a:schemeClr val="accent1"/>
+          </a:lnRef>
+          <a:fillRef idx="0">
+            <a:srgbClr val="FFFFFF"/>
+          </a:fillRef>
+          <a:effectRef idx="0">
+            <a:srgbClr val="FFFFFF"/>
+          </a:effectRef>
+          <a:fontRef idx="minor">
+            <a:schemeClr val="tx1"/>
+          </a:fontRef>
+        </p:style>
+      </p:cxnSp>
+      <p:sp>
+        <p:nvSpPr>
+          <p:cNvPr id="13" name="标题 2"/>
           <p:cNvSpPr txBox="1"/>
           <p:nvPr/>
         </p:nvSpPr>
         <p:spPr>
           <a:xfrm>
-            <a:off x="1002665" y="2951480"/>
-            <a:ext cx="9041765" cy="650875"/>
+            <a:off x="6737985" y="1910715"/>
+            <a:ext cx="2347595" cy="630555"/>
           </a:xfrm>
           <a:prstGeom prst="rect">
             <a:avLst/>
@@ -11882,35 +12709,31 @@
             </a:lvl1pPr>
           </a:lstStyle>
           <a:p>
+            <a:pPr indent="457200"/>
             <a:r>
               <a:rPr lang="zh-CN" altLang="en-US" sz="2000" dirty="0">
-                <a:latin typeface="Arial" panose="020B0604020202020204" pitchFamily="34" charset="0"/>
-                <a:sym typeface="Arial" panose="020B0604020202020204" pitchFamily="34" charset="0"/>
-              </a:rPr>
-              <a:t>数学公式</a:t>
-            </a:r>
-            <a:r>
-              <a:rPr altLang="zh-CN" sz="2000" dirty="0">
-                <a:latin typeface="Arial" panose="020B0604020202020204" pitchFamily="34" charset="0"/>
-                <a:sym typeface="Arial" panose="020B0604020202020204" pitchFamily="34" charset="0"/>
-              </a:rPr>
-              <a:t> -&gt; </a:t>
+                <a:solidFill>
+                  <a:srgbClr val="FF0000"/>
+                </a:solidFill>
+                <a:latin typeface="Arial" panose="020B0604020202020204" pitchFamily="34" charset="0"/>
+                <a:sym typeface="Arial" panose="020B0604020202020204" pitchFamily="34" charset="0"/>
+              </a:rPr>
+              <a:t>提高训练</a:t>
             </a:r>
             <a:r>
               <a:rPr lang="zh-CN" altLang="en-US" sz="2000" dirty="0">
-                <a:latin typeface="Arial" panose="020B0604020202020204" pitchFamily="34" charset="0"/>
-                <a:sym typeface="Arial" panose="020B0604020202020204" pitchFamily="34" charset="0"/>
-              </a:rPr>
-              <a:t>见</a:t>
-            </a:r>
-            <a:r>
-              <a:rPr lang="zh-CN" altLang="en-US" sz="2000" dirty="0">
-                <a:latin typeface="Arial" panose="020B0604020202020204" pitchFamily="34" charset="0"/>
-                <a:sym typeface="Arial" panose="020B0604020202020204" pitchFamily="34" charset="0"/>
-              </a:rPr>
-              <a:t>论文</a:t>
+                <a:solidFill>
+                  <a:srgbClr val="FF0000"/>
+                </a:solidFill>
+                <a:latin typeface="Arial" panose="020B0604020202020204" pitchFamily="34" charset="0"/>
+                <a:sym typeface="Arial" panose="020B0604020202020204" pitchFamily="34" charset="0"/>
+              </a:rPr>
+              <a:t>质量</a:t>
             </a:r>
             <a:endParaRPr lang="zh-CN" altLang="en-US" sz="2000" dirty="0">
+              <a:solidFill>
+                <a:srgbClr val="FF0000"/>
+              </a:solidFill>
               <a:latin typeface="Arial" panose="020B0604020202020204" pitchFamily="34" charset="0"/>
               <a:sym typeface="Arial" panose="020B0604020202020204" pitchFamily="34" charset="0"/>
             </a:endParaRPr>
@@ -11927,6 +12750,2627 @@
 </file>
 
 <file path=ppt/slides/slide6.xml><?xml version="1.0" encoding="utf-8"?>
+<p:sld xmlns:a="http://schemas.openxmlformats.org/drawingml/2006/main" xmlns:r="http://schemas.openxmlformats.org/officeDocument/2006/relationships" xmlns:p="http://schemas.openxmlformats.org/presentationml/2006/main">
+  <p:cSld>
+    <p:spTree>
+      <p:nvGrpSpPr>
+        <p:cNvPr id="1" name=""/>
+        <p:cNvGrpSpPr/>
+        <p:nvPr/>
+      </p:nvGrpSpPr>
+      <p:grpSpPr>
+        <a:xfrm>
+          <a:off x="0" y="0"/>
+          <a:ext cx="0" cy="0"/>
+          <a:chOff x="0" y="0"/>
+          <a:chExt cx="0" cy="0"/>
+        </a:xfrm>
+      </p:grpSpPr>
+      <p:sp>
+        <p:nvSpPr>
+          <p:cNvPr id="4" name="矩形 12"/>
+          <p:cNvSpPr>
+            <a:spLocks noChangeArrowheads="1"/>
+          </p:cNvSpPr>
+          <p:nvPr/>
+        </p:nvSpPr>
+        <p:spPr bwMode="auto">
+          <a:xfrm>
+            <a:off x="385125" y="188641"/>
+            <a:ext cx="11568417" cy="583565"/>
+          </a:xfrm>
+          <a:prstGeom prst="rect">
+            <a:avLst/>
+          </a:prstGeom>
+          <a:noFill/>
+          <a:ln>
+            <a:noFill/>
+          </a:ln>
+          <a:extLst>
+            <a:ext uri="{909E8E84-426E-40DD-AFC4-6F175D3DCCD1}">
+              <a14:hiddenFill xmlns:a14="http://schemas.microsoft.com/office/drawing/2010/main">
+                <a:solidFill>
+                  <a:srgbClr val="FFFFFF"/>
+                </a:solidFill>
+              </a14:hiddenFill>
+            </a:ext>
+            <a:ext uri="{91240B29-F687-4F45-9708-019B960494DF}">
+              <a14:hiddenLine xmlns:a14="http://schemas.microsoft.com/office/drawing/2010/main" w="9525">
+                <a:solidFill>
+                  <a:srgbClr val="000000"/>
+                </a:solidFill>
+                <a:miter lim="800000"/>
+                <a:headEnd/>
+                <a:tailEnd/>
+              </a14:hiddenLine>
+            </a:ext>
+          </a:extLst>
+        </p:spPr>
+        <p:txBody>
+          <a:bodyPr wrap="square">
+            <a:spAutoFit/>
+          </a:bodyPr>
+          <a:lstStyle/>
+          <a:p>
+            <a:pPr marL="0" lvl="1" defTabSz="457200">
+              <a:buClr>
+                <a:srgbClr val="FF0000"/>
+              </a:buClr>
+              <a:buSzPct val="100000"/>
+            </a:pPr>
+            <a:r>
+              <a:rPr lang="en-US" altLang="zh-CN" sz="3200" b="1" dirty="0">
+                <a:solidFill>
+                  <a:schemeClr val="bg1"/>
+                </a:solidFill>
+                <a:latin typeface="Arial" panose="020B0604020202020204" pitchFamily="34" charset="0"/>
+                <a:ea typeface="微软雅黑" panose="020B0503020204020204" pitchFamily="34" charset="-122"/>
+                <a:cs typeface="+mn-ea"/>
+                <a:sym typeface="Arial" panose="020B0604020202020204" pitchFamily="34" charset="0"/>
+              </a:rPr>
+              <a:t>1.1</a:t>
+            </a:r>
+            <a:r>
+              <a:rPr lang="zh-CN" altLang="en-US" sz="3200" b="1" dirty="0">
+                <a:solidFill>
+                  <a:schemeClr val="bg1"/>
+                </a:solidFill>
+                <a:latin typeface="Arial" panose="020B0604020202020204" pitchFamily="34" charset="0"/>
+                <a:ea typeface="微软雅黑" panose="020B0503020204020204" pitchFamily="34" charset="-122"/>
+                <a:cs typeface="+mn-ea"/>
+                <a:sym typeface="Arial" panose="020B0604020202020204" pitchFamily="34" charset="0"/>
+              </a:rPr>
+              <a:t>染研究意义</a:t>
+            </a:r>
+            <a:endParaRPr lang="zh-CN" altLang="en-US" sz="3200" b="1" dirty="0">
+              <a:solidFill>
+                <a:schemeClr val="bg1"/>
+              </a:solidFill>
+              <a:latin typeface="Arial" panose="020B0604020202020204" pitchFamily="34" charset="0"/>
+              <a:ea typeface="微软雅黑" panose="020B0503020204020204" pitchFamily="34" charset="-122"/>
+              <a:cs typeface="+mn-ea"/>
+              <a:sym typeface="Arial" panose="020B0604020202020204" pitchFamily="34" charset="0"/>
+            </a:endParaRPr>
+          </a:p>
+        </p:txBody>
+      </p:sp>
+      <p:sp>
+        <p:nvSpPr>
+          <p:cNvPr id="3" name="标题 2"/>
+          <p:cNvSpPr>
+            <a:spLocks noGrp="1"/>
+          </p:cNvSpPr>
+          <p:nvPr>
+            <p:ph type="title"/>
+          </p:nvPr>
+        </p:nvSpPr>
+        <p:spPr/>
+        <p:txBody>
+          <a:bodyPr/>
+          <a:lstStyle/>
+          <a:p>
+            <a:r>
+              <a:rPr lang="en-US" altLang="zh-CN" dirty="0">
+                <a:latin typeface="Arial" panose="020B0604020202020204" pitchFamily="34" charset="0"/>
+                <a:sym typeface="Arial" panose="020B0604020202020204" pitchFamily="34" charset="0"/>
+              </a:rPr>
+              <a:t>3. </a:t>
+            </a:r>
+            <a:r>
+              <a:rPr lang="en-US" altLang="zh-CN" dirty="0">
+                <a:latin typeface="Arial" panose="020B0604020202020204" pitchFamily="34" charset="0"/>
+                <a:sym typeface="Arial" panose="020B0604020202020204" pitchFamily="34" charset="0"/>
+              </a:rPr>
+              <a:t>MLP</a:t>
+            </a:r>
+            <a:endParaRPr lang="en-US" altLang="zh-CN" dirty="0">
+              <a:latin typeface="Arial" panose="020B0604020202020204" pitchFamily="34" charset="0"/>
+              <a:sym typeface="Arial" panose="020B0604020202020204" pitchFamily="34" charset="0"/>
+            </a:endParaRPr>
+          </a:p>
+        </p:txBody>
+      </p:sp>
+      <p:sp>
+        <p:nvSpPr>
+          <p:cNvPr id="7" name="灯片编号占位符 6"/>
+          <p:cNvSpPr>
+            <a:spLocks noGrp="1"/>
+          </p:cNvSpPr>
+          <p:nvPr>
+            <p:ph type="sldNum" sz="quarter" idx="16"/>
+          </p:nvPr>
+        </p:nvSpPr>
+        <p:spPr/>
+        <p:txBody>
+          <a:bodyPr/>
+          <a:lstStyle/>
+          <a:p>
+            <a:pPr>
+              <a:defRPr/>
+            </a:pPr>
+            <a:fld id="{26F565BE-27A9-4834-BA3A-D46EFBA6086A}" type="slidenum">
+              <a:rPr lang="zh-CN" altLang="en-US" smtClean="0">
+                <a:latin typeface="Arial" panose="020B0604020202020204" pitchFamily="34" charset="0"/>
+                <a:sym typeface="Arial" panose="020B0604020202020204" pitchFamily="34" charset="0"/>
+              </a:rPr>
+            </a:fld>
+            <a:endParaRPr lang="zh-CN" altLang="en-US" dirty="0">
+              <a:latin typeface="Arial" panose="020B0604020202020204" pitchFamily="34" charset="0"/>
+              <a:sym typeface="Arial" panose="020B0604020202020204" pitchFamily="34" charset="0"/>
+            </a:endParaRPr>
+          </a:p>
+        </p:txBody>
+      </p:sp>
+      <p:cxnSp>
+        <p:nvCxnSpPr>
+          <p:cNvPr id="8" name="直接连接符 7"/>
+          <p:cNvCxnSpPr/>
+          <p:nvPr/>
+        </p:nvCxnSpPr>
+        <p:spPr>
+          <a:xfrm>
+            <a:off x="0" y="824357"/>
+            <a:ext cx="3877337" cy="0"/>
+          </a:xfrm>
+          <a:prstGeom prst="line">
+            <a:avLst/>
+          </a:prstGeom>
+          <a:ln w="31750">
+            <a:gradFill flip="none" rotWithShape="1">
+              <a:gsLst>
+                <a:gs pos="0">
+                  <a:schemeClr val="accent1">
+                    <a:lumMod val="40000"/>
+                    <a:lumOff val="60000"/>
+                  </a:schemeClr>
+                </a:gs>
+                <a:gs pos="46000">
+                  <a:schemeClr val="accent1">
+                    <a:lumMod val="40000"/>
+                    <a:lumOff val="60000"/>
+                  </a:schemeClr>
+                </a:gs>
+                <a:gs pos="100000">
+                  <a:schemeClr val="accent1">
+                    <a:lumMod val="75000"/>
+                  </a:schemeClr>
+                </a:gs>
+              </a:gsLst>
+              <a:lin ang="10800000" scaled="0"/>
+              <a:tileRect/>
+            </a:gradFill>
+          </a:ln>
+        </p:spPr>
+        <p:style>
+          <a:lnRef idx="3">
+            <a:schemeClr val="dk1"/>
+          </a:lnRef>
+          <a:fillRef idx="0">
+            <a:schemeClr val="dk1"/>
+          </a:fillRef>
+          <a:effectRef idx="2">
+            <a:schemeClr val="dk1"/>
+          </a:effectRef>
+          <a:fontRef idx="minor">
+            <a:schemeClr val="tx1"/>
+          </a:fontRef>
+        </p:style>
+      </p:cxnSp>
+      <p:sp>
+        <p:nvSpPr>
+          <p:cNvPr id="6" name="标题 2"/>
+          <p:cNvSpPr txBox="1"/>
+          <p:nvPr/>
+        </p:nvSpPr>
+        <p:spPr>
+          <a:xfrm>
+            <a:off x="807085" y="942340"/>
+            <a:ext cx="10418445" cy="999490"/>
+          </a:xfrm>
+          <a:prstGeom prst="rect">
+            <a:avLst/>
+          </a:prstGeom>
+        </p:spPr>
+        <p:txBody>
+          <a:bodyPr vert="horz" lIns="91440" tIns="45720" rIns="91440" bIns="45720" rtlCol="0" anchor="ctr">
+            <a:noAutofit/>
+          </a:bodyPr>
+          <a:lstStyle>
+            <a:lvl1pPr marL="0" algn="l" defTabSz="685800" rtl="0" eaLnBrk="1" latinLnBrk="0" hangingPunct="1">
+              <a:lnSpc>
+                <a:spcPct val="100000"/>
+              </a:lnSpc>
+              <a:spcBef>
+                <a:spcPct val="0"/>
+              </a:spcBef>
+              <a:buNone/>
+              <a:defRPr lang="en-US" sz="3200" b="1" kern="1200" dirty="0">
+                <a:solidFill>
+                  <a:srgbClr val="002060"/>
+                </a:solidFill>
+                <a:latin typeface="微软雅黑" panose="020B0503020204020204" pitchFamily="34" charset="-122"/>
+                <a:ea typeface="微软雅黑" panose="020B0503020204020204" pitchFamily="34" charset="-122"/>
+                <a:cs typeface="+mn-cs"/>
+              </a:defRPr>
+            </a:lvl1pPr>
+          </a:lstStyle>
+          <a:p>
+            <a:r>
+              <a:rPr lang="en-US" altLang="zh-CN" sz="2000" dirty="0">
+                <a:solidFill>
+                  <a:srgbClr val="FF0000"/>
+                </a:solidFill>
+                <a:latin typeface="Arial" panose="020B0604020202020204" pitchFamily="34" charset="0"/>
+                <a:sym typeface="Arial" panose="020B0604020202020204" pitchFamily="34" charset="0"/>
+              </a:rPr>
+              <a:t>Batch Normalization: </a:t>
+            </a:r>
+            <a:endParaRPr lang="en-US" altLang="zh-CN" sz="2000" dirty="0">
+              <a:solidFill>
+                <a:srgbClr val="FF0000"/>
+              </a:solidFill>
+              <a:latin typeface="Arial" panose="020B0604020202020204" pitchFamily="34" charset="0"/>
+              <a:sym typeface="Arial" panose="020B0604020202020204" pitchFamily="34" charset="0"/>
+            </a:endParaRPr>
+          </a:p>
+          <a:p>
+            <a:pPr indent="457200"/>
+            <a:r>
+              <a:rPr lang="zh-CN" altLang="en-US" sz="2000" dirty="0">
+                <a:latin typeface="Arial" panose="020B0604020202020204" pitchFamily="34" charset="0"/>
+                <a:sym typeface="Arial" panose="020B0604020202020204" pitchFamily="34" charset="0"/>
+              </a:rPr>
+              <a:t>用于激活函数之前，对于激活层前的输入进行压缩，避免</a:t>
+            </a:r>
+            <a:r>
+              <a:rPr altLang="zh-CN" sz="2000" dirty="0">
+                <a:solidFill>
+                  <a:srgbClr val="FF0000"/>
+                </a:solidFill>
+                <a:latin typeface="Arial" panose="020B0604020202020204" pitchFamily="34" charset="0"/>
+                <a:sym typeface="Arial" panose="020B0604020202020204" pitchFamily="34" charset="0"/>
+              </a:rPr>
+              <a:t>Flat Tail</a:t>
+            </a:r>
+            <a:endParaRPr lang="zh-CN" altLang="en-US" sz="2000" dirty="0">
+              <a:latin typeface="Arial" panose="020B0604020202020204" pitchFamily="34" charset="0"/>
+              <a:sym typeface="Arial" panose="020B0604020202020204" pitchFamily="34" charset="0"/>
+            </a:endParaRPr>
+          </a:p>
+        </p:txBody>
+      </p:sp>
+      <p:sp>
+        <p:nvSpPr>
+          <p:cNvPr id="2" name="标题 2"/>
+          <p:cNvSpPr txBox="1"/>
+          <p:nvPr/>
+        </p:nvSpPr>
+        <p:spPr>
+          <a:xfrm>
+            <a:off x="1089025" y="5664200"/>
+            <a:ext cx="9041765" cy="650875"/>
+          </a:xfrm>
+          <a:prstGeom prst="rect">
+            <a:avLst/>
+          </a:prstGeom>
+        </p:spPr>
+        <p:txBody>
+          <a:bodyPr vert="horz" lIns="91440" tIns="45720" rIns="91440" bIns="45720" rtlCol="0" anchor="ctr">
+            <a:noAutofit/>
+          </a:bodyPr>
+          <a:lstStyle>
+            <a:lvl1pPr marL="0" algn="l" defTabSz="685800" rtl="0" eaLnBrk="1" latinLnBrk="0" hangingPunct="1">
+              <a:lnSpc>
+                <a:spcPct val="100000"/>
+              </a:lnSpc>
+              <a:spcBef>
+                <a:spcPct val="0"/>
+              </a:spcBef>
+              <a:buNone/>
+              <a:defRPr lang="en-US" sz="3200" b="1" kern="1200" dirty="0">
+                <a:solidFill>
+                  <a:srgbClr val="002060"/>
+                </a:solidFill>
+                <a:latin typeface="微软雅黑" panose="020B0503020204020204" pitchFamily="34" charset="-122"/>
+                <a:ea typeface="微软雅黑" panose="020B0503020204020204" pitchFamily="34" charset="-122"/>
+                <a:cs typeface="+mn-cs"/>
+              </a:defRPr>
+            </a:lvl1pPr>
+          </a:lstStyle>
+          <a:p>
+            <a:r>
+              <a:rPr lang="en-US" altLang="zh-CN" sz="2000" dirty="0">
+                <a:latin typeface="Arial" panose="020B0604020202020204" pitchFamily="34" charset="0"/>
+                <a:sym typeface="Arial" panose="020B0604020202020204" pitchFamily="34" charset="0"/>
+              </a:rPr>
+              <a:t>bnmean_running &amp; bnstd_running: </a:t>
+            </a:r>
+            <a:r>
+              <a:rPr lang="zh-CN" altLang="en-US" sz="2000" dirty="0">
+                <a:latin typeface="Arial" panose="020B0604020202020204" pitchFamily="34" charset="0"/>
+                <a:sym typeface="Arial" panose="020B0604020202020204" pitchFamily="34" charset="0"/>
+              </a:rPr>
+              <a:t>并</a:t>
+            </a:r>
+            <a:r>
+              <a:rPr lang="zh-CN" altLang="en-US" sz="2000" dirty="0">
+                <a:solidFill>
+                  <a:srgbClr val="FF0000"/>
+                </a:solidFill>
+                <a:latin typeface="Arial" panose="020B0604020202020204" pitchFamily="34" charset="0"/>
+                <a:sym typeface="Arial" panose="020B0604020202020204" pitchFamily="34" charset="0"/>
+              </a:rPr>
+              <a:t>不是通过反向传播实现</a:t>
+            </a:r>
+            <a:r>
+              <a:rPr lang="zh-CN" altLang="en-US" sz="2000" dirty="0">
+                <a:latin typeface="Arial" panose="020B0604020202020204" pitchFamily="34" charset="0"/>
+                <a:sym typeface="Arial" panose="020B0604020202020204" pitchFamily="34" charset="0"/>
+              </a:rPr>
+              <a:t>，而是在训练过程中不断迭代生成</a:t>
+            </a:r>
+            <a:r>
+              <a:rPr altLang="zh-CN" sz="2000" dirty="0">
+                <a:latin typeface="Arial" panose="020B0604020202020204" pitchFamily="34" charset="0"/>
+                <a:sym typeface="Arial" panose="020B0604020202020204" pitchFamily="34" charset="0"/>
+              </a:rPr>
+              <a:t> ---&gt; with torch.no_grad(): &amp; </a:t>
+            </a:r>
+            <a:r>
+              <a:rPr altLang="zh-CN" sz="2000" dirty="0">
+                <a:latin typeface="Arial" panose="020B0604020202020204" pitchFamily="34" charset="0"/>
+                <a:sym typeface="Arial" panose="020B0604020202020204" pitchFamily="34" charset="0"/>
+              </a:rPr>
+              <a:t>Monentum</a:t>
+            </a:r>
+            <a:endParaRPr altLang="zh-CN" sz="2000" dirty="0">
+              <a:latin typeface="Arial" panose="020B0604020202020204" pitchFamily="34" charset="0"/>
+              <a:sym typeface="Arial" panose="020B0604020202020204" pitchFamily="34" charset="0"/>
+            </a:endParaRPr>
+          </a:p>
+        </p:txBody>
+      </p:sp>
+      <p:pic>
+        <p:nvPicPr>
+          <p:cNvPr id="10" name="图片 9"/>
+          <p:cNvPicPr>
+            <a:picLocks noChangeAspect="1"/>
+          </p:cNvPicPr>
+          <p:nvPr/>
+        </p:nvPicPr>
+        <p:blipFill>
+          <a:blip r:embed="rId1">
+            <a:clrChange>
+              <a:clrFrom>
+                <a:srgbClr val="FFFFFF">
+                  <a:alpha val="100000"/>
+                </a:srgbClr>
+              </a:clrFrom>
+              <a:clrTo>
+                <a:srgbClr val="FFFFFF">
+                  <a:alpha val="100000"/>
+                  <a:alpha val="0"/>
+                </a:srgbClr>
+              </a:clrTo>
+            </a:clrChange>
+          </a:blip>
+          <a:stretch>
+            <a:fillRect/>
+          </a:stretch>
+        </p:blipFill>
+        <p:spPr>
+          <a:xfrm>
+            <a:off x="6492875" y="1941830"/>
+            <a:ext cx="5172075" cy="3347085"/>
+          </a:xfrm>
+          <a:prstGeom prst="rect">
+            <a:avLst/>
+          </a:prstGeom>
+        </p:spPr>
+      </p:pic>
+      <p:pic>
+        <p:nvPicPr>
+          <p:cNvPr id="11" name="图片 10"/>
+          <p:cNvPicPr/>
+          <p:nvPr/>
+        </p:nvPicPr>
+        <p:blipFill>
+          <a:blip r:embed="rId2"/>
+        </p:blipFill>
+        <p:spPr>
+          <a:xfrm>
+            <a:off x="1360170" y="2302510"/>
+            <a:ext cx="4145915" cy="2625725"/>
+          </a:xfrm>
+          <a:prstGeom prst="rect">
+            <a:avLst/>
+          </a:prstGeom>
+        </p:spPr>
+      </p:pic>
+      <p:sp>
+        <p:nvSpPr>
+          <p:cNvPr id="12" name="标题 2"/>
+          <p:cNvSpPr txBox="1"/>
+          <p:nvPr/>
+        </p:nvSpPr>
+        <p:spPr>
+          <a:xfrm>
+            <a:off x="2606040" y="4995545"/>
+            <a:ext cx="1212215" cy="505460"/>
+          </a:xfrm>
+          <a:prstGeom prst="rect">
+            <a:avLst/>
+          </a:prstGeom>
+        </p:spPr>
+        <p:txBody>
+          <a:bodyPr vert="horz" lIns="91440" tIns="45720" rIns="91440" bIns="45720" rtlCol="0" anchor="ctr">
+            <a:noAutofit/>
+          </a:bodyPr>
+          <a:lstStyle>
+            <a:lvl1pPr marL="0" algn="l" defTabSz="685800" rtl="0" eaLnBrk="1" latinLnBrk="0" hangingPunct="1">
+              <a:lnSpc>
+                <a:spcPct val="100000"/>
+              </a:lnSpc>
+              <a:spcBef>
+                <a:spcPct val="0"/>
+              </a:spcBef>
+              <a:buNone/>
+              <a:defRPr lang="en-US" sz="3200" b="1" kern="1200" dirty="0">
+                <a:solidFill>
+                  <a:srgbClr val="002060"/>
+                </a:solidFill>
+                <a:latin typeface="微软雅黑" panose="020B0503020204020204" pitchFamily="34" charset="-122"/>
+                <a:ea typeface="微软雅黑" panose="020B0503020204020204" pitchFamily="34" charset="-122"/>
+                <a:cs typeface="+mn-cs"/>
+              </a:defRPr>
+            </a:lvl1pPr>
+          </a:lstStyle>
+          <a:p>
+            <a:pPr indent="457200"/>
+            <a:r>
+              <a:rPr altLang="zh-CN" sz="1400" dirty="0">
+                <a:latin typeface="Arial" panose="020B0604020202020204" pitchFamily="34" charset="0"/>
+                <a:sym typeface="Arial" panose="020B0604020202020204" pitchFamily="34" charset="0"/>
+              </a:rPr>
+              <a:t>tanh</a:t>
+            </a:r>
+            <a:endParaRPr altLang="zh-CN" sz="1400" dirty="0">
+              <a:latin typeface="Arial" panose="020B0604020202020204" pitchFamily="34" charset="0"/>
+              <a:sym typeface="Arial" panose="020B0604020202020204" pitchFamily="34" charset="0"/>
+            </a:endParaRPr>
+          </a:p>
+        </p:txBody>
+      </p:sp>
+      <p:sp>
+        <p:nvSpPr>
+          <p:cNvPr id="13" name="椭圆 12"/>
+          <p:cNvSpPr/>
+          <p:nvPr/>
+        </p:nvSpPr>
+        <p:spPr>
+          <a:xfrm>
+            <a:off x="1253490" y="4535170"/>
+            <a:ext cx="1695450" cy="658495"/>
+          </a:xfrm>
+          <a:prstGeom prst="ellipse">
+            <a:avLst/>
+          </a:prstGeom>
+          <a:noFill/>
+          <a:ln>
+            <a:solidFill>
+              <a:srgbClr val="00B050"/>
+            </a:solidFill>
+            <a:prstDash val="sysDot"/>
+          </a:ln>
+        </p:spPr>
+        <p:style>
+          <a:lnRef idx="2">
+            <a:schemeClr val="accent1">
+              <a:lumMod val="75000"/>
+            </a:schemeClr>
+          </a:lnRef>
+          <a:fillRef idx="1">
+            <a:schemeClr val="accent1"/>
+          </a:fillRef>
+          <a:effectRef idx="0">
+            <a:srgbClr val="FFFFFF"/>
+          </a:effectRef>
+          <a:fontRef idx="minor">
+            <a:schemeClr val="lt1"/>
+          </a:fontRef>
+        </p:style>
+        <p:txBody>
+          <a:bodyPr rtlCol="0" anchor="ctr"/>
+          <a:p>
+            <a:pPr algn="ctr"/>
+            <a:endParaRPr lang="zh-CN" altLang="en-US"/>
+          </a:p>
+        </p:txBody>
+      </p:sp>
+      <p:sp>
+        <p:nvSpPr>
+          <p:cNvPr id="14" name="椭圆 13"/>
+          <p:cNvSpPr/>
+          <p:nvPr/>
+        </p:nvSpPr>
+        <p:spPr>
+          <a:xfrm>
+            <a:off x="3810635" y="2302510"/>
+            <a:ext cx="1695450" cy="658495"/>
+          </a:xfrm>
+          <a:prstGeom prst="ellipse">
+            <a:avLst/>
+          </a:prstGeom>
+          <a:noFill/>
+          <a:ln>
+            <a:solidFill>
+              <a:srgbClr val="00B050"/>
+            </a:solidFill>
+            <a:prstDash val="sysDot"/>
+          </a:ln>
+        </p:spPr>
+        <p:style>
+          <a:lnRef idx="2">
+            <a:schemeClr val="accent1">
+              <a:lumMod val="75000"/>
+            </a:schemeClr>
+          </a:lnRef>
+          <a:fillRef idx="1">
+            <a:schemeClr val="accent1"/>
+          </a:fillRef>
+          <a:effectRef idx="0">
+            <a:srgbClr val="FFFFFF"/>
+          </a:effectRef>
+          <a:fontRef idx="minor">
+            <a:schemeClr val="lt1"/>
+          </a:fontRef>
+        </p:style>
+        <p:txBody>
+          <a:bodyPr rtlCol="0" anchor="ctr"/>
+          <a:p>
+            <a:pPr algn="ctr"/>
+            <a:endParaRPr lang="zh-CN" altLang="en-US"/>
+          </a:p>
+        </p:txBody>
+      </p:sp>
+      <p:cxnSp>
+        <p:nvCxnSpPr>
+          <p:cNvPr id="16" name="直接箭头连接符 15"/>
+          <p:cNvCxnSpPr>
+            <a:endCxn id="14" idx="0"/>
+          </p:cNvCxnSpPr>
+          <p:nvPr/>
+        </p:nvCxnSpPr>
+        <p:spPr>
+          <a:xfrm flipH="1">
+            <a:off x="4658360" y="1737360"/>
+            <a:ext cx="3465195" cy="565150"/>
+          </a:xfrm>
+          <a:prstGeom prst="straightConnector1">
+            <a:avLst/>
+          </a:prstGeom>
+          <a:ln w="12700" cmpd="sng">
+            <a:solidFill>
+              <a:schemeClr val="accent1">
+                <a:shade val="50000"/>
+              </a:schemeClr>
+            </a:solidFill>
+            <a:prstDash val="dashDot"/>
+            <a:tailEnd type="arrow"/>
+          </a:ln>
+        </p:spPr>
+        <p:style>
+          <a:lnRef idx="2">
+            <a:schemeClr val="accent1"/>
+          </a:lnRef>
+          <a:fillRef idx="0">
+            <a:srgbClr val="FFFFFF"/>
+          </a:fillRef>
+          <a:effectRef idx="0">
+            <a:srgbClr val="FFFFFF"/>
+          </a:effectRef>
+          <a:fontRef idx="minor">
+            <a:schemeClr val="tx1"/>
+          </a:fontRef>
+        </p:style>
+      </p:cxnSp>
+      <p:cxnSp>
+        <p:nvCxnSpPr>
+          <p:cNvPr id="17" name="直接箭头连接符 16"/>
+          <p:cNvCxnSpPr>
+            <a:endCxn id="13" idx="6"/>
+          </p:cNvCxnSpPr>
+          <p:nvPr/>
+        </p:nvCxnSpPr>
+        <p:spPr>
+          <a:xfrm flipH="1">
+            <a:off x="2948940" y="1727835"/>
+            <a:ext cx="5174615" cy="3136900"/>
+          </a:xfrm>
+          <a:prstGeom prst="straightConnector1">
+            <a:avLst/>
+          </a:prstGeom>
+          <a:ln w="12700" cmpd="sng">
+            <a:solidFill>
+              <a:schemeClr val="accent1">
+                <a:shade val="50000"/>
+              </a:schemeClr>
+            </a:solidFill>
+            <a:prstDash val="dashDot"/>
+            <a:tailEnd type="arrow"/>
+          </a:ln>
+        </p:spPr>
+        <p:style>
+          <a:lnRef idx="2">
+            <a:schemeClr val="accent1"/>
+          </a:lnRef>
+          <a:fillRef idx="0">
+            <a:srgbClr val="FFFFFF"/>
+          </a:fillRef>
+          <a:effectRef idx="0">
+            <a:srgbClr val="FFFFFF"/>
+          </a:effectRef>
+          <a:fontRef idx="minor">
+            <a:schemeClr val="tx1"/>
+          </a:fontRef>
+        </p:style>
+      </p:cxnSp>
+    </p:spTree>
+  </p:cSld>
+  <p:clrMapOvr>
+    <a:masterClrMapping/>
+  </p:clrMapOvr>
+  <p:transition advClick="0" advTm="0"/>
+</p:sld>
+</file>
+
+<file path=ppt/slides/slide7.xml><?xml version="1.0" encoding="utf-8"?>
+<p:sld xmlns:a="http://schemas.openxmlformats.org/drawingml/2006/main" xmlns:r="http://schemas.openxmlformats.org/officeDocument/2006/relationships" xmlns:p="http://schemas.openxmlformats.org/presentationml/2006/main">
+  <p:cSld>
+    <p:spTree>
+      <p:nvGrpSpPr>
+        <p:cNvPr id="1" name=""/>
+        <p:cNvGrpSpPr/>
+        <p:nvPr/>
+      </p:nvGrpSpPr>
+      <p:grpSpPr>
+        <a:xfrm>
+          <a:off x="0" y="0"/>
+          <a:ext cx="0" cy="0"/>
+          <a:chOff x="0" y="0"/>
+          <a:chExt cx="0" cy="0"/>
+        </a:xfrm>
+      </p:grpSpPr>
+      <p:sp>
+        <p:nvSpPr>
+          <p:cNvPr id="4" name="矩形 12"/>
+          <p:cNvSpPr>
+            <a:spLocks noChangeArrowheads="1"/>
+          </p:cNvSpPr>
+          <p:nvPr/>
+        </p:nvSpPr>
+        <p:spPr bwMode="auto">
+          <a:xfrm>
+            <a:off x="385125" y="188641"/>
+            <a:ext cx="11568417" cy="583565"/>
+          </a:xfrm>
+          <a:prstGeom prst="rect">
+            <a:avLst/>
+          </a:prstGeom>
+          <a:noFill/>
+          <a:ln>
+            <a:noFill/>
+          </a:ln>
+          <a:extLst>
+            <a:ext uri="{909E8E84-426E-40DD-AFC4-6F175D3DCCD1}">
+              <a14:hiddenFill xmlns:a14="http://schemas.microsoft.com/office/drawing/2010/main">
+                <a:solidFill>
+                  <a:srgbClr val="FFFFFF"/>
+                </a:solidFill>
+              </a14:hiddenFill>
+            </a:ext>
+            <a:ext uri="{91240B29-F687-4F45-9708-019B960494DF}">
+              <a14:hiddenLine xmlns:a14="http://schemas.microsoft.com/office/drawing/2010/main" w="9525">
+                <a:solidFill>
+                  <a:srgbClr val="000000"/>
+                </a:solidFill>
+                <a:miter lim="800000"/>
+                <a:headEnd/>
+                <a:tailEnd/>
+              </a14:hiddenLine>
+            </a:ext>
+          </a:extLst>
+        </p:spPr>
+        <p:txBody>
+          <a:bodyPr wrap="square">
+            <a:spAutoFit/>
+          </a:bodyPr>
+          <a:lstStyle/>
+          <a:p>
+            <a:pPr marL="0" lvl="1" defTabSz="457200">
+              <a:buClr>
+                <a:srgbClr val="FF0000"/>
+              </a:buClr>
+              <a:buSzPct val="100000"/>
+            </a:pPr>
+            <a:r>
+              <a:rPr lang="en-US" altLang="zh-CN" sz="3200" b="1" dirty="0">
+                <a:solidFill>
+                  <a:schemeClr val="bg1"/>
+                </a:solidFill>
+                <a:latin typeface="Arial" panose="020B0604020202020204" pitchFamily="34" charset="0"/>
+                <a:ea typeface="微软雅黑" panose="020B0503020204020204" pitchFamily="34" charset="-122"/>
+                <a:cs typeface="+mn-ea"/>
+                <a:sym typeface="Arial" panose="020B0604020202020204" pitchFamily="34" charset="0"/>
+              </a:rPr>
+              <a:t>1.1</a:t>
+            </a:r>
+            <a:r>
+              <a:rPr lang="zh-CN" altLang="en-US" sz="3200" b="1" dirty="0">
+                <a:solidFill>
+                  <a:schemeClr val="bg1"/>
+                </a:solidFill>
+                <a:latin typeface="Arial" panose="020B0604020202020204" pitchFamily="34" charset="0"/>
+                <a:ea typeface="微软雅黑" panose="020B0503020204020204" pitchFamily="34" charset="-122"/>
+                <a:cs typeface="+mn-ea"/>
+                <a:sym typeface="Arial" panose="020B0604020202020204" pitchFamily="34" charset="0"/>
+              </a:rPr>
+              <a:t>染研究意义</a:t>
+            </a:r>
+            <a:endParaRPr lang="zh-CN" altLang="en-US" sz="3200" b="1" dirty="0">
+              <a:solidFill>
+                <a:schemeClr val="bg1"/>
+              </a:solidFill>
+              <a:latin typeface="Arial" panose="020B0604020202020204" pitchFamily="34" charset="0"/>
+              <a:ea typeface="微软雅黑" panose="020B0503020204020204" pitchFamily="34" charset="-122"/>
+              <a:cs typeface="+mn-ea"/>
+              <a:sym typeface="Arial" panose="020B0604020202020204" pitchFamily="34" charset="0"/>
+            </a:endParaRPr>
+          </a:p>
+        </p:txBody>
+      </p:sp>
+      <p:sp>
+        <p:nvSpPr>
+          <p:cNvPr id="3" name="标题 2"/>
+          <p:cNvSpPr>
+            <a:spLocks noGrp="1"/>
+          </p:cNvSpPr>
+          <p:nvPr>
+            <p:ph type="title"/>
+          </p:nvPr>
+        </p:nvSpPr>
+        <p:spPr/>
+        <p:txBody>
+          <a:bodyPr/>
+          <a:lstStyle/>
+          <a:p>
+            <a:r>
+              <a:rPr lang="en-US" altLang="zh-CN" dirty="0">
+                <a:latin typeface="Arial" panose="020B0604020202020204" pitchFamily="34" charset="0"/>
+                <a:sym typeface="Arial" panose="020B0604020202020204" pitchFamily="34" charset="0"/>
+              </a:rPr>
+              <a:t>4. Become a backprop Ninja</a:t>
+            </a:r>
+            <a:endParaRPr lang="en-US" altLang="zh-CN" dirty="0">
+              <a:latin typeface="Arial" panose="020B0604020202020204" pitchFamily="34" charset="0"/>
+              <a:sym typeface="Arial" panose="020B0604020202020204" pitchFamily="34" charset="0"/>
+            </a:endParaRPr>
+          </a:p>
+        </p:txBody>
+      </p:sp>
+      <p:sp>
+        <p:nvSpPr>
+          <p:cNvPr id="7" name="灯片编号占位符 6"/>
+          <p:cNvSpPr>
+            <a:spLocks noGrp="1"/>
+          </p:cNvSpPr>
+          <p:nvPr>
+            <p:ph type="sldNum" sz="quarter" idx="16"/>
+          </p:nvPr>
+        </p:nvSpPr>
+        <p:spPr/>
+        <p:txBody>
+          <a:bodyPr/>
+          <a:lstStyle/>
+          <a:p>
+            <a:pPr>
+              <a:defRPr/>
+            </a:pPr>
+            <a:fld id="{26F565BE-27A9-4834-BA3A-D46EFBA6086A}" type="slidenum">
+              <a:rPr lang="zh-CN" altLang="en-US" smtClean="0">
+                <a:latin typeface="Arial" panose="020B0604020202020204" pitchFamily="34" charset="0"/>
+                <a:sym typeface="Arial" panose="020B0604020202020204" pitchFamily="34" charset="0"/>
+              </a:rPr>
+            </a:fld>
+            <a:endParaRPr lang="zh-CN" altLang="en-US" dirty="0">
+              <a:latin typeface="Arial" panose="020B0604020202020204" pitchFamily="34" charset="0"/>
+              <a:sym typeface="Arial" panose="020B0604020202020204" pitchFamily="34" charset="0"/>
+            </a:endParaRPr>
+          </a:p>
+        </p:txBody>
+      </p:sp>
+      <p:cxnSp>
+        <p:nvCxnSpPr>
+          <p:cNvPr id="8" name="直接连接符 7"/>
+          <p:cNvCxnSpPr/>
+          <p:nvPr/>
+        </p:nvCxnSpPr>
+        <p:spPr>
+          <a:xfrm>
+            <a:off x="0" y="824357"/>
+            <a:ext cx="3877337" cy="0"/>
+          </a:xfrm>
+          <a:prstGeom prst="line">
+            <a:avLst/>
+          </a:prstGeom>
+          <a:ln w="31750">
+            <a:gradFill flip="none" rotWithShape="1">
+              <a:gsLst>
+                <a:gs pos="0">
+                  <a:schemeClr val="accent1">
+                    <a:lumMod val="40000"/>
+                    <a:lumOff val="60000"/>
+                  </a:schemeClr>
+                </a:gs>
+                <a:gs pos="46000">
+                  <a:schemeClr val="accent1">
+                    <a:lumMod val="40000"/>
+                    <a:lumOff val="60000"/>
+                  </a:schemeClr>
+                </a:gs>
+                <a:gs pos="100000">
+                  <a:schemeClr val="accent1">
+                    <a:lumMod val="75000"/>
+                  </a:schemeClr>
+                </a:gs>
+              </a:gsLst>
+              <a:lin ang="10800000" scaled="0"/>
+              <a:tileRect/>
+            </a:gradFill>
+          </a:ln>
+        </p:spPr>
+        <p:style>
+          <a:lnRef idx="3">
+            <a:schemeClr val="dk1"/>
+          </a:lnRef>
+          <a:fillRef idx="0">
+            <a:schemeClr val="dk1"/>
+          </a:fillRef>
+          <a:effectRef idx="2">
+            <a:schemeClr val="dk1"/>
+          </a:effectRef>
+          <a:fontRef idx="minor">
+            <a:schemeClr val="tx1"/>
+          </a:fontRef>
+        </p:style>
+      </p:cxnSp>
+      <p:pic>
+        <p:nvPicPr>
+          <p:cNvPr id="5" name="图片 4"/>
+          <p:cNvPicPr>
+            <a:picLocks noChangeAspect="1"/>
+          </p:cNvPicPr>
+          <p:nvPr/>
+        </p:nvPicPr>
+        <p:blipFill>
+          <a:blip r:embed="rId1">
+            <a:clrChange>
+              <a:clrFrom>
+                <a:srgbClr val="FFFFFF">
+                  <a:alpha val="100000"/>
+                </a:srgbClr>
+              </a:clrFrom>
+              <a:clrTo>
+                <a:srgbClr val="FFFFFF">
+                  <a:alpha val="100000"/>
+                  <a:alpha val="0"/>
+                </a:srgbClr>
+              </a:clrTo>
+            </a:clrChange>
+          </a:blip>
+          <a:stretch>
+            <a:fillRect/>
+          </a:stretch>
+        </p:blipFill>
+        <p:spPr>
+          <a:xfrm>
+            <a:off x="5695950" y="1705610"/>
+            <a:ext cx="5524500" cy="3724275"/>
+          </a:xfrm>
+          <a:prstGeom prst="rect">
+            <a:avLst/>
+          </a:prstGeom>
+          <a:ln w="22225" cap="rnd" cmpd="sng">
+            <a:solidFill>
+              <a:srgbClr val="00B050"/>
+            </a:solidFill>
+            <a:prstDash val="lgDash"/>
+          </a:ln>
+        </p:spPr>
+      </p:pic>
+      <p:sp>
+        <p:nvSpPr>
+          <p:cNvPr id="9" name="标题 2"/>
+          <p:cNvSpPr txBox="1"/>
+          <p:nvPr/>
+        </p:nvSpPr>
+        <p:spPr>
+          <a:xfrm>
+            <a:off x="384810" y="1110615"/>
+            <a:ext cx="4965700" cy="1483360"/>
+          </a:xfrm>
+          <a:prstGeom prst="rect">
+            <a:avLst/>
+          </a:prstGeom>
+        </p:spPr>
+        <p:txBody>
+          <a:bodyPr vert="horz" lIns="91440" tIns="45720" rIns="91440" bIns="45720" rtlCol="0" anchor="ctr">
+            <a:noAutofit/>
+          </a:bodyPr>
+          <a:lstStyle>
+            <a:lvl1pPr marL="0" algn="l" defTabSz="685800" rtl="0" eaLnBrk="1" latinLnBrk="0" hangingPunct="1">
+              <a:lnSpc>
+                <a:spcPct val="100000"/>
+              </a:lnSpc>
+              <a:spcBef>
+                <a:spcPct val="0"/>
+              </a:spcBef>
+              <a:buNone/>
+              <a:defRPr lang="en-US" sz="3200" b="1" kern="1200" dirty="0">
+                <a:solidFill>
+                  <a:srgbClr val="002060"/>
+                </a:solidFill>
+                <a:latin typeface="微软雅黑" panose="020B0503020204020204" pitchFamily="34" charset="-122"/>
+                <a:ea typeface="微软雅黑" panose="020B0503020204020204" pitchFamily="34" charset="-122"/>
+                <a:cs typeface="+mn-cs"/>
+              </a:defRPr>
+            </a:lvl1pPr>
+          </a:lstStyle>
+          <a:p>
+            <a:r>
+              <a:rPr altLang="zh-CN" sz="2000" dirty="0">
+                <a:solidFill>
+                  <a:srgbClr val="FF0000"/>
+                </a:solidFill>
+                <a:latin typeface="Arial" panose="020B0604020202020204" pitchFamily="34" charset="0"/>
+                <a:sym typeface="Arial" panose="020B0604020202020204" pitchFamily="34" charset="0"/>
+              </a:rPr>
+              <a:t>Broadcast</a:t>
+            </a:r>
+            <a:r>
+              <a:rPr lang="zh-CN" altLang="en-US" sz="2000" dirty="0">
+                <a:solidFill>
+                  <a:srgbClr val="FF0000"/>
+                </a:solidFill>
+                <a:latin typeface="Arial" panose="020B0604020202020204" pitchFamily="34" charset="0"/>
+                <a:sym typeface="Arial" panose="020B0604020202020204" pitchFamily="34" charset="0"/>
+              </a:rPr>
+              <a:t>：</a:t>
+            </a:r>
+            <a:endParaRPr lang="zh-CN" altLang="en-US" sz="2000" dirty="0">
+              <a:solidFill>
+                <a:srgbClr val="FF0000"/>
+              </a:solidFill>
+              <a:latin typeface="Arial" panose="020B0604020202020204" pitchFamily="34" charset="0"/>
+              <a:sym typeface="Arial" panose="020B0604020202020204" pitchFamily="34" charset="0"/>
+            </a:endParaRPr>
+          </a:p>
+          <a:p>
+            <a:pPr indent="457200"/>
+            <a:r>
+              <a:rPr lang="zh-CN" altLang="en-US" sz="2000" dirty="0">
+                <a:latin typeface="Arial" panose="020B0604020202020204" pitchFamily="34" charset="0"/>
+                <a:sym typeface="Arial" panose="020B0604020202020204" pitchFamily="34" charset="0"/>
+              </a:rPr>
+              <a:t>一个点被用了多次，那么会</a:t>
+            </a:r>
+            <a:r>
+              <a:rPr lang="zh-CN" altLang="en-US" sz="2000" dirty="0">
+                <a:solidFill>
+                  <a:srgbClr val="FF0000"/>
+                </a:solidFill>
+                <a:latin typeface="Arial" panose="020B0604020202020204" pitchFamily="34" charset="0"/>
+                <a:sym typeface="Arial" panose="020B0604020202020204" pitchFamily="34" charset="0"/>
+              </a:rPr>
+              <a:t>累加</a:t>
+            </a:r>
+            <a:r>
+              <a:rPr lang="zh-CN" altLang="en-US" sz="2000" dirty="0">
+                <a:latin typeface="Arial" panose="020B0604020202020204" pitchFamily="34" charset="0"/>
+                <a:sym typeface="Arial" panose="020B0604020202020204" pitchFamily="34" charset="0"/>
+              </a:rPr>
+              <a:t>其用到的梯度（包括一个</a:t>
+            </a:r>
+            <a:r>
+              <a:rPr lang="zh-CN" altLang="en-US" sz="2000" dirty="0">
+                <a:latin typeface="Arial" panose="020B0604020202020204" pitchFamily="34" charset="0"/>
+                <a:sym typeface="Arial" panose="020B0604020202020204" pitchFamily="34" charset="0"/>
+              </a:rPr>
+              <a:t>节点多次</a:t>
+            </a:r>
+            <a:r>
+              <a:rPr lang="zh-CN" altLang="en-US" sz="2000" dirty="0">
+                <a:latin typeface="Arial" panose="020B0604020202020204" pitchFamily="34" charset="0"/>
+                <a:sym typeface="Arial" panose="020B0604020202020204" pitchFamily="34" charset="0"/>
+              </a:rPr>
+              <a:t>使用）</a:t>
+            </a:r>
+            <a:endParaRPr lang="zh-CN" altLang="en-US" sz="2000" dirty="0">
+              <a:latin typeface="Arial" panose="020B0604020202020204" pitchFamily="34" charset="0"/>
+              <a:sym typeface="Arial" panose="020B0604020202020204" pitchFamily="34" charset="0"/>
+            </a:endParaRPr>
+          </a:p>
+        </p:txBody>
+      </p:sp>
+      <p:cxnSp>
+        <p:nvCxnSpPr>
+          <p:cNvPr id="20" name="直接箭头连接符 19"/>
+          <p:cNvCxnSpPr/>
+          <p:nvPr/>
+        </p:nvCxnSpPr>
+        <p:spPr>
+          <a:xfrm flipH="1">
+            <a:off x="3226435" y="2008505"/>
+            <a:ext cx="998220" cy="2558415"/>
+          </a:xfrm>
+          <a:prstGeom prst="straightConnector1">
+            <a:avLst/>
+          </a:prstGeom>
+          <a:ln w="28575" cmpd="thickThin">
+            <a:solidFill>
+              <a:srgbClr val="FF0000"/>
+            </a:solidFill>
+            <a:prstDash val="sysDash"/>
+            <a:tailEnd type="arrow"/>
+          </a:ln>
+        </p:spPr>
+        <p:style>
+          <a:lnRef idx="2">
+            <a:schemeClr val="accent1"/>
+          </a:lnRef>
+          <a:fillRef idx="0">
+            <a:srgbClr val="FFFFFF"/>
+          </a:fillRef>
+          <a:effectRef idx="0">
+            <a:srgbClr val="FFFFFF"/>
+          </a:effectRef>
+          <a:fontRef idx="minor">
+            <a:schemeClr val="tx1"/>
+          </a:fontRef>
+        </p:style>
+      </p:cxnSp>
+      <p:sp>
+        <p:nvSpPr>
+          <p:cNvPr id="21" name="标题 2"/>
+          <p:cNvSpPr txBox="1"/>
+          <p:nvPr/>
+        </p:nvSpPr>
+        <p:spPr>
+          <a:xfrm>
+            <a:off x="1363345" y="4328795"/>
+            <a:ext cx="3909695" cy="1483360"/>
+          </a:xfrm>
+          <a:prstGeom prst="rect">
+            <a:avLst/>
+          </a:prstGeom>
+        </p:spPr>
+        <p:txBody>
+          <a:bodyPr vert="horz" lIns="91440" tIns="45720" rIns="91440" bIns="45720" rtlCol="0" anchor="ctr">
+            <a:noAutofit/>
+          </a:bodyPr>
+          <a:lstStyle>
+            <a:lvl1pPr marL="0" algn="l" defTabSz="685800" rtl="0" eaLnBrk="1" latinLnBrk="0" hangingPunct="1">
+              <a:lnSpc>
+                <a:spcPct val="100000"/>
+              </a:lnSpc>
+              <a:spcBef>
+                <a:spcPct val="0"/>
+              </a:spcBef>
+              <a:buNone/>
+              <a:defRPr lang="en-US" sz="3200" b="1" kern="1200" dirty="0">
+                <a:solidFill>
+                  <a:srgbClr val="002060"/>
+                </a:solidFill>
+                <a:latin typeface="微软雅黑" panose="020B0503020204020204" pitchFamily="34" charset="-122"/>
+                <a:ea typeface="微软雅黑" panose="020B0503020204020204" pitchFamily="34" charset="-122"/>
+                <a:cs typeface="+mn-cs"/>
+              </a:defRPr>
+            </a:lvl1pPr>
+          </a:lstStyle>
+          <a:p>
+            <a:pPr indent="457200"/>
+            <a:r>
+              <a:rPr lang="zh-CN" altLang="en-US" sz="2000" dirty="0">
+                <a:latin typeface="Arial" panose="020B0604020202020204" pitchFamily="34" charset="0"/>
+                <a:sym typeface="Arial" panose="020B0604020202020204" pitchFamily="34" charset="0"/>
+              </a:rPr>
+              <a:t>在每一次求导的过程中，注意</a:t>
+            </a:r>
+            <a:r>
+              <a:rPr lang="zh-CN" altLang="en-US" sz="2000" dirty="0">
+                <a:solidFill>
+                  <a:srgbClr val="FF0000"/>
+                </a:solidFill>
+                <a:latin typeface="Arial" panose="020B0604020202020204" pitchFamily="34" charset="0"/>
+                <a:sym typeface="Arial" panose="020B0604020202020204" pitchFamily="34" charset="0"/>
+              </a:rPr>
+              <a:t>矩阵的形状</a:t>
+            </a:r>
+            <a:endParaRPr lang="zh-CN" altLang="en-US" sz="2000" dirty="0">
+              <a:solidFill>
+                <a:srgbClr val="FF0000"/>
+              </a:solidFill>
+              <a:latin typeface="Arial" panose="020B0604020202020204" pitchFamily="34" charset="0"/>
+              <a:sym typeface="Arial" panose="020B0604020202020204" pitchFamily="34" charset="0"/>
+            </a:endParaRPr>
+          </a:p>
+        </p:txBody>
+      </p:sp>
+    </p:spTree>
+  </p:cSld>
+  <p:clrMapOvr>
+    <a:masterClrMapping/>
+  </p:clrMapOvr>
+  <p:transition advClick="0" advTm="0"/>
+</p:sld>
+</file>
+
+<file path=ppt/slides/slide8.xml><?xml version="1.0" encoding="utf-8"?>
+<p:sld xmlns:a="http://schemas.openxmlformats.org/drawingml/2006/main" xmlns:r="http://schemas.openxmlformats.org/officeDocument/2006/relationships" xmlns:p="http://schemas.openxmlformats.org/presentationml/2006/main">
+  <p:cSld>
+    <p:spTree>
+      <p:nvGrpSpPr>
+        <p:cNvPr id="1" name=""/>
+        <p:cNvGrpSpPr/>
+        <p:nvPr/>
+      </p:nvGrpSpPr>
+      <p:grpSpPr>
+        <a:xfrm>
+          <a:off x="0" y="0"/>
+          <a:ext cx="0" cy="0"/>
+          <a:chOff x="0" y="0"/>
+          <a:chExt cx="0" cy="0"/>
+        </a:xfrm>
+      </p:grpSpPr>
+      <p:sp>
+        <p:nvSpPr>
+          <p:cNvPr id="4" name="矩形 12"/>
+          <p:cNvSpPr>
+            <a:spLocks noChangeArrowheads="1"/>
+          </p:cNvSpPr>
+          <p:nvPr/>
+        </p:nvSpPr>
+        <p:spPr bwMode="auto">
+          <a:xfrm>
+            <a:off x="385125" y="188641"/>
+            <a:ext cx="11568417" cy="583565"/>
+          </a:xfrm>
+          <a:prstGeom prst="rect">
+            <a:avLst/>
+          </a:prstGeom>
+          <a:noFill/>
+          <a:ln>
+            <a:noFill/>
+          </a:ln>
+          <a:extLst>
+            <a:ext uri="{909E8E84-426E-40DD-AFC4-6F175D3DCCD1}">
+              <a14:hiddenFill xmlns:a14="http://schemas.microsoft.com/office/drawing/2010/main">
+                <a:solidFill>
+                  <a:srgbClr val="FFFFFF"/>
+                </a:solidFill>
+              </a14:hiddenFill>
+            </a:ext>
+            <a:ext uri="{91240B29-F687-4F45-9708-019B960494DF}">
+              <a14:hiddenLine xmlns:a14="http://schemas.microsoft.com/office/drawing/2010/main" w="9525">
+                <a:solidFill>
+                  <a:srgbClr val="000000"/>
+                </a:solidFill>
+                <a:miter lim="800000"/>
+                <a:headEnd/>
+                <a:tailEnd/>
+              </a14:hiddenLine>
+            </a:ext>
+          </a:extLst>
+        </p:spPr>
+        <p:txBody>
+          <a:bodyPr wrap="square">
+            <a:spAutoFit/>
+          </a:bodyPr>
+          <a:lstStyle/>
+          <a:p>
+            <a:pPr marL="0" lvl="1" defTabSz="457200">
+              <a:buClr>
+                <a:srgbClr val="FF0000"/>
+              </a:buClr>
+              <a:buSzPct val="100000"/>
+            </a:pPr>
+            <a:r>
+              <a:rPr lang="en-US" altLang="zh-CN" sz="3200" b="1" dirty="0">
+                <a:solidFill>
+                  <a:schemeClr val="bg1"/>
+                </a:solidFill>
+                <a:latin typeface="Arial" panose="020B0604020202020204" pitchFamily="34" charset="0"/>
+                <a:ea typeface="微软雅黑" panose="020B0503020204020204" pitchFamily="34" charset="-122"/>
+                <a:cs typeface="+mn-ea"/>
+                <a:sym typeface="Arial" panose="020B0604020202020204" pitchFamily="34" charset="0"/>
+              </a:rPr>
+              <a:t>1.1</a:t>
+            </a:r>
+            <a:r>
+              <a:rPr lang="zh-CN" altLang="en-US" sz="3200" b="1" dirty="0">
+                <a:solidFill>
+                  <a:schemeClr val="bg1"/>
+                </a:solidFill>
+                <a:latin typeface="Arial" panose="020B0604020202020204" pitchFamily="34" charset="0"/>
+                <a:ea typeface="微软雅黑" panose="020B0503020204020204" pitchFamily="34" charset="-122"/>
+                <a:cs typeface="+mn-ea"/>
+                <a:sym typeface="Arial" panose="020B0604020202020204" pitchFamily="34" charset="0"/>
+              </a:rPr>
+              <a:t>染研究意义</a:t>
+            </a:r>
+            <a:endParaRPr lang="zh-CN" altLang="en-US" sz="3200" b="1" dirty="0">
+              <a:solidFill>
+                <a:schemeClr val="bg1"/>
+              </a:solidFill>
+              <a:latin typeface="Arial" panose="020B0604020202020204" pitchFamily="34" charset="0"/>
+              <a:ea typeface="微软雅黑" panose="020B0503020204020204" pitchFamily="34" charset="-122"/>
+              <a:cs typeface="+mn-ea"/>
+              <a:sym typeface="Arial" panose="020B0604020202020204" pitchFamily="34" charset="0"/>
+            </a:endParaRPr>
+          </a:p>
+        </p:txBody>
+      </p:sp>
+      <p:sp>
+        <p:nvSpPr>
+          <p:cNvPr id="3" name="标题 2"/>
+          <p:cNvSpPr>
+            <a:spLocks noGrp="1"/>
+          </p:cNvSpPr>
+          <p:nvPr>
+            <p:ph type="title"/>
+          </p:nvPr>
+        </p:nvSpPr>
+        <p:spPr/>
+        <p:txBody>
+          <a:bodyPr/>
+          <a:lstStyle/>
+          <a:p>
+            <a:r>
+              <a:rPr lang="en-US" altLang="zh-CN" dirty="0">
+                <a:latin typeface="Arial" panose="020B0604020202020204" pitchFamily="34" charset="0"/>
+                <a:sym typeface="Arial" panose="020B0604020202020204" pitchFamily="34" charset="0"/>
+              </a:rPr>
+              <a:t>4. Become a backprop Ninja</a:t>
+            </a:r>
+            <a:endParaRPr lang="en-US" altLang="zh-CN" dirty="0">
+              <a:latin typeface="Arial" panose="020B0604020202020204" pitchFamily="34" charset="0"/>
+              <a:sym typeface="Arial" panose="020B0604020202020204" pitchFamily="34" charset="0"/>
+            </a:endParaRPr>
+          </a:p>
+        </p:txBody>
+      </p:sp>
+      <p:sp>
+        <p:nvSpPr>
+          <p:cNvPr id="7" name="灯片编号占位符 6"/>
+          <p:cNvSpPr>
+            <a:spLocks noGrp="1"/>
+          </p:cNvSpPr>
+          <p:nvPr>
+            <p:ph type="sldNum" sz="quarter" idx="16"/>
+          </p:nvPr>
+        </p:nvSpPr>
+        <p:spPr/>
+        <p:txBody>
+          <a:bodyPr/>
+          <a:lstStyle/>
+          <a:p>
+            <a:pPr>
+              <a:defRPr/>
+            </a:pPr>
+            <a:fld id="{26F565BE-27A9-4834-BA3A-D46EFBA6086A}" type="slidenum">
+              <a:rPr lang="zh-CN" altLang="en-US" smtClean="0">
+                <a:latin typeface="Arial" panose="020B0604020202020204" pitchFamily="34" charset="0"/>
+                <a:sym typeface="Arial" panose="020B0604020202020204" pitchFamily="34" charset="0"/>
+              </a:rPr>
+            </a:fld>
+            <a:endParaRPr lang="zh-CN" altLang="en-US" dirty="0">
+              <a:latin typeface="Arial" panose="020B0604020202020204" pitchFamily="34" charset="0"/>
+              <a:sym typeface="Arial" panose="020B0604020202020204" pitchFamily="34" charset="0"/>
+            </a:endParaRPr>
+          </a:p>
+        </p:txBody>
+      </p:sp>
+      <p:cxnSp>
+        <p:nvCxnSpPr>
+          <p:cNvPr id="8" name="直接连接符 7"/>
+          <p:cNvCxnSpPr/>
+          <p:nvPr/>
+        </p:nvCxnSpPr>
+        <p:spPr>
+          <a:xfrm>
+            <a:off x="0" y="824357"/>
+            <a:ext cx="3877337" cy="0"/>
+          </a:xfrm>
+          <a:prstGeom prst="line">
+            <a:avLst/>
+          </a:prstGeom>
+          <a:ln w="31750">
+            <a:gradFill flip="none" rotWithShape="1">
+              <a:gsLst>
+                <a:gs pos="0">
+                  <a:schemeClr val="accent1">
+                    <a:lumMod val="40000"/>
+                    <a:lumOff val="60000"/>
+                  </a:schemeClr>
+                </a:gs>
+                <a:gs pos="46000">
+                  <a:schemeClr val="accent1">
+                    <a:lumMod val="40000"/>
+                    <a:lumOff val="60000"/>
+                  </a:schemeClr>
+                </a:gs>
+                <a:gs pos="100000">
+                  <a:schemeClr val="accent1">
+                    <a:lumMod val="75000"/>
+                  </a:schemeClr>
+                </a:gs>
+              </a:gsLst>
+              <a:lin ang="10800000" scaled="0"/>
+              <a:tileRect/>
+            </a:gradFill>
+          </a:ln>
+        </p:spPr>
+        <p:style>
+          <a:lnRef idx="3">
+            <a:schemeClr val="dk1"/>
+          </a:lnRef>
+          <a:fillRef idx="0">
+            <a:schemeClr val="dk1"/>
+          </a:fillRef>
+          <a:effectRef idx="2">
+            <a:schemeClr val="dk1"/>
+          </a:effectRef>
+          <a:fontRef idx="minor">
+            <a:schemeClr val="tx1"/>
+          </a:fontRef>
+        </p:style>
+      </p:cxnSp>
+      <p:sp>
+        <p:nvSpPr>
+          <p:cNvPr id="9" name="标题 2"/>
+          <p:cNvSpPr txBox="1"/>
+          <p:nvPr/>
+        </p:nvSpPr>
+        <p:spPr>
+          <a:xfrm>
+            <a:off x="1461135" y="876300"/>
+            <a:ext cx="4965700" cy="650875"/>
+          </a:xfrm>
+          <a:prstGeom prst="rect">
+            <a:avLst/>
+          </a:prstGeom>
+        </p:spPr>
+        <p:txBody>
+          <a:bodyPr vert="horz" lIns="91440" tIns="45720" rIns="91440" bIns="45720" rtlCol="0" anchor="ctr">
+            <a:noAutofit/>
+          </a:bodyPr>
+          <a:lstStyle>
+            <a:lvl1pPr marL="0" algn="l" defTabSz="685800" rtl="0" eaLnBrk="1" latinLnBrk="0" hangingPunct="1">
+              <a:lnSpc>
+                <a:spcPct val="100000"/>
+              </a:lnSpc>
+              <a:spcBef>
+                <a:spcPct val="0"/>
+              </a:spcBef>
+              <a:buNone/>
+              <a:defRPr lang="en-US" sz="3200" b="1" kern="1200" dirty="0">
+                <a:solidFill>
+                  <a:srgbClr val="002060"/>
+                </a:solidFill>
+                <a:latin typeface="微软雅黑" panose="020B0503020204020204" pitchFamily="34" charset="-122"/>
+                <a:ea typeface="微软雅黑" panose="020B0503020204020204" pitchFamily="34" charset="-122"/>
+                <a:cs typeface="+mn-cs"/>
+              </a:defRPr>
+            </a:lvl1pPr>
+          </a:lstStyle>
+          <a:p>
+            <a:r>
+              <a:rPr lang="zh-CN" altLang="en-US" sz="2000" dirty="0">
+                <a:latin typeface="Arial" panose="020B0604020202020204" pitchFamily="34" charset="0"/>
+                <a:sym typeface="Arial" panose="020B0604020202020204" pitchFamily="34" charset="0"/>
+              </a:rPr>
+              <a:t>矩阵乘法的</a:t>
+            </a:r>
+            <a:r>
+              <a:rPr lang="zh-CN" altLang="en-US" sz="2000" dirty="0">
+                <a:latin typeface="Arial" panose="020B0604020202020204" pitchFamily="34" charset="0"/>
+                <a:sym typeface="Arial" panose="020B0604020202020204" pitchFamily="34" charset="0"/>
+              </a:rPr>
+              <a:t>求导</a:t>
+            </a:r>
+            <a:endParaRPr lang="zh-CN" altLang="en-US" sz="2000" dirty="0">
+              <a:latin typeface="Arial" panose="020B0604020202020204" pitchFamily="34" charset="0"/>
+              <a:sym typeface="Arial" panose="020B0604020202020204" pitchFamily="34" charset="0"/>
+            </a:endParaRPr>
+          </a:p>
+        </p:txBody>
+      </p:sp>
+      <p:pic>
+        <p:nvPicPr>
+          <p:cNvPr id="6" name="图片 5"/>
+          <p:cNvPicPr>
+            <a:picLocks noChangeAspect="1"/>
+          </p:cNvPicPr>
+          <p:nvPr/>
+        </p:nvPicPr>
+        <p:blipFill>
+          <a:blip r:embed="rId1"/>
+          <a:stretch>
+            <a:fillRect/>
+          </a:stretch>
+        </p:blipFill>
+        <p:spPr>
+          <a:xfrm>
+            <a:off x="866140" y="1631315"/>
+            <a:ext cx="3771900" cy="600075"/>
+          </a:xfrm>
+          <a:prstGeom prst="rect">
+            <a:avLst/>
+          </a:prstGeom>
+        </p:spPr>
+      </p:pic>
+      <p:pic>
+        <p:nvPicPr>
+          <p:cNvPr id="13" name="图片 12"/>
+          <p:cNvPicPr>
+            <a:picLocks noChangeAspect="1"/>
+          </p:cNvPicPr>
+          <p:nvPr/>
+        </p:nvPicPr>
+        <p:blipFill>
+          <a:blip r:embed="rId2">
+            <a:clrChange>
+              <a:clrFrom>
+                <a:srgbClr val="FFFFFF">
+                  <a:alpha val="100000"/>
+                </a:srgbClr>
+              </a:clrFrom>
+              <a:clrTo>
+                <a:srgbClr val="FFFFFF">
+                  <a:alpha val="100000"/>
+                  <a:alpha val="0"/>
+                </a:srgbClr>
+              </a:clrTo>
+            </a:clrChange>
+          </a:blip>
+          <a:stretch>
+            <a:fillRect/>
+          </a:stretch>
+        </p:blipFill>
+        <p:spPr>
+          <a:xfrm>
+            <a:off x="5322570" y="1631315"/>
+            <a:ext cx="4857750" cy="4419600"/>
+          </a:xfrm>
+          <a:prstGeom prst="rect">
+            <a:avLst/>
+          </a:prstGeom>
+        </p:spPr>
+      </p:pic>
+      <p:sp>
+        <p:nvSpPr>
+          <p:cNvPr id="17" name="圆角矩形 16"/>
+          <p:cNvSpPr/>
+          <p:nvPr/>
+        </p:nvSpPr>
+        <p:spPr>
+          <a:xfrm>
+            <a:off x="8159750" y="4761865"/>
+            <a:ext cx="1337310" cy="725805"/>
+          </a:xfrm>
+          <a:prstGeom prst="roundRect">
+            <a:avLst/>
+          </a:prstGeom>
+          <a:noFill/>
+          <a:ln w="28575" cmpd="sng">
+            <a:solidFill>
+              <a:srgbClr val="FF0000"/>
+            </a:solidFill>
+            <a:prstDash val="sysDash"/>
+          </a:ln>
+          <a:effectLst/>
+        </p:spPr>
+        <p:style>
+          <a:lnRef idx="2">
+            <a:schemeClr val="accent1">
+              <a:lumMod val="75000"/>
+            </a:schemeClr>
+          </a:lnRef>
+          <a:fillRef idx="1">
+            <a:schemeClr val="accent1"/>
+          </a:fillRef>
+          <a:effectRef idx="0">
+            <a:srgbClr val="FFFFFF"/>
+          </a:effectRef>
+          <a:fontRef idx="minor">
+            <a:schemeClr val="lt1"/>
+          </a:fontRef>
+        </p:style>
+        <p:txBody>
+          <a:bodyPr rtlCol="0" anchor="ctr"/>
+          <a:p>
+            <a:pPr algn="ctr"/>
+            <a:endParaRPr lang="zh-CN" altLang="en-US"/>
+          </a:p>
+        </p:txBody>
+      </p:sp>
+      <mc:AlternateContent xmlns:mc="http://schemas.openxmlformats.org/markup-compatibility/2006">
+        <mc:Choice xmlns:a14="http://schemas.microsoft.com/office/drawing/2010/main" Requires="a14">
+          <p:sp>
+            <p:nvSpPr>
+              <p:cNvPr id="19" name="标题 2"/>
+              <p:cNvSpPr txBox="1"/>
+              <p:nvPr/>
+            </p:nvSpPr>
+            <p:spPr>
+              <a:xfrm>
+                <a:off x="1132840" y="2621915"/>
+                <a:ext cx="3028950" cy="535305"/>
+              </a:xfrm>
+              <a:prstGeom prst="rect">
+                <a:avLst/>
+              </a:prstGeom>
+              <a:ln w="25400" cap="sq" cmpd="sng">
+                <a:solidFill>
+                  <a:srgbClr val="00B050"/>
+                </a:solidFill>
+                <a:prstDash val="dashDot"/>
+                <a:bevel/>
+              </a:ln>
+              <a:effectLst>
+                <a:outerShdw blurRad="50800" dist="38100" dir="2700000" algn="tl" rotWithShape="0">
+                  <a:prstClr val="black">
+                    <a:alpha val="40000"/>
+                  </a:prstClr>
+                </a:outerShdw>
+              </a:effectLst>
+            </p:spPr>
+            <p:style>
+              <a:lnRef idx="3">
+                <a:schemeClr val="accent1"/>
+              </a:lnRef>
+              <a:fillRef idx="0">
+                <a:srgbClr val="FFFFFF"/>
+              </a:fillRef>
+              <a:effectRef idx="0">
+                <a:srgbClr val="FFFFFF"/>
+              </a:effectRef>
+              <a:fontRef idx="minor">
+                <a:schemeClr val="tx1"/>
+              </a:fontRef>
+            </p:style>
+            <p:txBody>
+              <a:bodyPr vert="horz" lIns="91440" tIns="45720" rIns="91440" bIns="45720" rtlCol="0" anchor="ctr">
+                <a:noAutofit/>
+              </a:bodyPr>
+              <a:lstStyle>
+                <a:lvl1pPr marL="0" algn="l" defTabSz="685800" rtl="0" eaLnBrk="1" latinLnBrk="0" hangingPunct="1">
+                  <a:lnSpc>
+                    <a:spcPct val="100000"/>
+                  </a:lnSpc>
+                  <a:spcBef>
+                    <a:spcPct val="0"/>
+                  </a:spcBef>
+                  <a:buNone/>
+                  <a:defRPr lang="en-US" sz="3200" b="1" kern="1200" dirty="0">
+                    <a:solidFill>
+                      <a:srgbClr val="002060"/>
+                    </a:solidFill>
+                    <a:latin typeface="微软雅黑" panose="020B0503020204020204" pitchFamily="34" charset="-122"/>
+                    <a:ea typeface="微软雅黑" panose="020B0503020204020204" pitchFamily="34" charset="-122"/>
+                    <a:cs typeface="+mn-cs"/>
+                  </a:defRPr>
+                </a:lvl1pPr>
+              </a:lstStyle>
+              <a:p>
+                <a14:m>
+                  <m:oMathPara xmlns:m="http://schemas.openxmlformats.org/officeDocument/2006/math">
+                    <m:oMathParaPr>
+                      <m:jc m:val="centerGroup"/>
+                    </m:oMathParaPr>
+                    <m:oMath xmlns:m="http://schemas.openxmlformats.org/officeDocument/2006/math">
+                      <m:r>
+                        <a:rPr altLang="zh-CN" sz="2000" i="1" dirty="0">
+                          <a:latin typeface="Cambria Math" panose="02040503050406030204" charset="0"/>
+                          <a:cs typeface="Cambria Math" panose="02040503050406030204" charset="0"/>
+                          <a:sym typeface="Arial" panose="020B0604020202020204" pitchFamily="34" charset="0"/>
+                        </a:rPr>
+                        <m:t>𝑯</m:t>
+                      </m:r>
+                      <m:r>
+                        <a:rPr lang="en-US" altLang="zh-CN" sz="2000" b="1" i="1" dirty="0">
+                          <a:latin typeface="Cambria Math" panose="02040503050406030204" charset="0"/>
+                          <a:cs typeface="Cambria Math" panose="02040503050406030204" charset="0"/>
+                          <a:sym typeface="Arial" panose="020B0604020202020204" pitchFamily="34" charset="0"/>
+                        </a:rPr>
+                        <m:t>=</m:t>
+                      </m:r>
+                      <m:r>
+                        <a:rPr lang="en-US" altLang="zh-CN" sz="2000" b="1" i="1" dirty="0">
+                          <a:latin typeface="Cambria Math" panose="02040503050406030204" charset="0"/>
+                          <a:cs typeface="Cambria Math" panose="02040503050406030204" charset="0"/>
+                          <a:sym typeface="Arial" panose="020B0604020202020204" pitchFamily="34" charset="0"/>
+                        </a:rPr>
+                        <m:t>𝑨</m:t>
+                      </m:r>
+                      <m:r>
+                        <a:rPr lang="en-US" altLang="zh-CN" sz="2000" b="1" i="1" dirty="0">
+                          <a:latin typeface="Cambria Math" panose="02040503050406030204" charset="0"/>
+                          <a:cs typeface="Cambria Math" panose="02040503050406030204" charset="0"/>
+                          <a:sym typeface="Arial" panose="020B0604020202020204" pitchFamily="34" charset="0"/>
+                        </a:rPr>
+                        <m:t> @ </m:t>
+                      </m:r>
+                      <m:r>
+                        <a:rPr lang="en-US" altLang="zh-CN" sz="2000" b="1" i="1" dirty="0">
+                          <a:latin typeface="Cambria Math" panose="02040503050406030204" charset="0"/>
+                          <a:cs typeface="Cambria Math" panose="02040503050406030204" charset="0"/>
+                          <a:sym typeface="Arial" panose="020B0604020202020204" pitchFamily="34" charset="0"/>
+                        </a:rPr>
+                        <m:t>𝑩</m:t>
+                      </m:r>
+                      <m:r>
+                        <a:rPr lang="en-US" altLang="zh-CN" sz="2000" b="1" i="1" dirty="0">
+                          <a:latin typeface="Cambria Math" panose="02040503050406030204" charset="0"/>
+                          <a:cs typeface="Cambria Math" panose="02040503050406030204" charset="0"/>
+                          <a:sym typeface="Arial" panose="020B0604020202020204" pitchFamily="34" charset="0"/>
+                        </a:rPr>
+                        <m:t> + </m:t>
+                      </m:r>
+                      <m:r>
+                        <a:rPr lang="en-US" altLang="zh-CN" sz="2000" b="1" i="1" dirty="0">
+                          <a:latin typeface="Cambria Math" panose="02040503050406030204" charset="0"/>
+                          <a:cs typeface="Cambria Math" panose="02040503050406030204" charset="0"/>
+                          <a:sym typeface="Arial" panose="020B0604020202020204" pitchFamily="34" charset="0"/>
+                        </a:rPr>
+                        <m:t>𝑪</m:t>
+                      </m:r>
+                      <m:r>
+                        <a:rPr lang="en-US" altLang="zh-CN" sz="2000" b="1" i="1" dirty="0">
+                          <a:latin typeface="Cambria Math" panose="02040503050406030204" charset="0"/>
+                          <a:cs typeface="Cambria Math" panose="02040503050406030204" charset="0"/>
+                          <a:sym typeface="Arial" panose="020B0604020202020204" pitchFamily="34" charset="0"/>
+                        </a:rPr>
+                        <m:t> </m:t>
+                      </m:r>
+                    </m:oMath>
+                  </m:oMathPara>
+                </a14:m>
+                <a:endParaRPr lang="zh-CN" altLang="en-US" sz="2000" dirty="0">
+                  <a:latin typeface="Arial" panose="020B0604020202020204" pitchFamily="34" charset="0"/>
+                  <a:sym typeface="Arial" panose="020B0604020202020204" pitchFamily="34" charset="0"/>
+                </a:endParaRPr>
+              </a:p>
+            </p:txBody>
+          </p:sp>
+        </mc:Choice>
+        <mc:Fallback>
+          <p:sp>
+            <p:nvSpPr>
+              <p:cNvPr id="19" name="标题 2"/>
+              <p:cNvSpPr txBox="1">
+                <a:spLocks noRot="1" noChangeAspect="1" noMove="1" noResize="1" noEditPoints="1" noAdjustHandles="1" noChangeArrowheads="1" noChangeShapeType="1" noTextEdit="1"/>
+              </p:cNvSpPr>
+              <p:nvPr/>
+            </p:nvSpPr>
+            <p:spPr>
+              <a:xfrm>
+                <a:off x="1132840" y="2621915"/>
+                <a:ext cx="3028950" cy="535305"/>
+              </a:xfrm>
+              <a:prstGeom prst="rect">
+                <a:avLst/>
+              </a:prstGeom>
+              <a:blipFill rotWithShape="1">
+                <a:blip r:embed="rId3"/>
+                <a:stretch>
+                  <a:fillRect l="-964" t="-5457" r="-2704" b="-15302"/>
+                </a:stretch>
+              </a:blipFill>
+              <a:ln w="25400" cap="sq" cmpd="sng">
+                <a:solidFill>
+                  <a:srgbClr val="00B050"/>
+                </a:solidFill>
+                <a:prstDash val="dashDot"/>
+                <a:bevel/>
+              </a:ln>
+              <a:effectLst>
+                <a:outerShdw blurRad="50800" dist="38100" dir="2700000" algn="tl" rotWithShape="0">
+                  <a:prstClr val="black">
+                    <a:alpha val="40000"/>
+                  </a:prstClr>
+                </a:outerShdw>
+              </a:effectLst>
+            </p:spPr>
+            <p:style>
+              <a:lnRef idx="3">
+                <a:schemeClr val="accent1"/>
+              </a:lnRef>
+              <a:fillRef idx="0">
+                <a:srgbClr val="FFFFFF"/>
+              </a:fillRef>
+              <a:effectRef idx="0">
+                <a:srgbClr val="FFFFFF"/>
+              </a:effectRef>
+              <a:fontRef idx="minor">
+                <a:schemeClr val="tx1"/>
+              </a:fontRef>
+            </p:style>
+            <p:txBody>
+              <a:bodyPr/>
+              <a:lstStyle/>
+              <a:p>
+                <a:r>
+                  <a:rPr lang="zh-CN" altLang="en-US">
+                    <a:noFill/>
+                  </a:rPr>
+                  <a:t> </a:t>
+                </a:r>
+              </a:p>
+            </p:txBody>
+          </p:sp>
+        </mc:Fallback>
+      </mc:AlternateContent>
+      <mc:AlternateContent xmlns:mc="http://schemas.openxmlformats.org/markup-compatibility/2006">
+        <mc:Choice xmlns:a14="http://schemas.microsoft.com/office/drawing/2010/main" Requires="a14">
+          <p:sp>
+            <p:nvSpPr>
+              <p:cNvPr id="20" name="标题 2"/>
+              <p:cNvSpPr txBox="1"/>
+              <p:nvPr/>
+            </p:nvSpPr>
+            <p:spPr>
+              <a:xfrm>
+                <a:off x="231140" y="3810000"/>
+                <a:ext cx="3028950" cy="951865"/>
+              </a:xfrm>
+              <a:prstGeom prst="rect">
+                <a:avLst/>
+              </a:prstGeom>
+              <a:ln w="25400" cap="sq" cmpd="sng">
+                <a:solidFill>
+                  <a:srgbClr val="00B050"/>
+                </a:solidFill>
+                <a:prstDash val="dashDot"/>
+                <a:bevel/>
+              </a:ln>
+              <a:effectLst>
+                <a:outerShdw blurRad="50800" dist="38100" dir="2700000" algn="tl" rotWithShape="0">
+                  <a:prstClr val="black">
+                    <a:alpha val="40000"/>
+                  </a:prstClr>
+                </a:outerShdw>
+              </a:effectLst>
+            </p:spPr>
+            <p:style>
+              <a:lnRef idx="3">
+                <a:schemeClr val="accent1"/>
+              </a:lnRef>
+              <a:fillRef idx="0">
+                <a:srgbClr val="FFFFFF"/>
+              </a:fillRef>
+              <a:effectRef idx="0">
+                <a:srgbClr val="FFFFFF"/>
+              </a:effectRef>
+              <a:fontRef idx="minor">
+                <a:schemeClr val="tx1"/>
+              </a:fontRef>
+            </p:style>
+            <p:txBody>
+              <a:bodyPr vert="horz" lIns="91440" tIns="45720" rIns="91440" bIns="45720" rtlCol="0" anchor="ctr">
+                <a:noAutofit/>
+              </a:bodyPr>
+              <a:lstStyle>
+                <a:lvl1pPr marL="0" algn="l" defTabSz="685800" rtl="0" eaLnBrk="1" latinLnBrk="0" hangingPunct="1">
+                  <a:lnSpc>
+                    <a:spcPct val="100000"/>
+                  </a:lnSpc>
+                  <a:spcBef>
+                    <a:spcPct val="0"/>
+                  </a:spcBef>
+                  <a:buNone/>
+                  <a:defRPr lang="en-US" sz="3200" b="1" kern="1200" dirty="0">
+                    <a:solidFill>
+                      <a:srgbClr val="002060"/>
+                    </a:solidFill>
+                    <a:latin typeface="微软雅黑" panose="020B0503020204020204" pitchFamily="34" charset="-122"/>
+                    <a:ea typeface="微软雅黑" panose="020B0503020204020204" pitchFamily="34" charset="-122"/>
+                    <a:cs typeface="+mn-cs"/>
+                  </a:defRPr>
+                </a:lvl1pPr>
+              </a:lstStyle>
+              <a:p>
+                <a14:m>
+                  <m:oMathPara xmlns:m="http://schemas.openxmlformats.org/officeDocument/2006/math">
+                    <m:oMathParaPr>
+                      <m:jc m:val="centerGroup"/>
+                    </m:oMathParaPr>
+                    <m:oMath xmlns:m="http://schemas.openxmlformats.org/officeDocument/2006/math">
+                      <m:r>
+                        <a:rPr lang="en-US" altLang="zh-CN" sz="2000" b="1" i="1" dirty="0">
+                          <a:latin typeface="Cambria Math" panose="02040503050406030204" charset="0"/>
+                          <a:cs typeface="Cambria Math" panose="02040503050406030204" charset="0"/>
+                          <a:sym typeface="Arial" panose="020B0604020202020204" pitchFamily="34" charset="0"/>
+                        </a:rPr>
+                        <m:t>𝒅𝑨</m:t>
+                      </m:r>
+                      <m:r>
+                        <a:rPr lang="en-US" altLang="zh-CN" sz="2000" b="1" i="1" dirty="0">
+                          <a:latin typeface="Cambria Math" panose="02040503050406030204" charset="0"/>
+                          <a:cs typeface="Cambria Math" panose="02040503050406030204" charset="0"/>
+                          <a:sym typeface="Arial" panose="020B0604020202020204" pitchFamily="34" charset="0"/>
+                        </a:rPr>
+                        <m:t>= </m:t>
+                      </m:r>
+                      <m:f>
+                        <m:fPr>
+                          <m:ctrlPr>
+                            <a:rPr lang="en-US" altLang="zh-CN" sz="2000" b="1" i="1" dirty="0">
+                              <a:latin typeface="Cambria Math" panose="02040503050406030204" charset="0"/>
+                              <a:cs typeface="Cambria Math" panose="02040503050406030204" charset="0"/>
+                              <a:sym typeface="Arial" panose="020B0604020202020204" pitchFamily="34" charset="0"/>
+                            </a:rPr>
+                          </m:ctrlPr>
+                        </m:fPr>
+                        <m:num>
+                          <m:r>
+                            <a:rPr lang="en-US" altLang="zh-CN" sz="2000" b="1" i="1" dirty="0">
+                              <a:latin typeface="Cambria Math" panose="02040503050406030204" charset="0"/>
+                              <a:cs typeface="Cambria Math" panose="02040503050406030204" charset="0"/>
+                              <a:sym typeface="Arial" panose="020B0604020202020204" pitchFamily="34" charset="0"/>
+                            </a:rPr>
+                            <m:t>𝒅𝑳</m:t>
+                          </m:r>
+                        </m:num>
+                        <m:den>
+                          <m:r>
+                            <a:rPr lang="en-US" altLang="zh-CN" sz="2000" b="1" i="1" dirty="0">
+                              <a:latin typeface="Cambria Math" panose="02040503050406030204" charset="0"/>
+                              <a:cs typeface="Cambria Math" panose="02040503050406030204" charset="0"/>
+                              <a:sym typeface="Arial" panose="020B0604020202020204" pitchFamily="34" charset="0"/>
+                            </a:rPr>
+                            <m:t>𝒅𝑯</m:t>
+                          </m:r>
+                        </m:den>
+                      </m:f>
+                      <m:r>
+                        <a:rPr lang="en-US" altLang="zh-CN" sz="2000" b="1" i="1" dirty="0">
+                          <a:latin typeface="Cambria Math" panose="02040503050406030204" charset="0"/>
+                          <a:cs typeface="Cambria Math" panose="02040503050406030204" charset="0"/>
+                          <a:sym typeface="Arial" panose="020B0604020202020204" pitchFamily="34" charset="0"/>
+                        </a:rPr>
+                        <m:t>@ </m:t>
+                      </m:r>
+                      <m:sSup>
+                        <m:sSupPr>
+                          <m:ctrlPr>
+                            <a:rPr lang="en-US" altLang="zh-CN" sz="2000" b="1" i="1" dirty="0">
+                              <a:latin typeface="Cambria Math" panose="02040503050406030204" charset="0"/>
+                              <a:cs typeface="Cambria Math" panose="02040503050406030204" charset="0"/>
+                              <a:sym typeface="Arial" panose="020B0604020202020204" pitchFamily="34" charset="0"/>
+                            </a:rPr>
+                          </m:ctrlPr>
+                        </m:sSupPr>
+                        <m:e>
+                          <m:r>
+                            <a:rPr lang="en-US" altLang="zh-CN" sz="2000" b="1" i="1" dirty="0">
+                              <a:latin typeface="Cambria Math" panose="02040503050406030204" charset="0"/>
+                              <a:cs typeface="Cambria Math" panose="02040503050406030204" charset="0"/>
+                              <a:sym typeface="Arial" panose="020B0604020202020204" pitchFamily="34" charset="0"/>
+                            </a:rPr>
+                            <m:t>𝑩</m:t>
+                          </m:r>
+                        </m:e>
+                        <m:sup>
+                          <m:r>
+                            <a:rPr lang="en-US" altLang="zh-CN" sz="2000" b="1" i="1" dirty="0">
+                              <a:latin typeface="Cambria Math" panose="02040503050406030204" charset="0"/>
+                              <a:cs typeface="Cambria Math" panose="02040503050406030204" charset="0"/>
+                              <a:sym typeface="Arial" panose="020B0604020202020204" pitchFamily="34" charset="0"/>
+                            </a:rPr>
+                            <m:t>𝑻</m:t>
+                          </m:r>
+                        </m:sup>
+                      </m:sSup>
+                      <m:r>
+                        <a:rPr lang="en-US" altLang="zh-CN" sz="2000" b="1" i="1" dirty="0">
+                          <a:latin typeface="Cambria Math" panose="02040503050406030204" charset="0"/>
+                          <a:cs typeface="Cambria Math" panose="02040503050406030204" charset="0"/>
+                          <a:sym typeface="Arial" panose="020B0604020202020204" pitchFamily="34" charset="0"/>
+                        </a:rPr>
+                        <m:t> </m:t>
+                      </m:r>
+                    </m:oMath>
+                  </m:oMathPara>
+                </a14:m>
+                <a:endParaRPr lang="zh-CN" altLang="en-US" sz="2000" dirty="0">
+                  <a:latin typeface="Arial" panose="020B0604020202020204" pitchFamily="34" charset="0"/>
+                  <a:sym typeface="Arial" panose="020B0604020202020204" pitchFamily="34" charset="0"/>
+                </a:endParaRPr>
+              </a:p>
+            </p:txBody>
+          </p:sp>
+        </mc:Choice>
+        <mc:Fallback>
+          <p:sp>
+            <p:nvSpPr>
+              <p:cNvPr id="20" name="标题 2"/>
+              <p:cNvSpPr txBox="1">
+                <a:spLocks noRot="1" noChangeAspect="1" noMove="1" noResize="1" noEditPoints="1" noAdjustHandles="1" noChangeArrowheads="1" noChangeShapeType="1" noTextEdit="1"/>
+              </p:cNvSpPr>
+              <p:nvPr/>
+            </p:nvSpPr>
+            <p:spPr>
+              <a:xfrm>
+                <a:off x="231140" y="3810000"/>
+                <a:ext cx="3028950" cy="951865"/>
+              </a:xfrm>
+              <a:prstGeom prst="rect">
+                <a:avLst/>
+              </a:prstGeom>
+              <a:blipFill rotWithShape="1">
+                <a:blip r:embed="rId4"/>
+                <a:stretch>
+                  <a:fillRect l="-964" t="-3069" r="-2704" b="-8606"/>
+                </a:stretch>
+              </a:blipFill>
+              <a:ln w="25400" cap="sq" cmpd="sng">
+                <a:solidFill>
+                  <a:srgbClr val="00B050"/>
+                </a:solidFill>
+                <a:prstDash val="dashDot"/>
+                <a:bevel/>
+              </a:ln>
+              <a:effectLst>
+                <a:outerShdw blurRad="50800" dist="38100" dir="2700000" algn="tl" rotWithShape="0">
+                  <a:prstClr val="black">
+                    <a:alpha val="40000"/>
+                  </a:prstClr>
+                </a:outerShdw>
+              </a:effectLst>
+            </p:spPr>
+            <p:style>
+              <a:lnRef idx="3">
+                <a:schemeClr val="accent1"/>
+              </a:lnRef>
+              <a:fillRef idx="0">
+                <a:srgbClr val="FFFFFF"/>
+              </a:fillRef>
+              <a:effectRef idx="0">
+                <a:srgbClr val="FFFFFF"/>
+              </a:effectRef>
+              <a:fontRef idx="minor">
+                <a:schemeClr val="tx1"/>
+              </a:fontRef>
+            </p:style>
+            <p:txBody>
+              <a:bodyPr/>
+              <a:lstStyle/>
+              <a:p>
+                <a:r>
+                  <a:rPr lang="zh-CN" altLang="en-US">
+                    <a:noFill/>
+                  </a:rPr>
+                  <a:t> </a:t>
+                </a:r>
+              </a:p>
+            </p:txBody>
+          </p:sp>
+        </mc:Fallback>
+      </mc:AlternateContent>
+      <mc:AlternateContent xmlns:mc="http://schemas.openxmlformats.org/markup-compatibility/2006">
+        <mc:Choice xmlns:a14="http://schemas.microsoft.com/office/drawing/2010/main" Requires="a14">
+          <p:sp>
+            <p:nvSpPr>
+              <p:cNvPr id="21" name="标题 2"/>
+              <p:cNvSpPr txBox="1"/>
+              <p:nvPr/>
+            </p:nvSpPr>
+            <p:spPr>
+              <a:xfrm>
+                <a:off x="1860550" y="5099050"/>
+                <a:ext cx="3028950" cy="951865"/>
+              </a:xfrm>
+              <a:prstGeom prst="rect">
+                <a:avLst/>
+              </a:prstGeom>
+              <a:ln w="25400" cap="sq" cmpd="sng">
+                <a:solidFill>
+                  <a:srgbClr val="00B050"/>
+                </a:solidFill>
+                <a:prstDash val="dashDot"/>
+                <a:bevel/>
+              </a:ln>
+              <a:effectLst>
+                <a:outerShdw blurRad="50800" dist="38100" dir="2700000" algn="tl" rotWithShape="0">
+                  <a:prstClr val="black">
+                    <a:alpha val="40000"/>
+                  </a:prstClr>
+                </a:outerShdw>
+              </a:effectLst>
+            </p:spPr>
+            <p:style>
+              <a:lnRef idx="3">
+                <a:schemeClr val="accent1"/>
+              </a:lnRef>
+              <a:fillRef idx="0">
+                <a:srgbClr val="FFFFFF"/>
+              </a:fillRef>
+              <a:effectRef idx="0">
+                <a:srgbClr val="FFFFFF"/>
+              </a:effectRef>
+              <a:fontRef idx="minor">
+                <a:schemeClr val="tx1"/>
+              </a:fontRef>
+            </p:style>
+            <p:txBody>
+              <a:bodyPr vert="horz" lIns="91440" tIns="45720" rIns="91440" bIns="45720" rtlCol="0" anchor="ctr">
+                <a:noAutofit/>
+              </a:bodyPr>
+              <a:lstStyle>
+                <a:lvl1pPr marL="0" algn="l" defTabSz="685800" rtl="0" eaLnBrk="1" latinLnBrk="0" hangingPunct="1">
+                  <a:lnSpc>
+                    <a:spcPct val="100000"/>
+                  </a:lnSpc>
+                  <a:spcBef>
+                    <a:spcPct val="0"/>
+                  </a:spcBef>
+                  <a:buNone/>
+                  <a:defRPr lang="en-US" sz="3200" b="1" kern="1200" dirty="0">
+                    <a:solidFill>
+                      <a:srgbClr val="002060"/>
+                    </a:solidFill>
+                    <a:latin typeface="微软雅黑" panose="020B0503020204020204" pitchFamily="34" charset="-122"/>
+                    <a:ea typeface="微软雅黑" panose="020B0503020204020204" pitchFamily="34" charset="-122"/>
+                    <a:cs typeface="+mn-cs"/>
+                  </a:defRPr>
+                </a:lvl1pPr>
+              </a:lstStyle>
+              <a:p>
+                <a14:m>
+                  <m:oMathPara xmlns:m="http://schemas.openxmlformats.org/officeDocument/2006/math">
+                    <m:oMathParaPr>
+                      <m:jc m:val="centerGroup"/>
+                    </m:oMathParaPr>
+                    <m:oMath xmlns:m="http://schemas.openxmlformats.org/officeDocument/2006/math">
+                      <m:r>
+                        <a:rPr lang="en-US" altLang="zh-CN" sz="2000" b="1" i="1" dirty="0">
+                          <a:latin typeface="Cambria Math" panose="02040503050406030204" charset="0"/>
+                          <a:cs typeface="Cambria Math" panose="02040503050406030204" charset="0"/>
+                          <a:sym typeface="Arial" panose="020B0604020202020204" pitchFamily="34" charset="0"/>
+                        </a:rPr>
+                        <m:t>𝒅𝑩</m:t>
+                      </m:r>
+                      <m:r>
+                        <a:rPr lang="en-US" altLang="zh-CN" sz="2000" b="1" i="1" dirty="0">
+                          <a:latin typeface="Cambria Math" panose="02040503050406030204" charset="0"/>
+                          <a:cs typeface="Cambria Math" panose="02040503050406030204" charset="0"/>
+                          <a:sym typeface="Arial" panose="020B0604020202020204" pitchFamily="34" charset="0"/>
+                        </a:rPr>
+                        <m:t>=</m:t>
+                      </m:r>
+                      <m:sSup>
+                        <m:sSupPr>
+                          <m:ctrlPr>
+                            <a:rPr lang="en-US" altLang="zh-CN" sz="2000" b="1" i="1" dirty="0">
+                              <a:latin typeface="Cambria Math" panose="02040503050406030204" charset="0"/>
+                              <a:cs typeface="Cambria Math" panose="02040503050406030204" charset="0"/>
+                              <a:sym typeface="Arial" panose="020B0604020202020204" pitchFamily="34" charset="0"/>
+                            </a:rPr>
+                          </m:ctrlPr>
+                        </m:sSupPr>
+                        <m:e>
+                          <m:r>
+                            <a:rPr lang="en-US" altLang="zh-CN" sz="2000" b="1" i="1" dirty="0">
+                              <a:latin typeface="Cambria Math" panose="02040503050406030204" charset="0"/>
+                              <a:cs typeface="Cambria Math" panose="02040503050406030204" charset="0"/>
+                              <a:sym typeface="Arial" panose="020B0604020202020204" pitchFamily="34" charset="0"/>
+                            </a:rPr>
+                            <m:t>𝑨</m:t>
+                          </m:r>
+                        </m:e>
+                        <m:sup>
+                          <m:r>
+                            <a:rPr lang="en-US" altLang="zh-CN" sz="2000" b="1" i="1" dirty="0">
+                              <a:latin typeface="Cambria Math" panose="02040503050406030204" charset="0"/>
+                              <a:cs typeface="Cambria Math" panose="02040503050406030204" charset="0"/>
+                              <a:sym typeface="Arial" panose="020B0604020202020204" pitchFamily="34" charset="0"/>
+                            </a:rPr>
+                            <m:t>𝑻</m:t>
+                          </m:r>
+                        </m:sup>
+                      </m:sSup>
+                      <m:r>
+                        <a:rPr lang="en-US" altLang="zh-CN" sz="2000" b="1" i="1" dirty="0">
+                          <a:latin typeface="Cambria Math" panose="02040503050406030204" charset="0"/>
+                          <a:cs typeface="Cambria Math" panose="02040503050406030204" charset="0"/>
+                          <a:sym typeface="Arial" panose="020B0604020202020204" pitchFamily="34" charset="0"/>
+                        </a:rPr>
+                        <m:t> </m:t>
+                      </m:r>
+                      <m:r>
+                        <a:rPr lang="en-US" altLang="zh-CN" sz="2000" b="1" i="1" dirty="0">
+                          <a:latin typeface="Cambria Math" panose="02040503050406030204" charset="0"/>
+                          <a:cs typeface="Cambria Math" panose="02040503050406030204" charset="0"/>
+                          <a:sym typeface="Arial" panose="020B0604020202020204" pitchFamily="34" charset="0"/>
+                        </a:rPr>
+                        <m:t>@ </m:t>
+                      </m:r>
+                      <m:f>
+                        <m:fPr>
+                          <m:ctrlPr>
+                            <a:rPr lang="en-US" altLang="zh-CN" sz="2000" b="1" i="1" dirty="0">
+                              <a:latin typeface="Cambria Math" panose="02040503050406030204" charset="0"/>
+                              <a:cs typeface="Cambria Math" panose="02040503050406030204" charset="0"/>
+                              <a:sym typeface="Arial" panose="020B0604020202020204" pitchFamily="34" charset="0"/>
+                            </a:rPr>
+                          </m:ctrlPr>
+                        </m:fPr>
+                        <m:num>
+                          <m:r>
+                            <a:rPr lang="en-US" altLang="zh-CN" sz="2000" b="1" i="1" dirty="0">
+                              <a:latin typeface="Cambria Math" panose="02040503050406030204" charset="0"/>
+                              <a:cs typeface="Cambria Math" panose="02040503050406030204" charset="0"/>
+                              <a:sym typeface="Arial" panose="020B0604020202020204" pitchFamily="34" charset="0"/>
+                            </a:rPr>
+                            <m:t>𝒅𝑳</m:t>
+                          </m:r>
+                        </m:num>
+                        <m:den>
+                          <m:r>
+                            <a:rPr lang="en-US" altLang="zh-CN" sz="2000" b="1" i="1" dirty="0">
+                              <a:latin typeface="Cambria Math" panose="02040503050406030204" charset="0"/>
+                              <a:cs typeface="Cambria Math" panose="02040503050406030204" charset="0"/>
+                              <a:sym typeface="Arial" panose="020B0604020202020204" pitchFamily="34" charset="0"/>
+                            </a:rPr>
+                            <m:t>𝒅𝑯</m:t>
+                          </m:r>
+                        </m:den>
+                      </m:f>
+                      <m:r>
+                        <a:rPr lang="en-US" altLang="zh-CN" sz="2000" b="1" i="1" dirty="0">
+                          <a:latin typeface="Cambria Math" panose="02040503050406030204" charset="0"/>
+                          <a:cs typeface="Cambria Math" panose="02040503050406030204" charset="0"/>
+                          <a:sym typeface="Arial" panose="020B0604020202020204" pitchFamily="34" charset="0"/>
+                        </a:rPr>
+                        <m:t>  </m:t>
+                      </m:r>
+                    </m:oMath>
+                  </m:oMathPara>
+                </a14:m>
+                <a:endParaRPr lang="zh-CN" altLang="en-US" sz="2000" dirty="0">
+                  <a:latin typeface="Arial" panose="020B0604020202020204" pitchFamily="34" charset="0"/>
+                  <a:sym typeface="Arial" panose="020B0604020202020204" pitchFamily="34" charset="0"/>
+                </a:endParaRPr>
+              </a:p>
+            </p:txBody>
+          </p:sp>
+        </mc:Choice>
+        <mc:Fallback>
+          <p:sp>
+            <p:nvSpPr>
+              <p:cNvPr id="21" name="标题 2"/>
+              <p:cNvSpPr txBox="1">
+                <a:spLocks noRot="1" noChangeAspect="1" noMove="1" noResize="1" noEditPoints="1" noAdjustHandles="1" noChangeArrowheads="1" noChangeShapeType="1" noTextEdit="1"/>
+              </p:cNvSpPr>
+              <p:nvPr/>
+            </p:nvSpPr>
+            <p:spPr>
+              <a:xfrm>
+                <a:off x="1860550" y="5099050"/>
+                <a:ext cx="3028950" cy="951865"/>
+              </a:xfrm>
+              <a:prstGeom prst="rect">
+                <a:avLst/>
+              </a:prstGeom>
+              <a:blipFill rotWithShape="1">
+                <a:blip r:embed="rId5"/>
+                <a:stretch>
+                  <a:fillRect l="-964" t="-3069" r="-2704" b="-8606"/>
+                </a:stretch>
+              </a:blipFill>
+              <a:ln w="25400" cap="sq" cmpd="sng">
+                <a:solidFill>
+                  <a:srgbClr val="00B050"/>
+                </a:solidFill>
+                <a:prstDash val="dashDot"/>
+                <a:bevel/>
+              </a:ln>
+              <a:effectLst>
+                <a:outerShdw blurRad="50800" dist="38100" dir="2700000" algn="tl" rotWithShape="0">
+                  <a:prstClr val="black">
+                    <a:alpha val="40000"/>
+                  </a:prstClr>
+                </a:outerShdw>
+              </a:effectLst>
+            </p:spPr>
+            <p:style>
+              <a:lnRef idx="3">
+                <a:schemeClr val="accent1"/>
+              </a:lnRef>
+              <a:fillRef idx="0">
+                <a:srgbClr val="FFFFFF"/>
+              </a:fillRef>
+              <a:effectRef idx="0">
+                <a:srgbClr val="FFFFFF"/>
+              </a:effectRef>
+              <a:fontRef idx="minor">
+                <a:schemeClr val="tx1"/>
+              </a:fontRef>
+            </p:style>
+            <p:txBody>
+              <a:bodyPr/>
+              <a:lstStyle/>
+              <a:p>
+                <a:r>
+                  <a:rPr lang="zh-CN" altLang="en-US">
+                    <a:noFill/>
+                  </a:rPr>
+                  <a:t> </a:t>
+                </a:r>
+              </a:p>
+            </p:txBody>
+          </p:sp>
+        </mc:Fallback>
+      </mc:AlternateContent>
+      <p:cxnSp>
+        <p:nvCxnSpPr>
+          <p:cNvPr id="22" name="直接箭头连接符 21"/>
+          <p:cNvCxnSpPr/>
+          <p:nvPr/>
+        </p:nvCxnSpPr>
+        <p:spPr>
+          <a:xfrm flipH="1">
+            <a:off x="1143000" y="3026410"/>
+            <a:ext cx="1172210" cy="1094740"/>
+          </a:xfrm>
+          <a:prstGeom prst="straightConnector1">
+            <a:avLst/>
+          </a:prstGeom>
+          <a:ln w="19050" cmpd="sng">
+            <a:solidFill>
+              <a:srgbClr val="FF0000"/>
+            </a:solidFill>
+            <a:prstDash val="lgDashDotDot"/>
+            <a:tailEnd type="arrow"/>
+          </a:ln>
+        </p:spPr>
+        <p:style>
+          <a:lnRef idx="2">
+            <a:schemeClr val="accent1"/>
+          </a:lnRef>
+          <a:fillRef idx="0">
+            <a:srgbClr val="FFFFFF"/>
+          </a:fillRef>
+          <a:effectRef idx="0">
+            <a:srgbClr val="FFFFFF"/>
+          </a:effectRef>
+          <a:fontRef idx="minor">
+            <a:schemeClr val="tx1"/>
+          </a:fontRef>
+        </p:style>
+      </p:cxnSp>
+      <p:cxnSp>
+        <p:nvCxnSpPr>
+          <p:cNvPr id="23" name="直接箭头连接符 22"/>
+          <p:cNvCxnSpPr/>
+          <p:nvPr/>
+        </p:nvCxnSpPr>
+        <p:spPr>
+          <a:xfrm flipH="1">
+            <a:off x="2703195" y="3038475"/>
+            <a:ext cx="165735" cy="2216785"/>
+          </a:xfrm>
+          <a:prstGeom prst="straightConnector1">
+            <a:avLst/>
+          </a:prstGeom>
+          <a:ln w="19050" cmpd="sng">
+            <a:solidFill>
+              <a:srgbClr val="FF0000"/>
+            </a:solidFill>
+            <a:prstDash val="lgDashDotDot"/>
+            <a:tailEnd type="arrow"/>
+          </a:ln>
+        </p:spPr>
+        <p:style>
+          <a:lnRef idx="2">
+            <a:schemeClr val="accent1"/>
+          </a:lnRef>
+          <a:fillRef idx="0">
+            <a:srgbClr val="FFFFFF"/>
+          </a:fillRef>
+          <a:effectRef idx="0">
+            <a:srgbClr val="FFFFFF"/>
+          </a:effectRef>
+          <a:fontRef idx="minor">
+            <a:schemeClr val="tx1"/>
+          </a:fontRef>
+        </p:style>
+      </p:cxnSp>
+      <p:sp>
+        <p:nvSpPr>
+          <p:cNvPr id="24" name="矩形 23"/>
+          <p:cNvSpPr/>
+          <p:nvPr/>
+        </p:nvSpPr>
+        <p:spPr>
+          <a:xfrm>
+            <a:off x="3275330" y="2696845"/>
+            <a:ext cx="339090" cy="377825"/>
+          </a:xfrm>
+          <a:prstGeom prst="rect">
+            <a:avLst/>
+          </a:prstGeom>
+          <a:noFill/>
+          <a:ln w="19050" cmpd="sng">
+            <a:solidFill>
+              <a:srgbClr val="FF0000"/>
+            </a:solidFill>
+            <a:prstDash val="sysDot"/>
+          </a:ln>
+        </p:spPr>
+        <p:style>
+          <a:lnRef idx="2">
+            <a:schemeClr val="accent1">
+              <a:lumMod val="75000"/>
+            </a:schemeClr>
+          </a:lnRef>
+          <a:fillRef idx="1">
+            <a:schemeClr val="accent1"/>
+          </a:fillRef>
+          <a:effectRef idx="0">
+            <a:srgbClr val="FFFFFF"/>
+          </a:effectRef>
+          <a:fontRef idx="minor">
+            <a:schemeClr val="lt1"/>
+          </a:fontRef>
+        </p:style>
+        <p:txBody>
+          <a:bodyPr rtlCol="0" anchor="ctr"/>
+          <a:p>
+            <a:pPr algn="ctr"/>
+            <a:endParaRPr lang="zh-CN" altLang="en-US"/>
+          </a:p>
+        </p:txBody>
+      </p:sp>
+      <p:cxnSp>
+        <p:nvCxnSpPr>
+          <p:cNvPr id="25" name="直接箭头连接符 24"/>
+          <p:cNvCxnSpPr>
+            <a:stCxn id="24" idx="2"/>
+          </p:cNvCxnSpPr>
+          <p:nvPr/>
+        </p:nvCxnSpPr>
+        <p:spPr>
+          <a:xfrm>
+            <a:off x="3444875" y="3074670"/>
+            <a:ext cx="499110" cy="542925"/>
+          </a:xfrm>
+          <a:prstGeom prst="straightConnector1">
+            <a:avLst/>
+          </a:prstGeom>
+          <a:ln w="19050" cmpd="sng">
+            <a:solidFill>
+              <a:srgbClr val="FF0000"/>
+            </a:solidFill>
+            <a:prstDash val="lgDashDotDot"/>
+            <a:tailEnd type="arrow"/>
+          </a:ln>
+        </p:spPr>
+        <p:style>
+          <a:lnRef idx="2">
+            <a:schemeClr val="accent1"/>
+          </a:lnRef>
+          <a:fillRef idx="0">
+            <a:srgbClr val="FFFFFF"/>
+          </a:fillRef>
+          <a:effectRef idx="0">
+            <a:srgbClr val="FFFFFF"/>
+          </a:effectRef>
+          <a:fontRef idx="minor">
+            <a:schemeClr val="tx1"/>
+          </a:fontRef>
+        </p:style>
+      </p:cxnSp>
+      <mc:AlternateContent xmlns:mc="http://schemas.openxmlformats.org/markup-compatibility/2006">
+        <mc:Choice xmlns:a14="http://schemas.microsoft.com/office/drawing/2010/main" Requires="a14">
+          <p:sp>
+            <p:nvSpPr>
+              <p:cNvPr id="26" name="标题 2"/>
+              <p:cNvSpPr txBox="1"/>
+              <p:nvPr/>
+            </p:nvSpPr>
+            <p:spPr>
+              <a:xfrm>
+                <a:off x="3444875" y="3470275"/>
+                <a:ext cx="1544955" cy="825500"/>
+              </a:xfrm>
+              <a:prstGeom prst="rect">
+                <a:avLst/>
+              </a:prstGeom>
+            </p:spPr>
+            <p:txBody>
+              <a:bodyPr vert="horz" lIns="91440" tIns="45720" rIns="91440" bIns="45720" rtlCol="0" anchor="ctr">
+                <a:noAutofit/>
+              </a:bodyPr>
+              <a:lstStyle>
+                <a:lvl1pPr marL="0" algn="l" defTabSz="685800" rtl="0" eaLnBrk="1" latinLnBrk="0" hangingPunct="1">
+                  <a:lnSpc>
+                    <a:spcPct val="100000"/>
+                  </a:lnSpc>
+                  <a:spcBef>
+                    <a:spcPct val="0"/>
+                  </a:spcBef>
+                  <a:buNone/>
+                  <a:defRPr lang="en-US" sz="3200" b="1" kern="1200" dirty="0">
+                    <a:solidFill>
+                      <a:srgbClr val="002060"/>
+                    </a:solidFill>
+                    <a:latin typeface="微软雅黑" panose="020B0503020204020204" pitchFamily="34" charset="-122"/>
+                    <a:ea typeface="微软雅黑" panose="020B0503020204020204" pitchFamily="34" charset="-122"/>
+                    <a:cs typeface="+mn-cs"/>
+                  </a:defRPr>
+                </a:lvl1pPr>
+              </a:lstStyle>
+              <a:p>
+                <a14:m>
+                  <m:oMathPara xmlns:m="http://schemas.openxmlformats.org/officeDocument/2006/math">
+                    <m:oMathParaPr>
+                      <m:jc m:val="centerGroup"/>
+                    </m:oMathParaPr>
+                    <m:oMath xmlns:m="http://schemas.openxmlformats.org/officeDocument/2006/math">
+                      <m:f>
+                        <m:fPr>
+                          <m:ctrlPr>
+                            <a:rPr lang="en-US" altLang="zh-CN" sz="1400" b="1" i="1" dirty="0">
+                              <a:latin typeface="Cambria Math" panose="02040503050406030204" charset="0"/>
+                              <a:cs typeface="Cambria Math" panose="02040503050406030204" charset="0"/>
+                              <a:sym typeface="Arial" panose="020B0604020202020204" pitchFamily="34" charset="0"/>
+                            </a:rPr>
+                          </m:ctrlPr>
+                        </m:fPr>
+                        <m:num>
+                          <m:r>
+                            <a:rPr lang="en-US" altLang="zh-CN" sz="1400" b="1" i="1" dirty="0">
+                              <a:latin typeface="Cambria Math" panose="02040503050406030204" charset="0"/>
+                              <a:cs typeface="Cambria Math" panose="02040503050406030204" charset="0"/>
+                              <a:sym typeface="Arial" panose="020B0604020202020204" pitchFamily="34" charset="0"/>
+                            </a:rPr>
+                            <m:t>𝒅𝑳</m:t>
+                          </m:r>
+                        </m:num>
+                        <m:den>
+                          <m:r>
+                            <a:rPr lang="en-US" altLang="zh-CN" sz="1400" b="1" i="1" dirty="0">
+                              <a:latin typeface="Cambria Math" panose="02040503050406030204" charset="0"/>
+                              <a:cs typeface="Cambria Math" panose="02040503050406030204" charset="0"/>
+                              <a:sym typeface="Arial" panose="020B0604020202020204" pitchFamily="34" charset="0"/>
+                            </a:rPr>
+                            <m:t>𝒅𝑯</m:t>
+                          </m:r>
+                        </m:den>
+                      </m:f>
+                    </m:oMath>
+                  </m:oMathPara>
+                </a14:m>
+                <a:endParaRPr lang="en-US" altLang="zh-CN" sz="1400" b="1" i="1" dirty="0">
+                  <a:latin typeface="Cambria Math" panose="02040503050406030204" charset="0"/>
+                  <a:cs typeface="Cambria Math" panose="02040503050406030204" charset="0"/>
+                  <a:sym typeface="Arial" panose="020B0604020202020204" pitchFamily="34" charset="0"/>
+                </a:endParaRPr>
+              </a:p>
+              <a:p>
+                <a:endParaRPr lang="en-US" altLang="zh-CN" sz="1400" b="1" i="1" dirty="0">
+                  <a:latin typeface="Cambria Math" panose="02040503050406030204" charset="0"/>
+                  <a:cs typeface="Cambria Math" panose="02040503050406030204" charset="0"/>
+                  <a:sym typeface="Arial" panose="020B0604020202020204" pitchFamily="34" charset="0"/>
+                </a:endParaRPr>
+              </a:p>
+              <a:p>
+                <a:r>
+                  <a:rPr lang="zh-CN" altLang="en-US" sz="900" dirty="0">
+                    <a:latin typeface="Cambria Math" panose="02040503050406030204" charset="0"/>
+                    <a:cs typeface="Cambria Math" panose="02040503050406030204" charset="0"/>
+                    <a:sym typeface="Arial" panose="020B0604020202020204" pitchFamily="34" charset="0"/>
+                  </a:rPr>
+                  <a:t>怎么求和形状一样就对</a:t>
+                </a:r>
+                <a:r>
+                  <a:rPr altLang="zh-CN" sz="900" dirty="0">
+                    <a:latin typeface="Cambria Math" panose="02040503050406030204" charset="0"/>
+                    <a:cs typeface="Cambria Math" panose="02040503050406030204" charset="0"/>
+                    <a:sym typeface="Arial" panose="020B0604020202020204" pitchFamily="34" charset="0"/>
+                  </a:rPr>
+                  <a:t> : )</a:t>
+                </a:r>
+                <a:endParaRPr altLang="zh-CN" sz="900" dirty="0">
+                  <a:latin typeface="Cambria Math" panose="02040503050406030204" charset="0"/>
+                  <a:cs typeface="Cambria Math" panose="02040503050406030204" charset="0"/>
+                  <a:sym typeface="Arial" panose="020B0604020202020204" pitchFamily="34" charset="0"/>
+                </a:endParaRPr>
+              </a:p>
+            </p:txBody>
+          </p:sp>
+        </mc:Choice>
+        <mc:Fallback>
+          <p:sp>
+            <p:nvSpPr>
+              <p:cNvPr id="26" name="标题 2"/>
+              <p:cNvSpPr txBox="1">
+                <a:spLocks noRot="1" noChangeAspect="1" noMove="1" noResize="1" noEditPoints="1" noAdjustHandles="1" noChangeArrowheads="1" noChangeShapeType="1" noTextEdit="1"/>
+              </p:cNvSpPr>
+              <p:nvPr/>
+            </p:nvSpPr>
+            <p:spPr>
+              <a:xfrm>
+                <a:off x="3444875" y="3470275"/>
+                <a:ext cx="1544955" cy="825500"/>
+              </a:xfrm>
+              <a:prstGeom prst="rect">
+                <a:avLst/>
+              </a:prstGeom>
+              <a:blipFill rotWithShape="1">
+                <a:blip r:embed="rId6"/>
+                <a:stretch>
+                  <a:fillRect/>
+                </a:stretch>
+              </a:blipFill>
+            </p:spPr>
+            <p:txBody>
+              <a:bodyPr/>
+              <a:lstStyle/>
+              <a:p>
+                <a:r>
+                  <a:rPr lang="zh-CN" altLang="en-US">
+                    <a:noFill/>
+                  </a:rPr>
+                  <a:t> </a:t>
+                </a:r>
+              </a:p>
+            </p:txBody>
+          </p:sp>
+        </mc:Fallback>
+      </mc:AlternateContent>
+    </p:spTree>
+  </p:cSld>
+  <p:clrMapOvr>
+    <a:masterClrMapping/>
+  </p:clrMapOvr>
+  <p:transition advClick="0" advTm="0"/>
+</p:sld>
+</file>
+
+<file path=ppt/slides/slide9.xml><?xml version="1.0" encoding="utf-8"?>
 <p:sld xmlns:a="http://schemas.openxmlformats.org/drawingml/2006/main" xmlns:r="http://schemas.openxmlformats.org/officeDocument/2006/relationships" xmlns:p="http://schemas.openxmlformats.org/presentationml/2006/main">
   <p:cSld>
     <p:spTree>

</xml_diff>

<commit_message>
finished karpathy, begin diveintopytorch 20240720
</commit_message>
<xml_diff>
--- a/Summary.pptx
+++ b/Summary.pptx
@@ -19,12 +19,14 @@
     <p:sldId id="1459" r:id="rId12"/>
     <p:sldId id="1461" r:id="rId13"/>
     <p:sldId id="1463" r:id="rId14"/>
-    <p:sldId id="1447" r:id="rId15"/>
+    <p:sldId id="1465" r:id="rId15"/>
+    <p:sldId id="1467" r:id="rId16"/>
+    <p:sldId id="1447" r:id="rId17"/>
   </p:sldIdLst>
   <p:sldSz cx="12192000" cy="6858000"/>
   <p:notesSz cx="6858000" cy="9144000"/>
   <p:custDataLst>
-    <p:tags r:id="rId19"/>
+    <p:tags r:id="rId21"/>
   </p:custDataLst>
   <p:defaultTextStyle>
     <a:defPPr>
@@ -610,6 +612,144 @@
 </file>
 
 <file path=ppt/notesSlides/notesSlide11.xml><?xml version="1.0" encoding="utf-8"?>
+<p:notes xmlns:a="http://schemas.openxmlformats.org/drawingml/2006/main" xmlns:r="http://schemas.openxmlformats.org/officeDocument/2006/relationships" xmlns:p="http://schemas.openxmlformats.org/presentationml/2006/main">
+  <p:cSld>
+    <p:spTree>
+      <p:nvGrpSpPr>
+        <p:cNvPr id="1" name=""/>
+        <p:cNvGrpSpPr/>
+        <p:nvPr/>
+      </p:nvGrpSpPr>
+      <p:grpSpPr>
+        <a:xfrm>
+          <a:off x="0" y="0"/>
+          <a:ext cx="0" cy="0"/>
+          <a:chOff x="0" y="0"/>
+          <a:chExt cx="0" cy="0"/>
+        </a:xfrm>
+      </p:grpSpPr>
+      <p:sp>
+        <p:nvSpPr>
+          <p:cNvPr id="2" name="幻灯片图像占位符 1"/>
+          <p:cNvSpPr>
+            <a:spLocks noGrp="1" noRot="1" noChangeAspect="1"/>
+          </p:cNvSpPr>
+          <p:nvPr>
+            <p:ph type="sldImg"/>
+          </p:nvPr>
+        </p:nvSpPr>
+        <p:spPr/>
+      </p:sp>
+      <p:sp>
+        <p:nvSpPr>
+          <p:cNvPr id="3" name="备注占位符 2"/>
+          <p:cNvSpPr>
+            <a:spLocks noGrp="1"/>
+          </p:cNvSpPr>
+          <p:nvPr>
+            <p:ph type="body" idx="1"/>
+          </p:nvPr>
+        </p:nvSpPr>
+        <p:spPr/>
+        <p:txBody>
+          <a:bodyPr/>
+          <a:lstStyle/>
+          <a:p>
+            <a:pPr marL="0" indent="-457200">
+              <a:lnSpc>
+                <a:spcPct val="135000"/>
+              </a:lnSpc>
+              <a:buNone/>
+            </a:pPr>
+            <a:endParaRPr lang="zh-CN" altLang="en-US" sz="1000" dirty="0">
+              <a:solidFill>
+                <a:srgbClr val="00246C"/>
+              </a:solidFill>
+              <a:ea typeface="+mn-ea"/>
+              <a:cs typeface="+mn-ea"/>
+              <a:sym typeface="+mn-lt"/>
+            </a:endParaRPr>
+          </a:p>
+        </p:txBody>
+      </p:sp>
+    </p:spTree>
+  </p:cSld>
+  <p:clrMapOvr>
+    <a:masterClrMapping/>
+  </p:clrMapOvr>
+</p:notes>
+</file>
+
+<file path=ppt/notesSlides/notesSlide12.xml><?xml version="1.0" encoding="utf-8"?>
+<p:notes xmlns:a="http://schemas.openxmlformats.org/drawingml/2006/main" xmlns:r="http://schemas.openxmlformats.org/officeDocument/2006/relationships" xmlns:p="http://schemas.openxmlformats.org/presentationml/2006/main">
+  <p:cSld>
+    <p:spTree>
+      <p:nvGrpSpPr>
+        <p:cNvPr id="1" name=""/>
+        <p:cNvGrpSpPr/>
+        <p:nvPr/>
+      </p:nvGrpSpPr>
+      <p:grpSpPr>
+        <a:xfrm>
+          <a:off x="0" y="0"/>
+          <a:ext cx="0" cy="0"/>
+          <a:chOff x="0" y="0"/>
+          <a:chExt cx="0" cy="0"/>
+        </a:xfrm>
+      </p:grpSpPr>
+      <p:sp>
+        <p:nvSpPr>
+          <p:cNvPr id="2" name="幻灯片图像占位符 1"/>
+          <p:cNvSpPr>
+            <a:spLocks noGrp="1" noRot="1" noChangeAspect="1"/>
+          </p:cNvSpPr>
+          <p:nvPr>
+            <p:ph type="sldImg"/>
+          </p:nvPr>
+        </p:nvSpPr>
+        <p:spPr/>
+      </p:sp>
+      <p:sp>
+        <p:nvSpPr>
+          <p:cNvPr id="3" name="备注占位符 2"/>
+          <p:cNvSpPr>
+            <a:spLocks noGrp="1"/>
+          </p:cNvSpPr>
+          <p:nvPr>
+            <p:ph type="body" idx="1"/>
+          </p:nvPr>
+        </p:nvSpPr>
+        <p:spPr/>
+        <p:txBody>
+          <a:bodyPr/>
+          <a:lstStyle/>
+          <a:p>
+            <a:pPr marL="0" indent="-457200">
+              <a:lnSpc>
+                <a:spcPct val="135000"/>
+              </a:lnSpc>
+              <a:buNone/>
+            </a:pPr>
+            <a:endParaRPr lang="zh-CN" altLang="en-US" sz="1000" dirty="0">
+              <a:solidFill>
+                <a:srgbClr val="00246C"/>
+              </a:solidFill>
+              <a:ea typeface="+mn-ea"/>
+              <a:cs typeface="+mn-ea"/>
+              <a:sym typeface="+mn-lt"/>
+            </a:endParaRPr>
+          </a:p>
+        </p:txBody>
+      </p:sp>
+    </p:spTree>
+  </p:cSld>
+  <p:clrMapOvr>
+    <a:masterClrMapping/>
+  </p:clrMapOvr>
+</p:notes>
+</file>
+
+<file path=ppt/notesSlides/notesSlide13.xml><?xml version="1.0" encoding="utf-8"?>
 <p:notes xmlns:a="http://schemas.openxmlformats.org/drawingml/2006/main" xmlns:r="http://schemas.openxmlformats.org/officeDocument/2006/relationships" xmlns:p="http://schemas.openxmlformats.org/presentationml/2006/main">
   <p:cSld>
     <p:spTree>
@@ -9354,6 +9494,1497 @@
 </file>
 
 <file path=ppt/slides/slide11.xml><?xml version="1.0" encoding="utf-8"?>
+<p:sld xmlns:a="http://schemas.openxmlformats.org/drawingml/2006/main" xmlns:r="http://schemas.openxmlformats.org/officeDocument/2006/relationships" xmlns:p="http://schemas.openxmlformats.org/presentationml/2006/main">
+  <p:cSld>
+    <p:spTree>
+      <p:nvGrpSpPr>
+        <p:cNvPr id="1" name=""/>
+        <p:cNvGrpSpPr/>
+        <p:nvPr/>
+      </p:nvGrpSpPr>
+      <p:grpSpPr>
+        <a:xfrm>
+          <a:off x="0" y="0"/>
+          <a:ext cx="0" cy="0"/>
+          <a:chOff x="0" y="0"/>
+          <a:chExt cx="0" cy="0"/>
+        </a:xfrm>
+      </p:grpSpPr>
+      <p:sp>
+        <p:nvSpPr>
+          <p:cNvPr id="4" name="矩形 12"/>
+          <p:cNvSpPr>
+            <a:spLocks noChangeArrowheads="1"/>
+          </p:cNvSpPr>
+          <p:nvPr/>
+        </p:nvSpPr>
+        <p:spPr bwMode="auto">
+          <a:xfrm>
+            <a:off x="385125" y="188641"/>
+            <a:ext cx="11568417" cy="583565"/>
+          </a:xfrm>
+          <a:prstGeom prst="rect">
+            <a:avLst/>
+          </a:prstGeom>
+          <a:noFill/>
+          <a:ln>
+            <a:noFill/>
+          </a:ln>
+          <a:extLst>
+            <a:ext uri="{909E8E84-426E-40DD-AFC4-6F175D3DCCD1}">
+              <a14:hiddenFill xmlns:a14="http://schemas.microsoft.com/office/drawing/2010/main">
+                <a:solidFill>
+                  <a:srgbClr val="FFFFFF"/>
+                </a:solidFill>
+              </a14:hiddenFill>
+            </a:ext>
+            <a:ext uri="{91240B29-F687-4F45-9708-019B960494DF}">
+              <a14:hiddenLine xmlns:a14="http://schemas.microsoft.com/office/drawing/2010/main" w="9525">
+                <a:solidFill>
+                  <a:srgbClr val="000000"/>
+                </a:solidFill>
+                <a:miter lim="800000"/>
+                <a:headEnd/>
+                <a:tailEnd/>
+              </a14:hiddenLine>
+            </a:ext>
+          </a:extLst>
+        </p:spPr>
+        <p:txBody>
+          <a:bodyPr wrap="square">
+            <a:spAutoFit/>
+          </a:bodyPr>
+          <a:lstStyle/>
+          <a:p>
+            <a:pPr marL="0" lvl="1" defTabSz="457200">
+              <a:buClr>
+                <a:srgbClr val="FF0000"/>
+              </a:buClr>
+              <a:buSzPct val="100000"/>
+            </a:pPr>
+            <a:r>
+              <a:rPr lang="en-US" altLang="zh-CN" sz="3200" b="1" dirty="0">
+                <a:solidFill>
+                  <a:schemeClr val="bg1"/>
+                </a:solidFill>
+                <a:latin typeface="Arial" panose="020B0604020202020204" pitchFamily="34" charset="0"/>
+                <a:ea typeface="微软雅黑" panose="020B0503020204020204" pitchFamily="34" charset="-122"/>
+                <a:cs typeface="+mn-ea"/>
+                <a:sym typeface="Arial" panose="020B0604020202020204" pitchFamily="34" charset="0"/>
+              </a:rPr>
+              <a:t>1.1</a:t>
+            </a:r>
+            <a:r>
+              <a:rPr lang="zh-CN" altLang="en-US" sz="3200" b="1" dirty="0">
+                <a:solidFill>
+                  <a:schemeClr val="bg1"/>
+                </a:solidFill>
+                <a:latin typeface="Arial" panose="020B0604020202020204" pitchFamily="34" charset="0"/>
+                <a:ea typeface="微软雅黑" panose="020B0503020204020204" pitchFamily="34" charset="-122"/>
+                <a:cs typeface="+mn-ea"/>
+                <a:sym typeface="Arial" panose="020B0604020202020204" pitchFamily="34" charset="0"/>
+              </a:rPr>
+              <a:t>染研究意义</a:t>
+            </a:r>
+            <a:endParaRPr lang="zh-CN" altLang="en-US" sz="3200" b="1" dirty="0">
+              <a:solidFill>
+                <a:schemeClr val="bg1"/>
+              </a:solidFill>
+              <a:latin typeface="Arial" panose="020B0604020202020204" pitchFamily="34" charset="0"/>
+              <a:ea typeface="微软雅黑" panose="020B0503020204020204" pitchFamily="34" charset="-122"/>
+              <a:cs typeface="+mn-ea"/>
+              <a:sym typeface="Arial" panose="020B0604020202020204" pitchFamily="34" charset="0"/>
+            </a:endParaRPr>
+          </a:p>
+        </p:txBody>
+      </p:sp>
+      <p:sp>
+        <p:nvSpPr>
+          <p:cNvPr id="3" name="标题 2"/>
+          <p:cNvSpPr>
+            <a:spLocks noGrp="1"/>
+          </p:cNvSpPr>
+          <p:nvPr>
+            <p:ph type="title"/>
+          </p:nvPr>
+        </p:nvSpPr>
+        <p:spPr/>
+        <p:txBody>
+          <a:bodyPr/>
+          <a:lstStyle/>
+          <a:p>
+            <a:r>
+              <a:rPr lang="en-US" altLang="zh-CN" dirty="0">
+                <a:latin typeface="Arial" panose="020B0604020202020204" pitchFamily="34" charset="0"/>
+                <a:sym typeface="Arial" panose="020B0604020202020204" pitchFamily="34" charset="0"/>
+              </a:rPr>
+              <a:t>4. </a:t>
+            </a:r>
+            <a:r>
+              <a:rPr lang="en-US" altLang="zh-CN" dirty="0">
+                <a:latin typeface="Arial" panose="020B0604020202020204" pitchFamily="34" charset="0"/>
+                <a:sym typeface="Arial" panose="020B0604020202020204" pitchFamily="34" charset="0"/>
+              </a:rPr>
+              <a:t>Generalily Pre-trained Transformer</a:t>
+            </a:r>
+            <a:endParaRPr lang="en-US" altLang="zh-CN" dirty="0">
+              <a:latin typeface="Arial" panose="020B0604020202020204" pitchFamily="34" charset="0"/>
+              <a:sym typeface="Arial" panose="020B0604020202020204" pitchFamily="34" charset="0"/>
+            </a:endParaRPr>
+          </a:p>
+        </p:txBody>
+      </p:sp>
+      <p:sp>
+        <p:nvSpPr>
+          <p:cNvPr id="7" name="灯片编号占位符 6"/>
+          <p:cNvSpPr>
+            <a:spLocks noGrp="1"/>
+          </p:cNvSpPr>
+          <p:nvPr>
+            <p:ph type="sldNum" sz="quarter" idx="16"/>
+          </p:nvPr>
+        </p:nvSpPr>
+        <p:spPr/>
+        <p:txBody>
+          <a:bodyPr/>
+          <a:lstStyle/>
+          <a:p>
+            <a:pPr>
+              <a:defRPr/>
+            </a:pPr>
+            <a:fld id="{26F565BE-27A9-4834-BA3A-D46EFBA6086A}" type="slidenum">
+              <a:rPr lang="zh-CN" altLang="en-US" smtClean="0">
+                <a:latin typeface="Arial" panose="020B0604020202020204" pitchFamily="34" charset="0"/>
+                <a:sym typeface="Arial" panose="020B0604020202020204" pitchFamily="34" charset="0"/>
+              </a:rPr>
+            </a:fld>
+            <a:endParaRPr lang="zh-CN" altLang="en-US" dirty="0">
+              <a:latin typeface="Arial" panose="020B0604020202020204" pitchFamily="34" charset="0"/>
+              <a:sym typeface="Arial" panose="020B0604020202020204" pitchFamily="34" charset="0"/>
+            </a:endParaRPr>
+          </a:p>
+        </p:txBody>
+      </p:sp>
+      <p:cxnSp>
+        <p:nvCxnSpPr>
+          <p:cNvPr id="8" name="直接连接符 7"/>
+          <p:cNvCxnSpPr/>
+          <p:nvPr/>
+        </p:nvCxnSpPr>
+        <p:spPr>
+          <a:xfrm>
+            <a:off x="0" y="824357"/>
+            <a:ext cx="3877337" cy="0"/>
+          </a:xfrm>
+          <a:prstGeom prst="line">
+            <a:avLst/>
+          </a:prstGeom>
+          <a:ln w="31750">
+            <a:gradFill flip="none" rotWithShape="1">
+              <a:gsLst>
+                <a:gs pos="0">
+                  <a:schemeClr val="accent1">
+                    <a:lumMod val="40000"/>
+                    <a:lumOff val="60000"/>
+                  </a:schemeClr>
+                </a:gs>
+                <a:gs pos="46000">
+                  <a:schemeClr val="accent1">
+                    <a:lumMod val="40000"/>
+                    <a:lumOff val="60000"/>
+                  </a:schemeClr>
+                </a:gs>
+                <a:gs pos="100000">
+                  <a:schemeClr val="accent1">
+                    <a:lumMod val="75000"/>
+                  </a:schemeClr>
+                </a:gs>
+              </a:gsLst>
+              <a:lin ang="10800000" scaled="0"/>
+              <a:tileRect/>
+            </a:gradFill>
+          </a:ln>
+        </p:spPr>
+        <p:style>
+          <a:lnRef idx="3">
+            <a:schemeClr val="dk1"/>
+          </a:lnRef>
+          <a:fillRef idx="0">
+            <a:schemeClr val="dk1"/>
+          </a:fillRef>
+          <a:effectRef idx="2">
+            <a:schemeClr val="dk1"/>
+          </a:effectRef>
+          <a:fontRef idx="minor">
+            <a:schemeClr val="tx1"/>
+          </a:fontRef>
+        </p:style>
+      </p:cxnSp>
+      <p:sp>
+        <p:nvSpPr>
+          <p:cNvPr id="11" name="标题 2"/>
+          <p:cNvSpPr txBox="1"/>
+          <p:nvPr/>
+        </p:nvSpPr>
+        <p:spPr>
+          <a:xfrm>
+            <a:off x="1461135" y="876300"/>
+            <a:ext cx="4965700" cy="650875"/>
+          </a:xfrm>
+          <a:prstGeom prst="rect">
+            <a:avLst/>
+          </a:prstGeom>
+        </p:spPr>
+        <p:txBody>
+          <a:bodyPr vert="horz" lIns="91440" tIns="45720" rIns="91440" bIns="45720" rtlCol="0" anchor="ctr">
+            <a:noAutofit/>
+          </a:bodyPr>
+          <a:lstStyle>
+            <a:lvl1pPr marL="0" algn="l" defTabSz="685800" rtl="0" eaLnBrk="1" latinLnBrk="0" hangingPunct="1">
+              <a:lnSpc>
+                <a:spcPct val="100000"/>
+              </a:lnSpc>
+              <a:spcBef>
+                <a:spcPct val="0"/>
+              </a:spcBef>
+              <a:buNone/>
+              <a:defRPr lang="en-US" sz="3200" b="1" kern="1200" dirty="0">
+                <a:solidFill>
+                  <a:srgbClr val="002060"/>
+                </a:solidFill>
+                <a:latin typeface="微软雅黑" panose="020B0503020204020204" pitchFamily="34" charset="-122"/>
+                <a:ea typeface="微软雅黑" panose="020B0503020204020204" pitchFamily="34" charset="-122"/>
+                <a:cs typeface="+mn-cs"/>
+              </a:defRPr>
+            </a:lvl1pPr>
+          </a:lstStyle>
+          <a:p>
+            <a:r>
+              <a:rPr altLang="zh-CN" sz="2000" dirty="0">
+                <a:latin typeface="Arial" panose="020B0604020202020204" pitchFamily="34" charset="0"/>
+                <a:sym typeface="Arial" panose="020B0604020202020204" pitchFamily="34" charset="0"/>
+              </a:rPr>
+              <a:t>Encode &amp;&amp; Decode</a:t>
+            </a:r>
+            <a:endParaRPr altLang="zh-CN" sz="2000" dirty="0">
+              <a:latin typeface="Arial" panose="020B0604020202020204" pitchFamily="34" charset="0"/>
+              <a:sym typeface="Arial" panose="020B0604020202020204" pitchFamily="34" charset="0"/>
+            </a:endParaRPr>
+          </a:p>
+        </p:txBody>
+      </p:sp>
+      <p:sp>
+        <p:nvSpPr>
+          <p:cNvPr id="14" name="标题 2"/>
+          <p:cNvSpPr txBox="1"/>
+          <p:nvPr/>
+        </p:nvSpPr>
+        <p:spPr>
+          <a:xfrm>
+            <a:off x="1549400" y="3746500"/>
+            <a:ext cx="4965700" cy="650875"/>
+          </a:xfrm>
+          <a:prstGeom prst="rect">
+            <a:avLst/>
+          </a:prstGeom>
+        </p:spPr>
+        <p:txBody>
+          <a:bodyPr vert="horz" lIns="91440" tIns="45720" rIns="91440" bIns="45720" rtlCol="0" anchor="ctr">
+            <a:noAutofit/>
+          </a:bodyPr>
+          <a:lstStyle>
+            <a:lvl1pPr marL="0" algn="l" defTabSz="685800" rtl="0" eaLnBrk="1" latinLnBrk="0" hangingPunct="1">
+              <a:lnSpc>
+                <a:spcPct val="100000"/>
+              </a:lnSpc>
+              <a:spcBef>
+                <a:spcPct val="0"/>
+              </a:spcBef>
+              <a:buNone/>
+              <a:defRPr lang="en-US" sz="3200" b="1" kern="1200" dirty="0">
+                <a:solidFill>
+                  <a:srgbClr val="002060"/>
+                </a:solidFill>
+                <a:latin typeface="微软雅黑" panose="020B0503020204020204" pitchFamily="34" charset="-122"/>
+                <a:ea typeface="微软雅黑" panose="020B0503020204020204" pitchFamily="34" charset="-122"/>
+                <a:cs typeface="+mn-cs"/>
+              </a:defRPr>
+            </a:lvl1pPr>
+          </a:lstStyle>
+          <a:p>
+            <a:r>
+              <a:rPr altLang="zh-CN" sz="2000" dirty="0">
+                <a:latin typeface="Arial" panose="020B0604020202020204" pitchFamily="34" charset="0"/>
+                <a:sym typeface="Arial" panose="020B0604020202020204" pitchFamily="34" charset="0"/>
+              </a:rPr>
+              <a:t>Self-Attention</a:t>
+            </a:r>
+            <a:endParaRPr altLang="zh-CN" sz="2000" dirty="0">
+              <a:latin typeface="Arial" panose="020B0604020202020204" pitchFamily="34" charset="0"/>
+              <a:sym typeface="Arial" panose="020B0604020202020204" pitchFamily="34" charset="0"/>
+            </a:endParaRPr>
+          </a:p>
+        </p:txBody>
+      </p:sp>
+      <p:sp>
+        <p:nvSpPr>
+          <p:cNvPr id="15" name="标题 2"/>
+          <p:cNvSpPr txBox="1"/>
+          <p:nvPr/>
+        </p:nvSpPr>
+        <p:spPr>
+          <a:xfrm>
+            <a:off x="1549400" y="4667885"/>
+            <a:ext cx="4965700" cy="650875"/>
+          </a:xfrm>
+          <a:prstGeom prst="rect">
+            <a:avLst/>
+          </a:prstGeom>
+        </p:spPr>
+        <p:txBody>
+          <a:bodyPr vert="horz" lIns="91440" tIns="45720" rIns="91440" bIns="45720" rtlCol="0" anchor="ctr">
+            <a:noAutofit/>
+          </a:bodyPr>
+          <a:lstStyle>
+            <a:lvl1pPr marL="0" algn="l" defTabSz="685800" rtl="0" eaLnBrk="1" latinLnBrk="0" hangingPunct="1">
+              <a:lnSpc>
+                <a:spcPct val="100000"/>
+              </a:lnSpc>
+              <a:spcBef>
+                <a:spcPct val="0"/>
+              </a:spcBef>
+              <a:buNone/>
+              <a:defRPr lang="en-US" sz="3200" b="1" kern="1200" dirty="0">
+                <a:solidFill>
+                  <a:srgbClr val="002060"/>
+                </a:solidFill>
+                <a:latin typeface="微软雅黑" panose="020B0503020204020204" pitchFamily="34" charset="-122"/>
+                <a:ea typeface="微软雅黑" panose="020B0503020204020204" pitchFamily="34" charset="-122"/>
+                <a:cs typeface="+mn-cs"/>
+              </a:defRPr>
+            </a:lvl1pPr>
+          </a:lstStyle>
+          <a:p>
+            <a:r>
+              <a:rPr lang="zh-CN" altLang="en-US" sz="2000" dirty="0">
+                <a:latin typeface="Arial" panose="020B0604020202020204" pitchFamily="34" charset="0"/>
+                <a:sym typeface="Arial" panose="020B0604020202020204" pitchFamily="34" charset="0"/>
+              </a:rPr>
+              <a:t>不会联系到之后的，只会联系到</a:t>
+            </a:r>
+            <a:r>
+              <a:rPr lang="zh-CN" altLang="en-US" sz="2000" dirty="0">
+                <a:latin typeface="Arial" panose="020B0604020202020204" pitchFamily="34" charset="0"/>
+                <a:sym typeface="Arial" panose="020B0604020202020204" pitchFamily="34" charset="0"/>
+              </a:rPr>
+              <a:t>之前的</a:t>
+            </a:r>
+            <a:endParaRPr lang="zh-CN" altLang="en-US" sz="2000" dirty="0">
+              <a:latin typeface="Arial" panose="020B0604020202020204" pitchFamily="34" charset="0"/>
+              <a:sym typeface="Arial" panose="020B0604020202020204" pitchFamily="34" charset="0"/>
+            </a:endParaRPr>
+          </a:p>
+        </p:txBody>
+      </p:sp>
+      <p:sp>
+        <p:nvSpPr>
+          <p:cNvPr id="16" name="标题 2"/>
+          <p:cNvSpPr txBox="1"/>
+          <p:nvPr/>
+        </p:nvSpPr>
+        <p:spPr>
+          <a:xfrm>
+            <a:off x="4273550" y="3746500"/>
+            <a:ext cx="4965700" cy="650875"/>
+          </a:xfrm>
+          <a:prstGeom prst="rect">
+            <a:avLst/>
+          </a:prstGeom>
+        </p:spPr>
+        <p:txBody>
+          <a:bodyPr vert="horz" lIns="91440" tIns="45720" rIns="91440" bIns="45720" rtlCol="0" anchor="ctr">
+            <a:noAutofit/>
+          </a:bodyPr>
+          <a:lstStyle>
+            <a:lvl1pPr marL="0" algn="l" defTabSz="685800" rtl="0" eaLnBrk="1" latinLnBrk="0" hangingPunct="1">
+              <a:lnSpc>
+                <a:spcPct val="100000"/>
+              </a:lnSpc>
+              <a:spcBef>
+                <a:spcPct val="0"/>
+              </a:spcBef>
+              <a:buNone/>
+              <a:defRPr lang="en-US" sz="3200" b="1" kern="1200" dirty="0">
+                <a:solidFill>
+                  <a:srgbClr val="002060"/>
+                </a:solidFill>
+                <a:latin typeface="微软雅黑" panose="020B0503020204020204" pitchFamily="34" charset="-122"/>
+                <a:ea typeface="微软雅黑" panose="020B0503020204020204" pitchFamily="34" charset="-122"/>
+                <a:cs typeface="+mn-cs"/>
+              </a:defRPr>
+            </a:lvl1pPr>
+          </a:lstStyle>
+          <a:p>
+            <a:r>
+              <a:rPr altLang="zh-CN" sz="2000" dirty="0">
+                <a:latin typeface="Arial" panose="020B0604020202020204" pitchFamily="34" charset="0"/>
+                <a:sym typeface="Arial" panose="020B0604020202020204" pitchFamily="34" charset="0"/>
+              </a:rPr>
+              <a:t>a communication mechanism</a:t>
+            </a:r>
+            <a:endParaRPr altLang="zh-CN" sz="2000" dirty="0">
+              <a:latin typeface="Arial" panose="020B0604020202020204" pitchFamily="34" charset="0"/>
+              <a:sym typeface="Arial" panose="020B0604020202020204" pitchFamily="34" charset="0"/>
+            </a:endParaRPr>
+          </a:p>
+        </p:txBody>
+      </p:sp>
+    </p:spTree>
+  </p:cSld>
+  <p:clrMapOvr>
+    <a:masterClrMapping/>
+  </p:clrMapOvr>
+  <p:transition advClick="0" advTm="0"/>
+</p:sld>
+</file>
+
+<file path=ppt/slides/slide12.xml><?xml version="1.0" encoding="utf-8"?>
+<p:sld xmlns:a="http://schemas.openxmlformats.org/drawingml/2006/main" xmlns:r="http://schemas.openxmlformats.org/officeDocument/2006/relationships" xmlns:p="http://schemas.openxmlformats.org/presentationml/2006/main">
+  <p:cSld>
+    <p:spTree>
+      <p:nvGrpSpPr>
+        <p:cNvPr id="1" name=""/>
+        <p:cNvGrpSpPr/>
+        <p:nvPr/>
+      </p:nvGrpSpPr>
+      <p:grpSpPr>
+        <a:xfrm>
+          <a:off x="0" y="0"/>
+          <a:ext cx="0" cy="0"/>
+          <a:chOff x="0" y="0"/>
+          <a:chExt cx="0" cy="0"/>
+        </a:xfrm>
+      </p:grpSpPr>
+      <p:sp>
+        <p:nvSpPr>
+          <p:cNvPr id="4" name="矩形 12"/>
+          <p:cNvSpPr>
+            <a:spLocks noChangeArrowheads="1"/>
+          </p:cNvSpPr>
+          <p:nvPr/>
+        </p:nvSpPr>
+        <p:spPr bwMode="auto">
+          <a:xfrm>
+            <a:off x="385125" y="188641"/>
+            <a:ext cx="11568417" cy="583565"/>
+          </a:xfrm>
+          <a:prstGeom prst="rect">
+            <a:avLst/>
+          </a:prstGeom>
+          <a:noFill/>
+          <a:ln>
+            <a:noFill/>
+          </a:ln>
+          <a:extLst>
+            <a:ext uri="{909E8E84-426E-40DD-AFC4-6F175D3DCCD1}">
+              <a14:hiddenFill xmlns:a14="http://schemas.microsoft.com/office/drawing/2010/main">
+                <a:solidFill>
+                  <a:srgbClr val="FFFFFF"/>
+                </a:solidFill>
+              </a14:hiddenFill>
+            </a:ext>
+            <a:ext uri="{91240B29-F687-4F45-9708-019B960494DF}">
+              <a14:hiddenLine xmlns:a14="http://schemas.microsoft.com/office/drawing/2010/main" w="9525">
+                <a:solidFill>
+                  <a:srgbClr val="000000"/>
+                </a:solidFill>
+                <a:miter lim="800000"/>
+                <a:headEnd/>
+                <a:tailEnd/>
+              </a14:hiddenLine>
+            </a:ext>
+          </a:extLst>
+        </p:spPr>
+        <p:txBody>
+          <a:bodyPr wrap="square">
+            <a:spAutoFit/>
+          </a:bodyPr>
+          <a:lstStyle/>
+          <a:p>
+            <a:pPr marL="0" lvl="1" defTabSz="457200">
+              <a:buClr>
+                <a:srgbClr val="FF0000"/>
+              </a:buClr>
+              <a:buSzPct val="100000"/>
+            </a:pPr>
+            <a:r>
+              <a:rPr lang="en-US" altLang="zh-CN" sz="3200" b="1" dirty="0">
+                <a:solidFill>
+                  <a:schemeClr val="bg1"/>
+                </a:solidFill>
+                <a:latin typeface="Arial" panose="020B0604020202020204" pitchFamily="34" charset="0"/>
+                <a:ea typeface="微软雅黑" panose="020B0503020204020204" pitchFamily="34" charset="-122"/>
+                <a:cs typeface="+mn-ea"/>
+                <a:sym typeface="Arial" panose="020B0604020202020204" pitchFamily="34" charset="0"/>
+              </a:rPr>
+              <a:t>1.1</a:t>
+            </a:r>
+            <a:r>
+              <a:rPr lang="zh-CN" altLang="en-US" sz="3200" b="1" dirty="0">
+                <a:solidFill>
+                  <a:schemeClr val="bg1"/>
+                </a:solidFill>
+                <a:latin typeface="Arial" panose="020B0604020202020204" pitchFamily="34" charset="0"/>
+                <a:ea typeface="微软雅黑" panose="020B0503020204020204" pitchFamily="34" charset="-122"/>
+                <a:cs typeface="+mn-ea"/>
+                <a:sym typeface="Arial" panose="020B0604020202020204" pitchFamily="34" charset="0"/>
+              </a:rPr>
+              <a:t>染研究意义</a:t>
+            </a:r>
+            <a:endParaRPr lang="zh-CN" altLang="en-US" sz="3200" b="1" dirty="0">
+              <a:solidFill>
+                <a:schemeClr val="bg1"/>
+              </a:solidFill>
+              <a:latin typeface="Arial" panose="020B0604020202020204" pitchFamily="34" charset="0"/>
+              <a:ea typeface="微软雅黑" panose="020B0503020204020204" pitchFamily="34" charset="-122"/>
+              <a:cs typeface="+mn-ea"/>
+              <a:sym typeface="Arial" panose="020B0604020202020204" pitchFamily="34" charset="0"/>
+            </a:endParaRPr>
+          </a:p>
+        </p:txBody>
+      </p:sp>
+      <p:sp>
+        <p:nvSpPr>
+          <p:cNvPr id="3" name="标题 2"/>
+          <p:cNvSpPr>
+            <a:spLocks noGrp="1"/>
+          </p:cNvSpPr>
+          <p:nvPr>
+            <p:ph type="title"/>
+          </p:nvPr>
+        </p:nvSpPr>
+        <p:spPr/>
+        <p:txBody>
+          <a:bodyPr/>
+          <a:lstStyle/>
+          <a:p>
+            <a:r>
+              <a:rPr lang="en-US" altLang="zh-CN" dirty="0">
+                <a:latin typeface="Arial" panose="020B0604020202020204" pitchFamily="34" charset="0"/>
+                <a:sym typeface="Arial" panose="020B0604020202020204" pitchFamily="34" charset="0"/>
+              </a:rPr>
+              <a:t>4. Linear Regression</a:t>
+            </a:r>
+            <a:endParaRPr lang="en-US" altLang="zh-CN" dirty="0">
+              <a:latin typeface="Arial" panose="020B0604020202020204" pitchFamily="34" charset="0"/>
+              <a:sym typeface="Arial" panose="020B0604020202020204" pitchFamily="34" charset="0"/>
+            </a:endParaRPr>
+          </a:p>
+        </p:txBody>
+      </p:sp>
+      <p:sp>
+        <p:nvSpPr>
+          <p:cNvPr id="7" name="灯片编号占位符 6"/>
+          <p:cNvSpPr>
+            <a:spLocks noGrp="1"/>
+          </p:cNvSpPr>
+          <p:nvPr>
+            <p:ph type="sldNum" sz="quarter" idx="16"/>
+          </p:nvPr>
+        </p:nvSpPr>
+        <p:spPr/>
+        <p:txBody>
+          <a:bodyPr/>
+          <a:lstStyle/>
+          <a:p>
+            <a:pPr>
+              <a:defRPr/>
+            </a:pPr>
+            <a:fld id="{26F565BE-27A9-4834-BA3A-D46EFBA6086A}" type="slidenum">
+              <a:rPr lang="zh-CN" altLang="en-US" smtClean="0">
+                <a:latin typeface="Arial" panose="020B0604020202020204" pitchFamily="34" charset="0"/>
+                <a:sym typeface="Arial" panose="020B0604020202020204" pitchFamily="34" charset="0"/>
+              </a:rPr>
+            </a:fld>
+            <a:endParaRPr lang="zh-CN" altLang="en-US" dirty="0">
+              <a:latin typeface="Arial" panose="020B0604020202020204" pitchFamily="34" charset="0"/>
+              <a:sym typeface="Arial" panose="020B0604020202020204" pitchFamily="34" charset="0"/>
+            </a:endParaRPr>
+          </a:p>
+        </p:txBody>
+      </p:sp>
+      <p:cxnSp>
+        <p:nvCxnSpPr>
+          <p:cNvPr id="8" name="直接连接符 7"/>
+          <p:cNvCxnSpPr/>
+          <p:nvPr/>
+        </p:nvCxnSpPr>
+        <p:spPr>
+          <a:xfrm>
+            <a:off x="0" y="824357"/>
+            <a:ext cx="3877337" cy="0"/>
+          </a:xfrm>
+          <a:prstGeom prst="line">
+            <a:avLst/>
+          </a:prstGeom>
+          <a:ln w="31750">
+            <a:gradFill flip="none" rotWithShape="1">
+              <a:gsLst>
+                <a:gs pos="0">
+                  <a:schemeClr val="accent1">
+                    <a:lumMod val="40000"/>
+                    <a:lumOff val="60000"/>
+                  </a:schemeClr>
+                </a:gs>
+                <a:gs pos="46000">
+                  <a:schemeClr val="accent1">
+                    <a:lumMod val="40000"/>
+                    <a:lumOff val="60000"/>
+                  </a:schemeClr>
+                </a:gs>
+                <a:gs pos="100000">
+                  <a:schemeClr val="accent1">
+                    <a:lumMod val="75000"/>
+                  </a:schemeClr>
+                </a:gs>
+              </a:gsLst>
+              <a:lin ang="10800000" scaled="0"/>
+              <a:tileRect/>
+            </a:gradFill>
+          </a:ln>
+        </p:spPr>
+        <p:style>
+          <a:lnRef idx="3">
+            <a:schemeClr val="dk1"/>
+          </a:lnRef>
+          <a:fillRef idx="0">
+            <a:schemeClr val="dk1"/>
+          </a:fillRef>
+          <a:effectRef idx="2">
+            <a:schemeClr val="dk1"/>
+          </a:effectRef>
+          <a:fontRef idx="minor">
+            <a:schemeClr val="tx1"/>
+          </a:fontRef>
+        </p:style>
+      </p:cxnSp>
+      <p:sp>
+        <p:nvSpPr>
+          <p:cNvPr id="2" name="标题 2"/>
+          <p:cNvSpPr txBox="1"/>
+          <p:nvPr/>
+        </p:nvSpPr>
+        <p:spPr>
+          <a:xfrm>
+            <a:off x="842010" y="876300"/>
+            <a:ext cx="6118225" cy="650875"/>
+          </a:xfrm>
+          <a:prstGeom prst="rect">
+            <a:avLst/>
+          </a:prstGeom>
+        </p:spPr>
+        <p:txBody>
+          <a:bodyPr vert="horz" lIns="91440" tIns="45720" rIns="91440" bIns="45720" rtlCol="0" anchor="ctr">
+            <a:noAutofit/>
+          </a:bodyPr>
+          <a:lstStyle>
+            <a:lvl1pPr marL="0" algn="l" defTabSz="685800" rtl="0" eaLnBrk="1" latinLnBrk="0" hangingPunct="1">
+              <a:lnSpc>
+                <a:spcPct val="100000"/>
+              </a:lnSpc>
+              <a:spcBef>
+                <a:spcPct val="0"/>
+              </a:spcBef>
+              <a:buNone/>
+              <a:defRPr lang="en-US" sz="3200" b="1" kern="1200" dirty="0">
+                <a:solidFill>
+                  <a:srgbClr val="002060"/>
+                </a:solidFill>
+                <a:latin typeface="微软雅黑" panose="020B0503020204020204" pitchFamily="34" charset="-122"/>
+                <a:ea typeface="微软雅黑" panose="020B0503020204020204" pitchFamily="34" charset="-122"/>
+                <a:cs typeface="+mn-cs"/>
+              </a:defRPr>
+            </a:lvl1pPr>
+          </a:lstStyle>
+          <a:p>
+            <a:r>
+              <a:rPr lang="zh-CN" altLang="en-US" sz="2000" dirty="0">
+                <a:latin typeface="Arial" panose="020B0604020202020204" pitchFamily="34" charset="0"/>
+                <a:sym typeface="Arial" panose="020B0604020202020204" pitchFamily="34" charset="0"/>
+              </a:rPr>
+              <a:t>（从这里，进入《</a:t>
+            </a:r>
+            <a:r>
+              <a:rPr altLang="zh-CN" sz="2000" dirty="0">
+                <a:latin typeface="Arial" panose="020B0604020202020204" pitchFamily="34" charset="0"/>
+                <a:sym typeface="Arial" panose="020B0604020202020204" pitchFamily="34" charset="0"/>
+              </a:rPr>
+              <a:t>Dive-into-DL-Pytorch</a:t>
+            </a:r>
+            <a:r>
+              <a:rPr lang="zh-CN" altLang="en-US" sz="2000" dirty="0">
+                <a:latin typeface="Arial" panose="020B0604020202020204" pitchFamily="34" charset="0"/>
+                <a:sym typeface="Arial" panose="020B0604020202020204" pitchFamily="34" charset="0"/>
+              </a:rPr>
+              <a:t>》</a:t>
+            </a:r>
+            <a:r>
+              <a:rPr altLang="zh-CN" sz="2000" dirty="0">
+                <a:latin typeface="Arial" panose="020B0604020202020204" pitchFamily="34" charset="0"/>
+                <a:sym typeface="Arial" panose="020B0604020202020204" pitchFamily="34" charset="0"/>
+              </a:rPr>
+              <a:t>)</a:t>
+            </a:r>
+            <a:endParaRPr altLang="zh-CN" sz="2000" dirty="0">
+              <a:latin typeface="Arial" panose="020B0604020202020204" pitchFamily="34" charset="0"/>
+              <a:sym typeface="Arial" panose="020B0604020202020204" pitchFamily="34" charset="0"/>
+            </a:endParaRPr>
+          </a:p>
+        </p:txBody>
+      </p:sp>
+      <p:sp>
+        <p:nvSpPr>
+          <p:cNvPr id="6" name="标题 2"/>
+          <p:cNvSpPr txBox="1"/>
+          <p:nvPr/>
+        </p:nvSpPr>
+        <p:spPr>
+          <a:xfrm>
+            <a:off x="7129145" y="824230"/>
+            <a:ext cx="4965700" cy="650875"/>
+          </a:xfrm>
+          <a:prstGeom prst="rect">
+            <a:avLst/>
+          </a:prstGeom>
+        </p:spPr>
+        <p:txBody>
+          <a:bodyPr vert="horz" lIns="91440" tIns="45720" rIns="91440" bIns="45720" rtlCol="0" anchor="ctr">
+            <a:noAutofit/>
+          </a:bodyPr>
+          <a:lstStyle>
+            <a:lvl1pPr marL="0" algn="l" defTabSz="685800" rtl="0" eaLnBrk="1" latinLnBrk="0" hangingPunct="1">
+              <a:lnSpc>
+                <a:spcPct val="100000"/>
+              </a:lnSpc>
+              <a:spcBef>
+                <a:spcPct val="0"/>
+              </a:spcBef>
+              <a:buNone/>
+              <a:defRPr lang="en-US" sz="3200" b="1" kern="1200" dirty="0">
+                <a:solidFill>
+                  <a:srgbClr val="002060"/>
+                </a:solidFill>
+                <a:latin typeface="微软雅黑" panose="020B0503020204020204" pitchFamily="34" charset="-122"/>
+                <a:ea typeface="微软雅黑" panose="020B0503020204020204" pitchFamily="34" charset="-122"/>
+                <a:cs typeface="+mn-cs"/>
+              </a:defRPr>
+            </a:lvl1pPr>
+          </a:lstStyle>
+          <a:p>
+            <a:r>
+              <a:rPr lang="zh-CN" altLang="en-US" sz="2000" dirty="0">
+                <a:latin typeface="Arial" panose="020B0604020202020204" pitchFamily="34" charset="0"/>
+                <a:sym typeface="Arial" panose="020B0604020202020204" pitchFamily="34" charset="0"/>
+              </a:rPr>
+              <a:t>输出</a:t>
+            </a:r>
+            <a:r>
+              <a:rPr lang="zh-CN" altLang="en-US" sz="2000" dirty="0">
+                <a:solidFill>
+                  <a:srgbClr val="FF0000"/>
+                </a:solidFill>
+                <a:latin typeface="Arial" panose="020B0604020202020204" pitchFamily="34" charset="0"/>
+                <a:sym typeface="Arial" panose="020B0604020202020204" pitchFamily="34" charset="0"/>
+              </a:rPr>
+              <a:t>连续值</a:t>
+            </a:r>
+            <a:r>
+              <a:rPr lang="zh-CN" altLang="en-US" sz="2000" dirty="0">
+                <a:latin typeface="Arial" panose="020B0604020202020204" pitchFamily="34" charset="0"/>
+                <a:sym typeface="Arial" panose="020B0604020202020204" pitchFamily="34" charset="0"/>
+              </a:rPr>
+              <a:t>，预测</a:t>
+            </a:r>
+            <a:r>
+              <a:rPr lang="zh-CN" altLang="en-US" sz="2000" dirty="0">
+                <a:latin typeface="Arial" panose="020B0604020202020204" pitchFamily="34" charset="0"/>
+                <a:sym typeface="Arial" panose="020B0604020202020204" pitchFamily="34" charset="0"/>
+              </a:rPr>
+              <a:t>问题</a:t>
+            </a:r>
+            <a:endParaRPr lang="zh-CN" altLang="en-US" sz="2000" dirty="0">
+              <a:latin typeface="Arial" panose="020B0604020202020204" pitchFamily="34" charset="0"/>
+              <a:sym typeface="Arial" panose="020B0604020202020204" pitchFamily="34" charset="0"/>
+            </a:endParaRPr>
+          </a:p>
+        </p:txBody>
+      </p:sp>
+      <p:grpSp>
+        <p:nvGrpSpPr>
+          <p:cNvPr id="21" name="组合 20"/>
+          <p:cNvGrpSpPr/>
+          <p:nvPr/>
+        </p:nvGrpSpPr>
+        <p:grpSpPr>
+          <a:xfrm>
+            <a:off x="775335" y="2275205"/>
+            <a:ext cx="6632575" cy="3576955"/>
+            <a:chOff x="2701" y="3994"/>
+            <a:chExt cx="10445" cy="5633"/>
+          </a:xfrm>
+        </p:grpSpPr>
+        <mc:AlternateContent xmlns:mc="http://schemas.openxmlformats.org/markup-compatibility/2006">
+          <mc:Choice xmlns:a14="http://schemas.microsoft.com/office/drawing/2010/main" Requires="a14">
+            <p:sp>
+              <p:nvSpPr>
+                <p:cNvPr id="9" name="标题 2"/>
+                <p:cNvSpPr txBox="1"/>
+                <p:nvPr/>
+              </p:nvSpPr>
+              <p:spPr>
+                <a:xfrm>
+                  <a:off x="4578" y="3994"/>
+                  <a:ext cx="8569" cy="1696"/>
+                </a:xfrm>
+                <a:prstGeom prst="rect">
+                  <a:avLst/>
+                </a:prstGeom>
+              </p:spPr>
+              <p:txBody>
+                <a:bodyPr vert="horz" lIns="91440" tIns="45720" rIns="91440" bIns="45720" rtlCol="0" anchor="ctr">
+                  <a:noAutofit/>
+                </a:bodyPr>
+                <a:lstStyle>
+                  <a:lvl1pPr marL="0" algn="l" defTabSz="685800" rtl="0" eaLnBrk="1" latinLnBrk="0" hangingPunct="1">
+                    <a:lnSpc>
+                      <a:spcPct val="100000"/>
+                    </a:lnSpc>
+                    <a:spcBef>
+                      <a:spcPct val="0"/>
+                    </a:spcBef>
+                    <a:buNone/>
+                    <a:defRPr lang="en-US" sz="3200" b="1" kern="1200" dirty="0">
+                      <a:solidFill>
+                        <a:srgbClr val="002060"/>
+                      </a:solidFill>
+                      <a:latin typeface="微软雅黑" panose="020B0503020204020204" pitchFamily="34" charset="-122"/>
+                      <a:ea typeface="微软雅黑" panose="020B0503020204020204" pitchFamily="34" charset="-122"/>
+                      <a:cs typeface="+mn-cs"/>
+                    </a:defRPr>
+                  </a:lvl1pPr>
+                </a:lstStyle>
+                <a:p>
+                  <a:r>
+                    <a:rPr altLang="zh-CN" sz="4000" i="1" dirty="0">
+                      <a:latin typeface="Cambria Math" panose="02040503050406030204" charset="0"/>
+                      <a:cs typeface="Cambria Math" panose="02040503050406030204" charset="0"/>
+                      <a:sym typeface="Arial" panose="020B0604020202020204" pitchFamily="34" charset="0"/>
+                    </a:rPr>
+                    <a:t>y = </a:t>
+                  </a:r>
+                  <a14:m>
+                    <m:oMath xmlns:m="http://schemas.openxmlformats.org/officeDocument/2006/math">
+                      <m:sSub>
+                        <m:sSubPr>
+                          <m:ctrlPr>
+                            <a:rPr lang="en-US" altLang="zh-CN" sz="4000" i="1" dirty="0">
+                              <a:latin typeface="Cambria Math" panose="02040503050406030204" charset="0"/>
+                              <a:cs typeface="Cambria Math" panose="02040503050406030204" charset="0"/>
+                              <a:sym typeface="Arial" panose="020B0604020202020204" pitchFamily="34" charset="0"/>
+                            </a:rPr>
+                          </m:ctrlPr>
+                        </m:sSubPr>
+                        <m:e>
+                          <m:r>
+                            <a:rPr lang="en-US" altLang="zh-CN" sz="4000" i="1" dirty="0">
+                              <a:latin typeface="Cambria Math" panose="02040503050406030204" charset="0"/>
+                              <a:cs typeface="Cambria Math" panose="02040503050406030204" charset="0"/>
+                              <a:sym typeface="Arial" panose="020B0604020202020204" pitchFamily="34" charset="0"/>
+                            </a:rPr>
+                            <m:t>𝒘</m:t>
+                          </m:r>
+                        </m:e>
+                        <m:sub>
+                          <m:r>
+                            <a:rPr lang="en-US" altLang="zh-CN" sz="4000" i="1" dirty="0">
+                              <a:latin typeface="Cambria Math" panose="02040503050406030204" charset="0"/>
+                              <a:cs typeface="Cambria Math" panose="02040503050406030204" charset="0"/>
+                              <a:sym typeface="Arial" panose="020B0604020202020204" pitchFamily="34" charset="0"/>
+                            </a:rPr>
+                            <m:t>𝟏</m:t>
+                          </m:r>
+                        </m:sub>
+                      </m:sSub>
+                      <m:sSub>
+                        <m:sSubPr>
+                          <m:ctrlPr>
+                            <a:rPr lang="en-US" altLang="zh-CN" sz="4000" i="1" dirty="0">
+                              <a:latin typeface="Cambria Math" panose="02040503050406030204" charset="0"/>
+                              <a:cs typeface="Cambria Math" panose="02040503050406030204" charset="0"/>
+                              <a:sym typeface="Arial" panose="020B0604020202020204" pitchFamily="34" charset="0"/>
+                            </a:rPr>
+                          </m:ctrlPr>
+                        </m:sSubPr>
+                        <m:e>
+                          <m:r>
+                            <a:rPr lang="en-US" altLang="zh-CN" sz="4000" i="1" dirty="0">
+                              <a:latin typeface="Cambria Math" panose="02040503050406030204" charset="0"/>
+                              <a:cs typeface="Cambria Math" panose="02040503050406030204" charset="0"/>
+                              <a:sym typeface="Arial" panose="020B0604020202020204" pitchFamily="34" charset="0"/>
+                            </a:rPr>
+                            <m:t>𝒙</m:t>
+                          </m:r>
+                        </m:e>
+                        <m:sub>
+                          <m:r>
+                            <a:rPr lang="en-US" altLang="zh-CN" sz="4000" i="1" dirty="0">
+                              <a:latin typeface="Cambria Math" panose="02040503050406030204" charset="0"/>
+                              <a:cs typeface="Cambria Math" panose="02040503050406030204" charset="0"/>
+                              <a:sym typeface="Arial" panose="020B0604020202020204" pitchFamily="34" charset="0"/>
+                            </a:rPr>
+                            <m:t>𝟏</m:t>
+                          </m:r>
+                        </m:sub>
+                      </m:sSub>
+                      <m:r>
+                        <a:rPr lang="en-US" altLang="zh-CN" sz="4000" i="1" dirty="0">
+                          <a:latin typeface="Cambria Math" panose="02040503050406030204" charset="0"/>
+                          <a:cs typeface="Cambria Math" panose="02040503050406030204" charset="0"/>
+                          <a:sym typeface="Arial" panose="020B0604020202020204" pitchFamily="34" charset="0"/>
+                        </a:rPr>
+                        <m:t> + </m:t>
+                      </m:r>
+                      <m:sSub>
+                        <m:sSubPr>
+                          <m:ctrlPr>
+                            <a:rPr lang="en-US" altLang="zh-CN" sz="4000" i="1" dirty="0">
+                              <a:latin typeface="Cambria Math" panose="02040503050406030204" charset="0"/>
+                              <a:cs typeface="Cambria Math" panose="02040503050406030204" charset="0"/>
+                              <a:sym typeface="Arial" panose="020B0604020202020204" pitchFamily="34" charset="0"/>
+                            </a:rPr>
+                          </m:ctrlPr>
+                        </m:sSubPr>
+                        <m:e>
+                          <m:r>
+                            <a:rPr lang="en-US" altLang="zh-CN" sz="4000" i="1" dirty="0">
+                              <a:latin typeface="Cambria Math" panose="02040503050406030204" charset="0"/>
+                              <a:cs typeface="Cambria Math" panose="02040503050406030204" charset="0"/>
+                              <a:sym typeface="Arial" panose="020B0604020202020204" pitchFamily="34" charset="0"/>
+                            </a:rPr>
+                            <m:t>𝒘</m:t>
+                          </m:r>
+                        </m:e>
+                        <m:sub>
+                          <m:r>
+                            <a:rPr lang="en-US" altLang="zh-CN" sz="4000" i="1" dirty="0">
+                              <a:latin typeface="Cambria Math" panose="02040503050406030204" charset="0"/>
+                              <a:cs typeface="Cambria Math" panose="02040503050406030204" charset="0"/>
+                              <a:sym typeface="Arial" panose="020B0604020202020204" pitchFamily="34" charset="0"/>
+                            </a:rPr>
+                            <m:t>𝟐</m:t>
+                          </m:r>
+                        </m:sub>
+                      </m:sSub>
+                      <m:sSub>
+                        <m:sSubPr>
+                          <m:ctrlPr>
+                            <a:rPr lang="en-US" altLang="zh-CN" sz="4000" i="1" dirty="0">
+                              <a:latin typeface="Cambria Math" panose="02040503050406030204" charset="0"/>
+                              <a:cs typeface="Cambria Math" panose="02040503050406030204" charset="0"/>
+                              <a:sym typeface="Arial" panose="020B0604020202020204" pitchFamily="34" charset="0"/>
+                            </a:rPr>
+                          </m:ctrlPr>
+                        </m:sSubPr>
+                        <m:e>
+                          <m:r>
+                            <a:rPr lang="en-US" altLang="zh-CN" sz="4000" i="1" dirty="0">
+                              <a:latin typeface="Cambria Math" panose="02040503050406030204" charset="0"/>
+                              <a:cs typeface="Cambria Math" panose="02040503050406030204" charset="0"/>
+                              <a:sym typeface="Arial" panose="020B0604020202020204" pitchFamily="34" charset="0"/>
+                            </a:rPr>
+                            <m:t>𝒙</m:t>
+                          </m:r>
+                        </m:e>
+                        <m:sub>
+                          <m:r>
+                            <a:rPr lang="en-US" altLang="zh-CN" sz="4000" i="1" dirty="0">
+                              <a:latin typeface="Cambria Math" panose="02040503050406030204" charset="0"/>
+                              <a:cs typeface="Cambria Math" panose="02040503050406030204" charset="0"/>
+                              <a:sym typeface="Arial" panose="020B0604020202020204" pitchFamily="34" charset="0"/>
+                            </a:rPr>
+                            <m:t>𝟐</m:t>
+                          </m:r>
+                        </m:sub>
+                      </m:sSub>
+                      <m:r>
+                        <a:rPr lang="en-US" altLang="zh-CN" sz="4000" i="1" dirty="0">
+                          <a:latin typeface="Cambria Math" panose="02040503050406030204" charset="0"/>
+                          <a:cs typeface="Cambria Math" panose="02040503050406030204" charset="0"/>
+                          <a:sym typeface="Arial" panose="020B0604020202020204" pitchFamily="34" charset="0"/>
+                        </a:rPr>
+                        <m:t>+</m:t>
+                      </m:r>
+                      <m:r>
+                        <a:rPr lang="en-US" altLang="zh-CN" sz="4000" i="1" dirty="0">
+                          <a:latin typeface="Cambria Math" panose="02040503050406030204" charset="0"/>
+                          <a:cs typeface="Cambria Math" panose="02040503050406030204" charset="0"/>
+                          <a:sym typeface="Arial" panose="020B0604020202020204" pitchFamily="34" charset="0"/>
+                        </a:rPr>
+                        <m:t>𝒃</m:t>
+                      </m:r>
+                    </m:oMath>
+                  </a14:m>
+                  <a:endParaRPr altLang="zh-CN" sz="4000" i="1" dirty="0">
+                    <a:latin typeface="Cambria Math" panose="02040503050406030204" charset="0"/>
+                    <a:cs typeface="Cambria Math" panose="02040503050406030204" charset="0"/>
+                    <a:sym typeface="Arial" panose="020B0604020202020204" pitchFamily="34" charset="0"/>
+                  </a:endParaRPr>
+                </a:p>
+              </p:txBody>
+            </p:sp>
+          </mc:Choice>
+          <mc:Fallback>
+            <p:sp>
+              <p:nvSpPr>
+                <p:cNvPr id="9" name="标题 2"/>
+                <p:cNvSpPr txBox="1">
+                  <a:spLocks noRot="1" noChangeAspect="1" noMove="1" noResize="1" noEditPoints="1" noAdjustHandles="1" noChangeArrowheads="1" noChangeShapeType="1" noTextEdit="1"/>
+                </p:cNvSpPr>
+                <p:nvPr/>
+              </p:nvSpPr>
+              <p:spPr>
+                <a:xfrm>
+                  <a:off x="4578" y="3994"/>
+                  <a:ext cx="8569" cy="1696"/>
+                </a:xfrm>
+                <a:prstGeom prst="rect">
+                  <a:avLst/>
+                </a:prstGeom>
+                <a:blipFill rotWithShape="1">
+                  <a:blip r:embed="rId1"/>
+                </a:blipFill>
+              </p:spPr>
+              <p:txBody>
+                <a:bodyPr/>
+                <a:lstStyle/>
+                <a:p>
+                  <a:r>
+                    <a:rPr lang="zh-CN" altLang="en-US">
+                      <a:noFill/>
+                    </a:rPr>
+                    <a:t> </a:t>
+                  </a:r>
+                </a:p>
+              </p:txBody>
+            </p:sp>
+          </mc:Fallback>
+        </mc:AlternateContent>
+        <p:cxnSp>
+          <p:nvCxnSpPr>
+            <p:cNvPr id="10" name="直接箭头连接符 9"/>
+            <p:cNvCxnSpPr/>
+            <p:nvPr/>
+          </p:nvCxnSpPr>
+          <p:spPr>
+            <a:xfrm flipH="1">
+              <a:off x="3555" y="5346"/>
+              <a:ext cx="1160" cy="2106"/>
+            </a:xfrm>
+            <a:prstGeom prst="straightConnector1">
+              <a:avLst/>
+            </a:prstGeom>
+            <a:ln w="31750" cmpd="sng">
+              <a:solidFill>
+                <a:srgbClr val="92D050"/>
+              </a:solidFill>
+              <a:prstDash val="sysDot"/>
+              <a:tailEnd type="arrow"/>
+            </a:ln>
+          </p:spPr>
+          <p:style>
+            <a:lnRef idx="2">
+              <a:schemeClr val="accent1"/>
+            </a:lnRef>
+            <a:fillRef idx="0">
+              <a:srgbClr val="FFFFFF"/>
+            </a:fillRef>
+            <a:effectRef idx="0">
+              <a:srgbClr val="FFFFFF"/>
+            </a:effectRef>
+            <a:fontRef idx="minor">
+              <a:schemeClr val="tx1"/>
+            </a:fontRef>
+          </p:style>
+        </p:cxnSp>
+        <p:sp>
+          <p:nvSpPr>
+            <p:cNvPr id="13" name="标题 2"/>
+            <p:cNvSpPr txBox="1"/>
+            <p:nvPr/>
+          </p:nvSpPr>
+          <p:spPr>
+            <a:xfrm>
+              <a:off x="2701" y="7624"/>
+              <a:ext cx="1303" cy="843"/>
+            </a:xfrm>
+            <a:prstGeom prst="rect">
+              <a:avLst/>
+            </a:prstGeom>
+            <a:ln w="28575" cmpd="dbl">
+              <a:solidFill>
+                <a:schemeClr val="accent1">
+                  <a:shade val="50000"/>
+                </a:schemeClr>
+              </a:solidFill>
+              <a:prstDash val="solid"/>
+            </a:ln>
+            <a:effectLst>
+              <a:outerShdw blurRad="50800" dist="38100" dir="2700000" algn="tl" rotWithShape="0">
+                <a:prstClr val="black">
+                  <a:alpha val="40000"/>
+                </a:prstClr>
+              </a:outerShdw>
+              <a:reflection blurRad="6350" stA="52000" endA="300" endPos="35000" dir="5400000" sy="-100000" algn="bl" rotWithShape="0"/>
+            </a:effectLst>
+          </p:spPr>
+          <p:txBody>
+            <a:bodyPr vert="horz" lIns="91440" tIns="45720" rIns="91440" bIns="45720" rtlCol="0" anchor="ctr">
+              <a:noAutofit/>
+            </a:bodyPr>
+            <a:lstStyle>
+              <a:lvl1pPr marL="0" algn="l" defTabSz="685800" rtl="0" eaLnBrk="1" latinLnBrk="0" hangingPunct="1">
+                <a:lnSpc>
+                  <a:spcPct val="100000"/>
+                </a:lnSpc>
+                <a:spcBef>
+                  <a:spcPct val="0"/>
+                </a:spcBef>
+                <a:buNone/>
+                <a:defRPr lang="en-US" sz="3200" b="1" kern="1200" dirty="0">
+                  <a:solidFill>
+                    <a:srgbClr val="002060"/>
+                  </a:solidFill>
+                  <a:latin typeface="微软雅黑" panose="020B0503020204020204" pitchFamily="34" charset="-122"/>
+                  <a:ea typeface="微软雅黑" panose="020B0503020204020204" pitchFamily="34" charset="-122"/>
+                  <a:cs typeface="+mn-cs"/>
+                </a:defRPr>
+              </a:lvl1pPr>
+            </a:lstStyle>
+            <a:p>
+              <a:r>
+                <a:rPr altLang="zh-CN" sz="2000" dirty="0">
+                  <a:latin typeface="Arial" panose="020B0604020202020204" pitchFamily="34" charset="0"/>
+                  <a:sym typeface="Arial" panose="020B0604020202020204" pitchFamily="34" charset="0"/>
+                </a:rPr>
+                <a:t> </a:t>
+              </a:r>
+              <a:r>
+                <a:rPr lang="zh-CN" altLang="en-US" sz="2000" dirty="0">
+                  <a:latin typeface="Arial" panose="020B0604020202020204" pitchFamily="34" charset="0"/>
+                  <a:sym typeface="Arial" panose="020B0604020202020204" pitchFamily="34" charset="0"/>
+                </a:rPr>
+                <a:t>房价</a:t>
+              </a:r>
+              <a:endParaRPr lang="zh-CN" altLang="en-US" sz="2000" dirty="0">
+                <a:latin typeface="Arial" panose="020B0604020202020204" pitchFamily="34" charset="0"/>
+                <a:sym typeface="Arial" panose="020B0604020202020204" pitchFamily="34" charset="0"/>
+              </a:endParaRPr>
+            </a:p>
+          </p:txBody>
+        </p:sp>
+        <p:cxnSp>
+          <p:nvCxnSpPr>
+            <p:cNvPr id="17" name="直接箭头连接符 16"/>
+            <p:cNvCxnSpPr>
+              <a:endCxn id="18" idx="0"/>
+            </p:cNvCxnSpPr>
+            <p:nvPr/>
+          </p:nvCxnSpPr>
+          <p:spPr>
+            <a:xfrm flipH="1">
+              <a:off x="7125" y="5407"/>
+              <a:ext cx="276" cy="3378"/>
+            </a:xfrm>
+            <a:prstGeom prst="straightConnector1">
+              <a:avLst/>
+            </a:prstGeom>
+            <a:ln w="31750" cmpd="sng">
+              <a:solidFill>
+                <a:srgbClr val="92D050"/>
+              </a:solidFill>
+              <a:prstDash val="sysDot"/>
+              <a:tailEnd type="arrow"/>
+            </a:ln>
+          </p:spPr>
+          <p:style>
+            <a:lnRef idx="2">
+              <a:schemeClr val="accent1"/>
+            </a:lnRef>
+            <a:fillRef idx="0">
+              <a:srgbClr val="FFFFFF"/>
+            </a:fillRef>
+            <a:effectRef idx="0">
+              <a:srgbClr val="FFFFFF"/>
+            </a:effectRef>
+            <a:fontRef idx="minor">
+              <a:schemeClr val="tx1"/>
+            </a:fontRef>
+          </p:style>
+        </p:cxnSp>
+        <p:sp>
+          <p:nvSpPr>
+            <p:cNvPr id="18" name="标题 2"/>
+            <p:cNvSpPr txBox="1"/>
+            <p:nvPr/>
+          </p:nvSpPr>
+          <p:spPr>
+            <a:xfrm>
+              <a:off x="6473" y="8785"/>
+              <a:ext cx="1303" cy="843"/>
+            </a:xfrm>
+            <a:prstGeom prst="rect">
+              <a:avLst/>
+            </a:prstGeom>
+            <a:ln w="28575" cmpd="dbl">
+              <a:solidFill>
+                <a:schemeClr val="accent1">
+                  <a:shade val="50000"/>
+                </a:schemeClr>
+              </a:solidFill>
+              <a:prstDash val="solid"/>
+            </a:ln>
+            <a:effectLst>
+              <a:outerShdw blurRad="50800" dist="38100" dir="2700000" algn="tl" rotWithShape="0">
+                <a:prstClr val="black">
+                  <a:alpha val="40000"/>
+                </a:prstClr>
+              </a:outerShdw>
+              <a:reflection blurRad="6350" stA="52000" endA="300" endPos="35000" dir="5400000" sy="-100000" algn="bl" rotWithShape="0"/>
+            </a:effectLst>
+          </p:spPr>
+          <p:txBody>
+            <a:bodyPr vert="horz" lIns="91440" tIns="45720" rIns="91440" bIns="45720" rtlCol="0" anchor="ctr">
+              <a:noAutofit/>
+            </a:bodyPr>
+            <a:lstStyle>
+              <a:lvl1pPr marL="0" algn="l" defTabSz="685800" rtl="0" eaLnBrk="1" latinLnBrk="0" hangingPunct="1">
+                <a:lnSpc>
+                  <a:spcPct val="100000"/>
+                </a:lnSpc>
+                <a:spcBef>
+                  <a:spcPct val="0"/>
+                </a:spcBef>
+                <a:buNone/>
+                <a:defRPr lang="en-US" sz="3200" b="1" kern="1200" dirty="0">
+                  <a:solidFill>
+                    <a:srgbClr val="002060"/>
+                  </a:solidFill>
+                  <a:latin typeface="微软雅黑" panose="020B0503020204020204" pitchFamily="34" charset="-122"/>
+                  <a:ea typeface="微软雅黑" panose="020B0503020204020204" pitchFamily="34" charset="-122"/>
+                  <a:cs typeface="+mn-cs"/>
+                </a:defRPr>
+              </a:lvl1pPr>
+            </a:lstStyle>
+            <a:p>
+              <a:r>
+                <a:rPr altLang="zh-CN" sz="2000" dirty="0">
+                  <a:latin typeface="Arial" panose="020B0604020202020204" pitchFamily="34" charset="0"/>
+                  <a:sym typeface="Arial" panose="020B0604020202020204" pitchFamily="34" charset="0"/>
+                </a:rPr>
+                <a:t> </a:t>
+              </a:r>
+              <a:r>
+                <a:rPr lang="zh-CN" altLang="en-US" sz="2000" dirty="0">
+                  <a:latin typeface="Arial" panose="020B0604020202020204" pitchFamily="34" charset="0"/>
+                  <a:sym typeface="Arial" panose="020B0604020202020204" pitchFamily="34" charset="0"/>
+                </a:rPr>
+                <a:t>面积</a:t>
+              </a:r>
+              <a:endParaRPr lang="zh-CN" altLang="en-US" sz="2000" dirty="0">
+                <a:latin typeface="Arial" panose="020B0604020202020204" pitchFamily="34" charset="0"/>
+                <a:sym typeface="Arial" panose="020B0604020202020204" pitchFamily="34" charset="0"/>
+              </a:endParaRPr>
+            </a:p>
+          </p:txBody>
+        </p:sp>
+        <p:cxnSp>
+          <p:nvCxnSpPr>
+            <p:cNvPr id="19" name="直接箭头连接符 18"/>
+            <p:cNvCxnSpPr/>
+            <p:nvPr/>
+          </p:nvCxnSpPr>
+          <p:spPr>
+            <a:xfrm>
+              <a:off x="10820" y="5468"/>
+              <a:ext cx="870" cy="2488"/>
+            </a:xfrm>
+            <a:prstGeom prst="straightConnector1">
+              <a:avLst/>
+            </a:prstGeom>
+            <a:ln w="31750" cmpd="sng">
+              <a:solidFill>
+                <a:srgbClr val="92D050"/>
+              </a:solidFill>
+              <a:prstDash val="sysDot"/>
+              <a:tailEnd type="arrow"/>
+            </a:ln>
+          </p:spPr>
+          <p:style>
+            <a:lnRef idx="2">
+              <a:schemeClr val="accent1"/>
+            </a:lnRef>
+            <a:fillRef idx="0">
+              <a:srgbClr val="FFFFFF"/>
+            </a:fillRef>
+            <a:effectRef idx="0">
+              <a:srgbClr val="FFFFFF"/>
+            </a:effectRef>
+            <a:fontRef idx="minor">
+              <a:schemeClr val="tx1"/>
+            </a:fontRef>
+          </p:style>
+        </p:cxnSp>
+        <p:sp>
+          <p:nvSpPr>
+            <p:cNvPr id="20" name="标题 2"/>
+            <p:cNvSpPr txBox="1"/>
+            <p:nvPr/>
+          </p:nvSpPr>
+          <p:spPr>
+            <a:xfrm>
+              <a:off x="11099" y="7956"/>
+              <a:ext cx="1303" cy="843"/>
+            </a:xfrm>
+            <a:prstGeom prst="rect">
+              <a:avLst/>
+            </a:prstGeom>
+            <a:ln w="28575" cmpd="dbl">
+              <a:solidFill>
+                <a:schemeClr val="accent1">
+                  <a:shade val="50000"/>
+                </a:schemeClr>
+              </a:solidFill>
+              <a:prstDash val="solid"/>
+            </a:ln>
+            <a:effectLst>
+              <a:outerShdw blurRad="50800" dist="38100" dir="2700000" algn="tl" rotWithShape="0">
+                <a:prstClr val="black">
+                  <a:alpha val="40000"/>
+                </a:prstClr>
+              </a:outerShdw>
+              <a:reflection blurRad="6350" stA="52000" endA="300" endPos="35000" dir="5400000" sy="-100000" algn="bl" rotWithShape="0"/>
+            </a:effectLst>
+          </p:spPr>
+          <p:txBody>
+            <a:bodyPr vert="horz" lIns="91440" tIns="45720" rIns="91440" bIns="45720" rtlCol="0" anchor="ctr">
+              <a:noAutofit/>
+            </a:bodyPr>
+            <a:lstStyle>
+              <a:lvl1pPr marL="0" algn="l" defTabSz="685800" rtl="0" eaLnBrk="1" latinLnBrk="0" hangingPunct="1">
+                <a:lnSpc>
+                  <a:spcPct val="100000"/>
+                </a:lnSpc>
+                <a:spcBef>
+                  <a:spcPct val="0"/>
+                </a:spcBef>
+                <a:buNone/>
+                <a:defRPr lang="en-US" sz="3200" b="1" kern="1200" dirty="0">
+                  <a:solidFill>
+                    <a:srgbClr val="002060"/>
+                  </a:solidFill>
+                  <a:latin typeface="微软雅黑" panose="020B0503020204020204" pitchFamily="34" charset="-122"/>
+                  <a:ea typeface="微软雅黑" panose="020B0503020204020204" pitchFamily="34" charset="-122"/>
+                  <a:cs typeface="+mn-cs"/>
+                </a:defRPr>
+              </a:lvl1pPr>
+            </a:lstStyle>
+            <a:p>
+              <a:r>
+                <a:rPr altLang="zh-CN" sz="2000" dirty="0">
+                  <a:latin typeface="Arial" panose="020B0604020202020204" pitchFamily="34" charset="0"/>
+                  <a:sym typeface="Arial" panose="020B0604020202020204" pitchFamily="34" charset="0"/>
+                </a:rPr>
+                <a:t> </a:t>
+              </a:r>
+              <a:r>
+                <a:rPr lang="zh-CN" altLang="en-US" sz="2000" dirty="0">
+                  <a:latin typeface="Arial" panose="020B0604020202020204" pitchFamily="34" charset="0"/>
+                  <a:sym typeface="Arial" panose="020B0604020202020204" pitchFamily="34" charset="0"/>
+                </a:rPr>
+                <a:t>房</a:t>
+              </a:r>
+              <a:r>
+                <a:rPr lang="zh-CN" altLang="en-US" sz="2000" dirty="0">
+                  <a:latin typeface="Arial" panose="020B0604020202020204" pitchFamily="34" charset="0"/>
+                  <a:sym typeface="Arial" panose="020B0604020202020204" pitchFamily="34" charset="0"/>
+                </a:rPr>
+                <a:t>龄</a:t>
+              </a:r>
+              <a:endParaRPr lang="zh-CN" altLang="en-US" sz="2000" dirty="0">
+                <a:latin typeface="Arial" panose="020B0604020202020204" pitchFamily="34" charset="0"/>
+                <a:sym typeface="Arial" panose="020B0604020202020204" pitchFamily="34" charset="0"/>
+              </a:endParaRPr>
+            </a:p>
+          </p:txBody>
+        </p:sp>
+      </p:grpSp>
+      <p:pic>
+        <p:nvPicPr>
+          <p:cNvPr id="22" name="图片 21"/>
+          <p:cNvPicPr>
+            <a:picLocks noChangeAspect="1"/>
+          </p:cNvPicPr>
+          <p:nvPr/>
+        </p:nvPicPr>
+        <p:blipFill>
+          <a:blip r:embed="rId2">
+            <a:clrChange>
+              <a:clrFrom>
+                <a:srgbClr val="FCFCFC">
+                  <a:alpha val="100000"/>
+                </a:srgbClr>
+              </a:clrFrom>
+              <a:clrTo>
+                <a:srgbClr val="FCFCFC">
+                  <a:alpha val="100000"/>
+                  <a:alpha val="0"/>
+                </a:srgbClr>
+              </a:clrTo>
+            </a:clrChange>
+          </a:blip>
+          <a:stretch>
+            <a:fillRect/>
+          </a:stretch>
+        </p:blipFill>
+        <p:spPr>
+          <a:xfrm>
+            <a:off x="7949565" y="2656205"/>
+            <a:ext cx="2905760" cy="2134870"/>
+          </a:xfrm>
+          <a:prstGeom prst="rect">
+            <a:avLst/>
+          </a:prstGeom>
+          <a:ln w="38100" cmpd="sng">
+            <a:solidFill>
+              <a:srgbClr val="FF0000"/>
+            </a:solidFill>
+            <a:prstDash val="sysDot"/>
+          </a:ln>
+          <a:effectLst>
+            <a:reflection blurRad="6350" stA="52000" endA="300" endPos="35000" dir="5400000" sy="-100000" algn="bl" rotWithShape="0"/>
+          </a:effectLst>
+        </p:spPr>
+      </p:pic>
+    </p:spTree>
+  </p:cSld>
+  <p:clrMapOvr>
+    <a:masterClrMapping/>
+  </p:clrMapOvr>
+  <p:transition advClick="0" advTm="0"/>
+</p:sld>
+</file>
+
+<file path=ppt/slides/slide13.xml><?xml version="1.0" encoding="utf-8"?>
 <p:sld xmlns:a="http://schemas.openxmlformats.org/drawingml/2006/main" xmlns:r="http://schemas.openxmlformats.org/officeDocument/2006/relationships" xmlns:p="http://schemas.openxmlformats.org/presentationml/2006/main">
   <p:cSld>
     <p:spTree>

</xml_diff>